<commit_message>
Added most suggested changes to the placing slides.
</commit_message>
<xml_diff>
--- a/presentations/placing.pptx
+++ b/presentations/placing.pptx
@@ -5,19 +5,18 @@
     <p:sldMasterId id="2147483648" r:id="rId1"/>
   </p:sldMasterIdLst>
   <p:notesMasterIdLst>
-    <p:notesMasterId r:id="rId12"/>
+    <p:notesMasterId r:id="rId11"/>
   </p:notesMasterIdLst>
   <p:sldIdLst>
     <p:sldId id="256" r:id="rId2"/>
-    <p:sldId id="257" r:id="rId3"/>
-    <p:sldId id="265" r:id="rId4"/>
-    <p:sldId id="266" r:id="rId5"/>
-    <p:sldId id="267" r:id="rId6"/>
-    <p:sldId id="258" r:id="rId7"/>
-    <p:sldId id="259" r:id="rId8"/>
-    <p:sldId id="268" r:id="rId9"/>
-    <p:sldId id="260" r:id="rId10"/>
-    <p:sldId id="261" r:id="rId11"/>
+    <p:sldId id="267" r:id="rId3"/>
+    <p:sldId id="258" r:id="rId4"/>
+    <p:sldId id="259" r:id="rId5"/>
+    <p:sldId id="268" r:id="rId6"/>
+    <p:sldId id="260" r:id="rId7"/>
+    <p:sldId id="261" r:id="rId8"/>
+    <p:sldId id="269" r:id="rId9"/>
+    <p:sldId id="270" r:id="rId10"/>
   </p:sldIdLst>
   <p:sldSz cx="9144000" cy="6858000" type="screen4x3"/>
   <p:notesSz cx="6858000" cy="9144000"/>
@@ -201,7 +200,7 @@
           <a:p>
             <a:fld id="{E1D0BDDC-64E4-7044-8051-D0FCB9FAE0F1}" type="datetimeFigureOut">
               <a:rPr lang="en-US" smtClean="0"/>
-              <a:t>14/10/2013</a:t>
+              <a:t>16/10/2013</a:t>
             </a:fld>
             <a:endParaRPr lang="en-US"/>
           </a:p>
@@ -578,253 +577,6 @@
 </p:notes>
 </file>
 
-<file path=ppt/notesSlides/notesSlide10.xml><?xml version="1.0" encoding="utf-8"?>
-<p:notes xmlns:a="http://schemas.openxmlformats.org/drawingml/2006/main" xmlns:r="http://schemas.openxmlformats.org/officeDocument/2006/relationships" xmlns:p="http://schemas.openxmlformats.org/presentationml/2006/main">
-  <p:cSld>
-    <p:spTree>
-      <p:nvGrpSpPr>
-        <p:cNvPr id="1" name=""/>
-        <p:cNvGrpSpPr/>
-        <p:nvPr/>
-      </p:nvGrpSpPr>
-      <p:grpSpPr>
-        <a:xfrm>
-          <a:off x="0" y="0"/>
-          <a:ext cx="0" cy="0"/>
-          <a:chOff x="0" y="0"/>
-          <a:chExt cx="0" cy="0"/>
-        </a:xfrm>
-      </p:grpSpPr>
-      <p:sp>
-        <p:nvSpPr>
-          <p:cNvPr id="2" name="Slide Image Placeholder 1"/>
-          <p:cNvSpPr>
-            <a:spLocks noGrp="1" noRot="1" noChangeAspect="1"/>
-          </p:cNvSpPr>
-          <p:nvPr>
-            <p:ph type="sldImg"/>
-          </p:nvPr>
-        </p:nvSpPr>
-        <p:spPr/>
-      </p:sp>
-      <p:sp>
-        <p:nvSpPr>
-          <p:cNvPr id="3" name="Notes Placeholder 2"/>
-          <p:cNvSpPr>
-            <a:spLocks noGrp="1"/>
-          </p:cNvSpPr>
-          <p:nvPr>
-            <p:ph type="body" idx="1"/>
-          </p:nvPr>
-        </p:nvSpPr>
-        <p:spPr/>
-        <p:txBody>
-          <a:bodyPr/>
-          <a:lstStyle/>
-          <a:p>
-            <a:pPr marL="0" marR="0" indent="0" algn="l" defTabSz="457200" rtl="0" eaLnBrk="1" fontAlgn="auto" latinLnBrk="0" hangingPunct="1">
-              <a:lnSpc>
-                <a:spcPct val="100000"/>
-              </a:lnSpc>
-              <a:spcBef>
-                <a:spcPts val="0"/>
-              </a:spcBef>
-              <a:spcAft>
-                <a:spcPts val="0"/>
-              </a:spcAft>
-              <a:buClrTx/>
-              <a:buSzTx/>
-              <a:buFontTx/>
-              <a:buNone/>
-              <a:tabLst/>
-              <a:defRPr/>
-            </a:pPr>
-            <a:r>
-              <a:rPr lang="en-US" dirty="0" smtClean="0"/>
-              <a:t>Run 4 uses</a:t>
-            </a:r>
-            <a:r>
-              <a:rPr lang="en-US" baseline="0" dirty="0" smtClean="0"/>
-              <a:t> </a:t>
-            </a:r>
-            <a:r>
-              <a:rPr lang="en-US" sz="1200" kern="1200" dirty="0" smtClean="0">
-                <a:solidFill>
-                  <a:schemeClr val="tx1"/>
-                </a:solidFill>
-                <a:effectLst/>
-                <a:latin typeface="+mn-lt"/>
-                <a:ea typeface="+mn-ea"/>
-                <a:cs typeface="+mn-cs"/>
-              </a:rPr>
-              <a:t>larger dataset of GEOTAGGED </a:t>
-            </a:r>
-            <a:r>
-              <a:rPr lang="en-US" sz="1200" kern="1200" dirty="0" err="1" smtClean="0">
-                <a:solidFill>
-                  <a:schemeClr val="tx1"/>
-                </a:solidFill>
-                <a:effectLst/>
-                <a:latin typeface="+mn-lt"/>
-                <a:ea typeface="+mn-ea"/>
-                <a:cs typeface="+mn-cs"/>
-              </a:rPr>
-              <a:t>flickr</a:t>
-            </a:r>
-            <a:r>
-              <a:rPr lang="en-US" sz="1200" kern="1200" dirty="0" smtClean="0">
-                <a:solidFill>
-                  <a:schemeClr val="tx1"/>
-                </a:solidFill>
-                <a:effectLst/>
-                <a:latin typeface="+mn-lt"/>
-                <a:ea typeface="+mn-ea"/>
-                <a:cs typeface="+mn-cs"/>
-              </a:rPr>
-              <a:t> images crawled independently. All images from the set of users from the query images were removed from this dataset to keep to the spirit of the task.</a:t>
-            </a:r>
-          </a:p>
-          <a:p>
-            <a:pPr marL="0" marR="0" indent="0" algn="l" defTabSz="457200" rtl="0" eaLnBrk="1" fontAlgn="auto" latinLnBrk="0" hangingPunct="1">
-              <a:lnSpc>
-                <a:spcPct val="100000"/>
-              </a:lnSpc>
-              <a:spcBef>
-                <a:spcPts val="0"/>
-              </a:spcBef>
-              <a:spcAft>
-                <a:spcPts val="0"/>
-              </a:spcAft>
-              <a:buClrTx/>
-              <a:buSzTx/>
-              <a:buFontTx/>
-              <a:buNone/>
-              <a:tabLst/>
-              <a:defRPr/>
-            </a:pPr>
-            <a:r>
-              <a:rPr lang="en-US" sz="1200" kern="1200" dirty="0" err="1" smtClean="0">
-                <a:solidFill>
-                  <a:schemeClr val="tx1"/>
-                </a:solidFill>
-                <a:effectLst/>
-                <a:latin typeface="+mn-lt"/>
-                <a:ea typeface="+mn-ea"/>
-                <a:cs typeface="+mn-cs"/>
-              </a:rPr>
-              <a:t>Geonames</a:t>
-            </a:r>
-            <a:r>
-              <a:rPr lang="en-US" sz="1200" kern="1200" baseline="0" dirty="0" smtClean="0">
-                <a:solidFill>
-                  <a:schemeClr val="tx1"/>
-                </a:solidFill>
-                <a:effectLst/>
-                <a:latin typeface="+mn-lt"/>
-                <a:ea typeface="+mn-ea"/>
-                <a:cs typeface="+mn-cs"/>
-              </a:rPr>
-              <a:t> provides helpful boost</a:t>
-            </a:r>
-            <a:endParaRPr lang="en-US" sz="1200" kern="1200" dirty="0" smtClean="0">
-              <a:solidFill>
-                <a:schemeClr val="tx1"/>
-              </a:solidFill>
-              <a:effectLst/>
-              <a:latin typeface="+mn-lt"/>
-              <a:ea typeface="+mn-ea"/>
-              <a:cs typeface="+mn-cs"/>
-            </a:endParaRPr>
-          </a:p>
-          <a:p>
-            <a:pPr marL="0" marR="0" indent="0" algn="l" defTabSz="457200" rtl="0" eaLnBrk="1" fontAlgn="auto" latinLnBrk="0" hangingPunct="1">
-              <a:lnSpc>
-                <a:spcPct val="100000"/>
-              </a:lnSpc>
-              <a:spcBef>
-                <a:spcPts val="0"/>
-              </a:spcBef>
-              <a:spcAft>
-                <a:spcPts val="0"/>
-              </a:spcAft>
-              <a:buClrTx/>
-              <a:buSzTx/>
-              <a:buFontTx/>
-              <a:buNone/>
-              <a:tabLst/>
-              <a:defRPr/>
-            </a:pPr>
-            <a:r>
-              <a:rPr lang="en-US" dirty="0" smtClean="0"/>
-              <a:t>Using just tags seems most effective</a:t>
-            </a:r>
-            <a:r>
-              <a:rPr lang="en-US" baseline="0" dirty="0" smtClean="0"/>
-              <a:t> (run 3)</a:t>
-            </a:r>
-          </a:p>
-          <a:p>
-            <a:pPr marL="0" marR="0" indent="0" algn="l" defTabSz="457200" rtl="0" eaLnBrk="1" fontAlgn="auto" latinLnBrk="0" hangingPunct="1">
-              <a:lnSpc>
-                <a:spcPct val="100000"/>
-              </a:lnSpc>
-              <a:spcBef>
-                <a:spcPts val="0"/>
-              </a:spcBef>
-              <a:spcAft>
-                <a:spcPts val="0"/>
-              </a:spcAft>
-              <a:buClrTx/>
-              <a:buSzTx/>
-              <a:buFontTx/>
-              <a:buNone/>
-              <a:tabLst/>
-              <a:defRPr/>
-            </a:pPr>
-            <a:r>
-              <a:rPr lang="en-US" baseline="0" dirty="0" smtClean="0"/>
-              <a:t>Big dataset helps (run 4)</a:t>
-            </a:r>
-            <a:endParaRPr lang="en-US" dirty="0" smtClean="0"/>
-          </a:p>
-        </p:txBody>
-      </p:sp>
-      <p:sp>
-        <p:nvSpPr>
-          <p:cNvPr id="4" name="Slide Number Placeholder 3"/>
-          <p:cNvSpPr>
-            <a:spLocks noGrp="1"/>
-          </p:cNvSpPr>
-          <p:nvPr>
-            <p:ph type="sldNum" sz="quarter" idx="10"/>
-          </p:nvPr>
-        </p:nvSpPr>
-        <p:spPr/>
-        <p:txBody>
-          <a:bodyPr/>
-          <a:lstStyle/>
-          <a:p>
-            <a:fld id="{909E9D34-1247-5948-955C-61F54B534A73}" type="slidenum">
-              <a:rPr lang="en-US" smtClean="0"/>
-              <a:t>10</a:t>
-            </a:fld>
-            <a:endParaRPr lang="en-US"/>
-          </a:p>
-        </p:txBody>
-      </p:sp>
-    </p:spTree>
-    <p:extLst>
-      <p:ext uri="{BB962C8B-B14F-4D97-AF65-F5344CB8AC3E}">
-        <p14:creationId xmlns:p14="http://schemas.microsoft.com/office/powerpoint/2010/main" val="685985644"/>
-      </p:ext>
-    </p:extLst>
-  </p:cSld>
-  <p:clrMapOvr>
-    <a:masterClrMapping/>
-  </p:clrMapOvr>
-</p:notes>
-</file>
-
 <file path=ppt/notesSlides/notesSlide2.xml><?xml version="1.0" encoding="utf-8"?>
 <p:notes xmlns:a="http://schemas.openxmlformats.org/drawingml/2006/main" xmlns:r="http://schemas.openxmlformats.org/officeDocument/2006/relationships" xmlns:p="http://schemas.openxmlformats.org/presentationml/2006/main">
   <p:cSld>
@@ -871,27 +623,11 @@
           <a:p>
             <a:r>
               <a:rPr lang="en-US" dirty="0" smtClean="0"/>
-              <a:t>&lt;</a:t>
-            </a:r>
-            <a:r>
-              <a:rPr lang="en-US" dirty="0" err="1" smtClean="0"/>
-              <a:t>Lat</a:t>
-            </a:r>
-            <a:r>
-              <a:rPr lang="en-US" dirty="0" smtClean="0"/>
-              <a:t>, </a:t>
-            </a:r>
-            <a:r>
-              <a:rPr lang="en-US" dirty="0" err="1" smtClean="0"/>
-              <a:t>Lng</a:t>
-            </a:r>
-            <a:r>
-              <a:rPr lang="en-US" dirty="0" smtClean="0"/>
-              <a:t>&gt; pairs can be seen</a:t>
+              <a:t>Kernel-density from</a:t>
             </a:r>
             <a:r>
               <a:rPr lang="en-US" baseline="0" dirty="0" smtClean="0"/>
-              <a:t> as discrete samples drawn from a probability distribution function over the Earth’s surface</a:t>
+              <a:t> mean-shift clustering used</a:t>
             </a:r>
             <a:endParaRPr lang="en-US" dirty="0"/>
           </a:p>
@@ -977,6 +713,26 @@
           <a:bodyPr/>
           <a:lstStyle/>
           <a:p>
+            <a:r>
+              <a:rPr lang="en-US" dirty="0" smtClean="0"/>
+              <a:t>Hotspots around US,</a:t>
+            </a:r>
+            <a:r>
+              <a:rPr lang="en-US" baseline="0" dirty="0" smtClean="0"/>
+              <a:t> Europe, major cities</a:t>
+            </a:r>
+          </a:p>
+          <a:p>
+            <a:r>
+              <a:rPr lang="en-US" baseline="0" dirty="0" smtClean="0"/>
+              <a:t>Approach means all tags are considered equal</a:t>
+            </a:r>
+          </a:p>
+          <a:p>
+            <a:r>
+              <a:rPr lang="en-US" baseline="0" dirty="0" smtClean="0"/>
+              <a:t>All tags provide a little information, worst case = prior</a:t>
+            </a:r>
             <a:endParaRPr lang="en-US" dirty="0"/>
           </a:p>
         </p:txBody>
@@ -1007,7 +763,7 @@
     </p:spTree>
     <p:extLst>
       <p:ext uri="{BB962C8B-B14F-4D97-AF65-F5344CB8AC3E}">
-        <p14:creationId xmlns:p14="http://schemas.microsoft.com/office/powerpoint/2010/main" val="3655472583"/>
+        <p14:creationId xmlns:p14="http://schemas.microsoft.com/office/powerpoint/2010/main" val="1956542975"/>
       </p:ext>
     </p:extLst>
   </p:cSld>
@@ -1061,7 +817,53 @@
           <a:bodyPr/>
           <a:lstStyle/>
           <a:p>
-            <a:endParaRPr lang="en-US" dirty="0"/>
+            <a:pPr marL="228600" indent="-228600">
+              <a:buAutoNum type="arabicParenR"/>
+            </a:pPr>
+            <a:r>
+              <a:rPr lang="en-US" dirty="0" smtClean="0"/>
+              <a:t>Image</a:t>
+            </a:r>
+          </a:p>
+          <a:p>
+            <a:pPr marL="228600" indent="-228600">
+              <a:buAutoNum type="arabicParenR"/>
+            </a:pPr>
+            <a:r>
+              <a:rPr lang="en-US" dirty="0" smtClean="0"/>
+              <a:t>Difference</a:t>
+            </a:r>
+            <a:r>
+              <a:rPr lang="en-US" baseline="0" dirty="0" smtClean="0"/>
+              <a:t> of Gaussian SIFT Features</a:t>
+            </a:r>
+          </a:p>
+          <a:p>
+            <a:pPr marL="228600" indent="-228600">
+              <a:buAutoNum type="arabicParenR"/>
+            </a:pPr>
+            <a:r>
+              <a:rPr lang="en-US" baseline="0" dirty="0" smtClean="0"/>
+              <a:t>Random Gaussian P-Stable hash functions, 4 x 32 bit partitions</a:t>
+            </a:r>
+          </a:p>
+          <a:p>
+            <a:pPr marL="228600" indent="-228600">
+              <a:buAutoNum type="arabicParenR"/>
+            </a:pPr>
+            <a:r>
+              <a:rPr lang="en-US" baseline="0" dirty="0" smtClean="0"/>
+              <a:t>Collision in hash table = graph edge</a:t>
+            </a:r>
+          </a:p>
+          <a:p>
+            <a:pPr marL="0" indent="0">
+              <a:buNone/>
+            </a:pPr>
+            <a:r>
+              <a:rPr lang="en-US" baseline="0" dirty="0" smtClean="0"/>
+              <a:t>Search: looks up image vertex, returns connected vertices, ordered by weight</a:t>
+            </a:r>
           </a:p>
         </p:txBody>
       </p:sp>
@@ -1091,7 +893,7 @@
     </p:spTree>
     <p:extLst>
       <p:ext uri="{BB962C8B-B14F-4D97-AF65-F5344CB8AC3E}">
-        <p14:creationId xmlns:p14="http://schemas.microsoft.com/office/powerpoint/2010/main" val="3655472583"/>
+        <p14:creationId xmlns:p14="http://schemas.microsoft.com/office/powerpoint/2010/main" val="4180740899"/>
       </p:ext>
     </p:extLst>
   </p:cSld>
@@ -1145,13 +947,59 @@
           <a:bodyPr/>
           <a:lstStyle/>
           <a:p>
+            <a:pPr marL="228600" indent="-228600">
+              <a:buAutoNum type="arabicParenR"/>
+            </a:pPr>
             <a:r>
               <a:rPr lang="en-US" dirty="0" smtClean="0"/>
-              <a:t>Kernel-density from</a:t>
+              <a:t>CEDD describes</a:t>
             </a:r>
             <a:r>
               <a:rPr lang="en-US" baseline="0" dirty="0" smtClean="0"/>
-              <a:t> mean-shift clustering used</a:t>
+              <a:t> </a:t>
+            </a:r>
+            <a:r>
+              <a:rPr lang="en-US" baseline="0" dirty="0" err="1" smtClean="0"/>
+              <a:t>colour</a:t>
+            </a:r>
+            <a:r>
+              <a:rPr lang="en-US" baseline="0" dirty="0" smtClean="0"/>
+              <a:t> + texture, 144 dimensions</a:t>
+            </a:r>
+          </a:p>
+          <a:p>
+            <a:pPr marL="228600" indent="-228600">
+              <a:buAutoNum type="arabicParenR"/>
+            </a:pPr>
+            <a:r>
+              <a:rPr lang="en-US" dirty="0" smtClean="0"/>
+              <a:t>18 products with 256 clusters each</a:t>
+            </a:r>
+          </a:p>
+          <a:p>
+            <a:pPr marL="228600" indent="-228600">
+              <a:buAutoNum type="arabicParenR"/>
+            </a:pPr>
+            <a:r>
+              <a:rPr lang="en-US" dirty="0" smtClean="0"/>
+              <a:t>26</a:t>
+            </a:r>
+            <a:r>
+              <a:rPr lang="en-US" baseline="0" dirty="0" smtClean="0"/>
+              <a:t> bytes / image (18 for feature)</a:t>
+            </a:r>
+          </a:p>
+          <a:p>
+            <a:pPr marL="0" indent="0">
+              <a:buNone/>
+            </a:pPr>
+            <a:r>
+              <a:rPr lang="en-US" dirty="0" smtClean="0"/>
+              <a:t>Search: query</a:t>
+            </a:r>
+            <a:r>
+              <a:rPr lang="en-US" baseline="0" dirty="0" smtClean="0"/>
+              <a:t> = raw features, asymmetric distance, closest 100 images used</a:t>
             </a:r>
             <a:endParaRPr lang="en-US" dirty="0"/>
           </a:p>
@@ -1183,7 +1031,7 @@
     </p:spTree>
     <p:extLst>
       <p:ext uri="{BB962C8B-B14F-4D97-AF65-F5344CB8AC3E}">
-        <p14:creationId xmlns:p14="http://schemas.microsoft.com/office/powerpoint/2010/main" val="3655472583"/>
+        <p14:creationId xmlns:p14="http://schemas.microsoft.com/office/powerpoint/2010/main" val="1422346787"/>
       </p:ext>
     </p:extLst>
   </p:cSld>
@@ -1239,23 +1087,31 @@
           <a:p>
             <a:r>
               <a:rPr lang="en-US" dirty="0" smtClean="0"/>
-              <a:t>Hotspots around US,</a:t>
+              <a:t>Super/sub sampling</a:t>
+            </a:r>
+          </a:p>
+          <a:p>
+            <a:r>
+              <a:rPr lang="en-US" dirty="0" smtClean="0"/>
+              <a:t>Each feature is given equal weight</a:t>
+            </a:r>
+          </a:p>
+          <a:p>
+            <a:r>
+              <a:rPr lang="en-US" dirty="0" smtClean="0"/>
+              <a:t>Matches with </a:t>
+            </a:r>
+            <a:r>
+              <a:rPr lang="en-US" dirty="0" err="1" smtClean="0"/>
+              <a:t>geonames</a:t>
+            </a:r>
+            <a:r>
+              <a:rPr lang="en-US" dirty="0" smtClean="0"/>
+              <a:t> place</a:t>
             </a:r>
             <a:r>
               <a:rPr lang="en-US" baseline="0" dirty="0" smtClean="0"/>
-              <a:t> Europe, major cities</a:t>
-            </a:r>
-          </a:p>
-          <a:p>
-            <a:r>
-              <a:rPr lang="en-US" baseline="0" dirty="0" smtClean="0"/>
-              <a:t>Approach means all tags are considered equal</a:t>
-            </a:r>
-          </a:p>
-          <a:p>
-            <a:r>
-              <a:rPr lang="en-US" baseline="0" dirty="0" smtClean="0"/>
-              <a:t>All tags provide a little information, worst case = prior</a:t>
+              <a:t> or alternate place name</a:t>
             </a:r>
             <a:endParaRPr lang="en-US" dirty="0"/>
           </a:p>
@@ -1287,7 +1143,7 @@
     </p:spTree>
     <p:extLst>
       <p:ext uri="{BB962C8B-B14F-4D97-AF65-F5344CB8AC3E}">
-        <p14:creationId xmlns:p14="http://schemas.microsoft.com/office/powerpoint/2010/main" val="1956542975"/>
+        <p14:creationId xmlns:p14="http://schemas.microsoft.com/office/powerpoint/2010/main" val="2656925330"/>
       </p:ext>
     </p:extLst>
   </p:cSld>
@@ -1341,53 +1197,170 @@
           <a:bodyPr/>
           <a:lstStyle/>
           <a:p>
-            <a:pPr marL="228600" indent="-228600">
-              <a:buAutoNum type="arabicParenR"/>
+            <a:pPr marL="0" marR="0" indent="0" algn="l" defTabSz="457200" rtl="0" eaLnBrk="1" fontAlgn="auto" latinLnBrk="0" hangingPunct="1">
+              <a:lnSpc>
+                <a:spcPct val="100000"/>
+              </a:lnSpc>
+              <a:spcBef>
+                <a:spcPts val="0"/>
+              </a:spcBef>
+              <a:spcAft>
+                <a:spcPts val="0"/>
+              </a:spcAft>
+              <a:buClrTx/>
+              <a:buSzTx/>
+              <a:buFontTx/>
+              <a:buNone/>
+              <a:tabLst/>
+              <a:defRPr/>
             </a:pPr>
             <a:r>
               <a:rPr lang="en-US" dirty="0" smtClean="0"/>
-              <a:t>Image</a:t>
-            </a:r>
-          </a:p>
-          <a:p>
-            <a:pPr marL="228600" indent="-228600">
-              <a:buAutoNum type="arabicParenR"/>
+              <a:t>Run 4 uses</a:t>
+            </a:r>
+            <a:r>
+              <a:rPr lang="en-US" baseline="0" dirty="0" smtClean="0"/>
+              <a:t> </a:t>
+            </a:r>
+            <a:r>
+              <a:rPr lang="en-US" sz="1200" kern="1200" dirty="0" smtClean="0">
+                <a:solidFill>
+                  <a:schemeClr val="tx1"/>
+                </a:solidFill>
+                <a:effectLst/>
+                <a:latin typeface="+mn-lt"/>
+                <a:ea typeface="+mn-ea"/>
+                <a:cs typeface="+mn-cs"/>
+              </a:rPr>
+              <a:t>larger dataset of GEOTAGGED </a:t>
+            </a:r>
+            <a:r>
+              <a:rPr lang="en-US" sz="1200" kern="1200" dirty="0" err="1" smtClean="0">
+                <a:solidFill>
+                  <a:schemeClr val="tx1"/>
+                </a:solidFill>
+                <a:effectLst/>
+                <a:latin typeface="+mn-lt"/>
+                <a:ea typeface="+mn-ea"/>
+                <a:cs typeface="+mn-cs"/>
+              </a:rPr>
+              <a:t>flickr</a:t>
+            </a:r>
+            <a:r>
+              <a:rPr lang="en-US" sz="1200" kern="1200" dirty="0" smtClean="0">
+                <a:solidFill>
+                  <a:schemeClr val="tx1"/>
+                </a:solidFill>
+                <a:effectLst/>
+                <a:latin typeface="+mn-lt"/>
+                <a:ea typeface="+mn-ea"/>
+                <a:cs typeface="+mn-cs"/>
+              </a:rPr>
+              <a:t> images crawled independently. All images from the set of users from the query images were removed from this dataset to keep to the spirit of the task.</a:t>
+            </a:r>
+          </a:p>
+          <a:p>
+            <a:pPr marL="0" marR="0" indent="0" algn="l" defTabSz="457200" rtl="0" eaLnBrk="1" fontAlgn="auto" latinLnBrk="0" hangingPunct="1">
+              <a:lnSpc>
+                <a:spcPct val="100000"/>
+              </a:lnSpc>
+              <a:spcBef>
+                <a:spcPts val="0"/>
+              </a:spcBef>
+              <a:spcAft>
+                <a:spcPts val="0"/>
+              </a:spcAft>
+              <a:buClrTx/>
+              <a:buSzTx/>
+              <a:buFontTx/>
+              <a:buNone/>
+              <a:tabLst/>
+              <a:defRPr/>
             </a:pPr>
             <a:r>
+              <a:rPr lang="en-US" sz="1200" kern="1200" dirty="0" err="1" smtClean="0">
+                <a:solidFill>
+                  <a:schemeClr val="tx1"/>
+                </a:solidFill>
+                <a:effectLst/>
+                <a:latin typeface="+mn-lt"/>
+                <a:ea typeface="+mn-ea"/>
+                <a:cs typeface="+mn-cs"/>
+              </a:rPr>
+              <a:t>Geonames</a:t>
+            </a:r>
+            <a:r>
+              <a:rPr lang="en-US" sz="1200" kern="1200" baseline="0" dirty="0" smtClean="0">
+                <a:solidFill>
+                  <a:schemeClr val="tx1"/>
+                </a:solidFill>
+                <a:effectLst/>
+                <a:latin typeface="+mn-lt"/>
+                <a:ea typeface="+mn-ea"/>
+                <a:cs typeface="+mn-cs"/>
+              </a:rPr>
+              <a:t> provides helpful boost</a:t>
+            </a:r>
+            <a:endParaRPr lang="en-US" sz="1200" kern="1200" dirty="0" smtClean="0">
+              <a:solidFill>
+                <a:schemeClr val="tx1"/>
+              </a:solidFill>
+              <a:effectLst/>
+              <a:latin typeface="+mn-lt"/>
+              <a:ea typeface="+mn-ea"/>
+              <a:cs typeface="+mn-cs"/>
+            </a:endParaRPr>
+          </a:p>
+          <a:p>
+            <a:pPr marL="0" marR="0" indent="0" algn="l" defTabSz="457200" rtl="0" eaLnBrk="1" fontAlgn="auto" latinLnBrk="0" hangingPunct="1">
+              <a:lnSpc>
+                <a:spcPct val="100000"/>
+              </a:lnSpc>
+              <a:spcBef>
+                <a:spcPts val="0"/>
+              </a:spcBef>
+              <a:spcAft>
+                <a:spcPts val="0"/>
+              </a:spcAft>
+              <a:buClrTx/>
+              <a:buSzTx/>
+              <a:buFontTx/>
+              <a:buNone/>
+              <a:tabLst/>
+              <a:defRPr/>
+            </a:pPr>
+            <a:r>
               <a:rPr lang="en-US" dirty="0" smtClean="0"/>
-              <a:t>Difference</a:t>
+              <a:t>Using just tags seems most effective</a:t>
             </a:r>
             <a:r>
               <a:rPr lang="en-US" baseline="0" dirty="0" smtClean="0"/>
-              <a:t> of Gaussian SIFT Features</a:t>
-            </a:r>
-          </a:p>
-          <a:p>
-            <a:pPr marL="228600" indent="-228600">
-              <a:buAutoNum type="arabicParenR"/>
+              <a:t> (run 3)</a:t>
+            </a:r>
+          </a:p>
+          <a:p>
+            <a:pPr marL="0" marR="0" indent="0" algn="l" defTabSz="457200" rtl="0" eaLnBrk="1" fontAlgn="auto" latinLnBrk="0" hangingPunct="1">
+              <a:lnSpc>
+                <a:spcPct val="100000"/>
+              </a:lnSpc>
+              <a:spcBef>
+                <a:spcPts val="0"/>
+              </a:spcBef>
+              <a:spcAft>
+                <a:spcPts val="0"/>
+              </a:spcAft>
+              <a:buClrTx/>
+              <a:buSzTx/>
+              <a:buFontTx/>
+              <a:buNone/>
+              <a:tabLst/>
+              <a:defRPr/>
             </a:pPr>
             <a:r>
               <a:rPr lang="en-US" baseline="0" dirty="0" smtClean="0"/>
-              <a:t>Random Gaussian P-Stable hash functions, 4 x 32 bit partitions</a:t>
-            </a:r>
-          </a:p>
-          <a:p>
-            <a:pPr marL="228600" indent="-228600">
-              <a:buAutoNum type="arabicParenR"/>
-            </a:pPr>
-            <a:r>
-              <a:rPr lang="en-US" baseline="0" dirty="0" smtClean="0"/>
-              <a:t>Collision in hash table = graph edge</a:t>
-            </a:r>
-          </a:p>
-          <a:p>
-            <a:pPr marL="0" indent="0">
-              <a:buNone/>
-            </a:pPr>
-            <a:r>
-              <a:rPr lang="en-US" baseline="0" dirty="0" smtClean="0"/>
-              <a:t>Search: looks up image vertex, returns connected vertices, ordered by weight</a:t>
-            </a:r>
+              <a:t>Big dataset helps (run 4)</a:t>
+            </a:r>
+            <a:endParaRPr lang="en-US" dirty="0" smtClean="0"/>
           </a:p>
         </p:txBody>
       </p:sp>
@@ -1417,257 +1390,7 @@
     </p:spTree>
     <p:extLst>
       <p:ext uri="{BB962C8B-B14F-4D97-AF65-F5344CB8AC3E}">
-        <p14:creationId xmlns:p14="http://schemas.microsoft.com/office/powerpoint/2010/main" val="4180740899"/>
-      </p:ext>
-    </p:extLst>
-  </p:cSld>
-  <p:clrMapOvr>
-    <a:masterClrMapping/>
-  </p:clrMapOvr>
-</p:notes>
-</file>
-
-<file path=ppt/notesSlides/notesSlide8.xml><?xml version="1.0" encoding="utf-8"?>
-<p:notes xmlns:a="http://schemas.openxmlformats.org/drawingml/2006/main" xmlns:r="http://schemas.openxmlformats.org/officeDocument/2006/relationships" xmlns:p="http://schemas.openxmlformats.org/presentationml/2006/main">
-  <p:cSld>
-    <p:spTree>
-      <p:nvGrpSpPr>
-        <p:cNvPr id="1" name=""/>
-        <p:cNvGrpSpPr/>
-        <p:nvPr/>
-      </p:nvGrpSpPr>
-      <p:grpSpPr>
-        <a:xfrm>
-          <a:off x="0" y="0"/>
-          <a:ext cx="0" cy="0"/>
-          <a:chOff x="0" y="0"/>
-          <a:chExt cx="0" cy="0"/>
-        </a:xfrm>
-      </p:grpSpPr>
-      <p:sp>
-        <p:nvSpPr>
-          <p:cNvPr id="2" name="Slide Image Placeholder 1"/>
-          <p:cNvSpPr>
-            <a:spLocks noGrp="1" noRot="1" noChangeAspect="1"/>
-          </p:cNvSpPr>
-          <p:nvPr>
-            <p:ph type="sldImg"/>
-          </p:nvPr>
-        </p:nvSpPr>
-        <p:spPr/>
-      </p:sp>
-      <p:sp>
-        <p:nvSpPr>
-          <p:cNvPr id="3" name="Notes Placeholder 2"/>
-          <p:cNvSpPr>
-            <a:spLocks noGrp="1"/>
-          </p:cNvSpPr>
-          <p:nvPr>
-            <p:ph type="body" idx="1"/>
-          </p:nvPr>
-        </p:nvSpPr>
-        <p:spPr/>
-        <p:txBody>
-          <a:bodyPr/>
-          <a:lstStyle/>
-          <a:p>
-            <a:pPr marL="228600" indent="-228600">
-              <a:buAutoNum type="arabicParenR"/>
-            </a:pPr>
-            <a:r>
-              <a:rPr lang="en-US" dirty="0" smtClean="0"/>
-              <a:t>CEDD describes</a:t>
-            </a:r>
-            <a:r>
-              <a:rPr lang="en-US" baseline="0" dirty="0" smtClean="0"/>
-              <a:t> </a:t>
-            </a:r>
-            <a:r>
-              <a:rPr lang="en-US" baseline="0" dirty="0" err="1" smtClean="0"/>
-              <a:t>colour</a:t>
-            </a:r>
-            <a:r>
-              <a:rPr lang="en-US" baseline="0" dirty="0" smtClean="0"/>
-              <a:t> + texture, 144 dimensions</a:t>
-            </a:r>
-          </a:p>
-          <a:p>
-            <a:pPr marL="228600" indent="-228600">
-              <a:buAutoNum type="arabicParenR"/>
-            </a:pPr>
-            <a:r>
-              <a:rPr lang="en-US" dirty="0" smtClean="0"/>
-              <a:t>18 products with 256 clusters each</a:t>
-            </a:r>
-          </a:p>
-          <a:p>
-            <a:pPr marL="228600" indent="-228600">
-              <a:buAutoNum type="arabicParenR"/>
-            </a:pPr>
-            <a:r>
-              <a:rPr lang="en-US" dirty="0" smtClean="0"/>
-              <a:t>26</a:t>
-            </a:r>
-            <a:r>
-              <a:rPr lang="en-US" baseline="0" dirty="0" smtClean="0"/>
-              <a:t> bytes / image (18 for feature)</a:t>
-            </a:r>
-          </a:p>
-          <a:p>
-            <a:pPr marL="0" indent="0">
-              <a:buNone/>
-            </a:pPr>
-            <a:r>
-              <a:rPr lang="en-US" dirty="0" smtClean="0"/>
-              <a:t>Search: query</a:t>
-            </a:r>
-            <a:r>
-              <a:rPr lang="en-US" baseline="0" dirty="0" smtClean="0"/>
-              <a:t> = raw features, asymmetric distance, closest 100 images used</a:t>
-            </a:r>
-            <a:endParaRPr lang="en-US" dirty="0"/>
-          </a:p>
-        </p:txBody>
-      </p:sp>
-      <p:sp>
-        <p:nvSpPr>
-          <p:cNvPr id="4" name="Slide Number Placeholder 3"/>
-          <p:cNvSpPr>
-            <a:spLocks noGrp="1"/>
-          </p:cNvSpPr>
-          <p:nvPr>
-            <p:ph type="sldNum" sz="quarter" idx="10"/>
-          </p:nvPr>
-        </p:nvSpPr>
-        <p:spPr/>
-        <p:txBody>
-          <a:bodyPr/>
-          <a:lstStyle/>
-          <a:p>
-            <a:fld id="{909E9D34-1247-5948-955C-61F54B534A73}" type="slidenum">
-              <a:rPr lang="en-US" smtClean="0"/>
-              <a:t>8</a:t>
-            </a:fld>
-            <a:endParaRPr lang="en-US"/>
-          </a:p>
-        </p:txBody>
-      </p:sp>
-    </p:spTree>
-    <p:extLst>
-      <p:ext uri="{BB962C8B-B14F-4D97-AF65-F5344CB8AC3E}">
-        <p14:creationId xmlns:p14="http://schemas.microsoft.com/office/powerpoint/2010/main" val="1422346787"/>
-      </p:ext>
-    </p:extLst>
-  </p:cSld>
-  <p:clrMapOvr>
-    <a:masterClrMapping/>
-  </p:clrMapOvr>
-</p:notes>
-</file>
-
-<file path=ppt/notesSlides/notesSlide9.xml><?xml version="1.0" encoding="utf-8"?>
-<p:notes xmlns:a="http://schemas.openxmlformats.org/drawingml/2006/main" xmlns:r="http://schemas.openxmlformats.org/officeDocument/2006/relationships" xmlns:p="http://schemas.openxmlformats.org/presentationml/2006/main">
-  <p:cSld>
-    <p:spTree>
-      <p:nvGrpSpPr>
-        <p:cNvPr id="1" name=""/>
-        <p:cNvGrpSpPr/>
-        <p:nvPr/>
-      </p:nvGrpSpPr>
-      <p:grpSpPr>
-        <a:xfrm>
-          <a:off x="0" y="0"/>
-          <a:ext cx="0" cy="0"/>
-          <a:chOff x="0" y="0"/>
-          <a:chExt cx="0" cy="0"/>
-        </a:xfrm>
-      </p:grpSpPr>
-      <p:sp>
-        <p:nvSpPr>
-          <p:cNvPr id="2" name="Slide Image Placeholder 1"/>
-          <p:cNvSpPr>
-            <a:spLocks noGrp="1" noRot="1" noChangeAspect="1"/>
-          </p:cNvSpPr>
-          <p:nvPr>
-            <p:ph type="sldImg"/>
-          </p:nvPr>
-        </p:nvSpPr>
-        <p:spPr/>
-      </p:sp>
-      <p:sp>
-        <p:nvSpPr>
-          <p:cNvPr id="3" name="Notes Placeholder 2"/>
-          <p:cNvSpPr>
-            <a:spLocks noGrp="1"/>
-          </p:cNvSpPr>
-          <p:nvPr>
-            <p:ph type="body" idx="1"/>
-          </p:nvPr>
-        </p:nvSpPr>
-        <p:spPr/>
-        <p:txBody>
-          <a:bodyPr/>
-          <a:lstStyle/>
-          <a:p>
-            <a:r>
-              <a:rPr lang="en-US" dirty="0" smtClean="0"/>
-              <a:t>Super/sub sampling</a:t>
-            </a:r>
-          </a:p>
-          <a:p>
-            <a:r>
-              <a:rPr lang="en-US" dirty="0" smtClean="0"/>
-              <a:t>Each feature is given equal weight</a:t>
-            </a:r>
-          </a:p>
-          <a:p>
-            <a:r>
-              <a:rPr lang="en-US" dirty="0" smtClean="0"/>
-              <a:t>Matches with </a:t>
-            </a:r>
-            <a:r>
-              <a:rPr lang="en-US" dirty="0" err="1" smtClean="0"/>
-              <a:t>geonames</a:t>
-            </a:r>
-            <a:r>
-              <a:rPr lang="en-US" dirty="0" smtClean="0"/>
-              <a:t> place</a:t>
-            </a:r>
-            <a:r>
-              <a:rPr lang="en-US" baseline="0" dirty="0" smtClean="0"/>
-              <a:t> or alternate place name</a:t>
-            </a:r>
-            <a:endParaRPr lang="en-US" dirty="0"/>
-          </a:p>
-        </p:txBody>
-      </p:sp>
-      <p:sp>
-        <p:nvSpPr>
-          <p:cNvPr id="4" name="Slide Number Placeholder 3"/>
-          <p:cNvSpPr>
-            <a:spLocks noGrp="1"/>
-          </p:cNvSpPr>
-          <p:nvPr>
-            <p:ph type="sldNum" sz="quarter" idx="10"/>
-          </p:nvPr>
-        </p:nvSpPr>
-        <p:spPr/>
-        <p:txBody>
-          <a:bodyPr/>
-          <a:lstStyle/>
-          <a:p>
-            <a:fld id="{909E9D34-1247-5948-955C-61F54B534A73}" type="slidenum">
-              <a:rPr lang="en-US" smtClean="0"/>
-              <a:t>9</a:t>
-            </a:fld>
-            <a:endParaRPr lang="en-US"/>
-          </a:p>
-        </p:txBody>
-      </p:sp>
-    </p:spTree>
-    <p:extLst>
-      <p:ext uri="{BB962C8B-B14F-4D97-AF65-F5344CB8AC3E}">
-        <p14:creationId xmlns:p14="http://schemas.microsoft.com/office/powerpoint/2010/main" val="2656925330"/>
+        <p14:creationId xmlns:p14="http://schemas.microsoft.com/office/powerpoint/2010/main" val="685985644"/>
       </p:ext>
     </p:extLst>
   </p:cSld>
@@ -3876,7 +3599,7 @@
           <a:p>
             <a:r>
               <a:rPr lang="en-GB" dirty="0" smtClean="0"/>
-              <a:t>Placing Task</a:t>
+              <a:t>PLACING TASK</a:t>
             </a:r>
             <a:endParaRPr lang="en-GB" dirty="0"/>
           </a:p>
@@ -3910,7 +3633,7 @@
           <a:p>
             <a:r>
               <a:rPr lang="en-GB" dirty="0" smtClean="0"/>
-              <a:t>SOTON-WAIS</a:t>
+              <a:t>JAMIE DAVIES</a:t>
             </a:r>
             <a:endParaRPr lang="en-GB" dirty="0"/>
           </a:p>
@@ -3920,131 +3643,6 @@
     <p:extLst>
       <p:ext uri="{BB962C8B-B14F-4D97-AF65-F5344CB8AC3E}">
         <p14:creationId xmlns:p14="http://schemas.microsoft.com/office/powerpoint/2010/main" val="2978291759"/>
-      </p:ext>
-    </p:extLst>
-  </p:cSld>
-  <p:clrMapOvr>
-    <a:masterClrMapping/>
-  </p:clrMapOvr>
-  <p:timing>
-    <p:tnLst>
-      <p:par>
-        <p:cTn xmlns:p14="http://schemas.microsoft.com/office/powerpoint/2010/main" id="1" dur="indefinite" restart="never" nodeType="tmRoot"/>
-      </p:par>
-    </p:tnLst>
-  </p:timing>
-</p:sld>
-</file>
-
-<file path=ppt/slides/slide10.xml><?xml version="1.0" encoding="utf-8"?>
-<p:sld xmlns:a="http://schemas.openxmlformats.org/drawingml/2006/main" xmlns:r="http://schemas.openxmlformats.org/officeDocument/2006/relationships" xmlns:p="http://schemas.openxmlformats.org/presentationml/2006/main">
-  <p:cSld>
-    <p:spTree>
-      <p:nvGrpSpPr>
-        <p:cNvPr id="1" name=""/>
-        <p:cNvGrpSpPr/>
-        <p:nvPr/>
-      </p:nvGrpSpPr>
-      <p:grpSpPr>
-        <a:xfrm>
-          <a:off x="0" y="0"/>
-          <a:ext cx="0" cy="0"/>
-          <a:chOff x="0" y="0"/>
-          <a:chExt cx="0" cy="0"/>
-        </a:xfrm>
-      </p:grpSpPr>
-      <p:sp>
-        <p:nvSpPr>
-          <p:cNvPr id="2" name="Title 1"/>
-          <p:cNvSpPr>
-            <a:spLocks noGrp="1"/>
-          </p:cNvSpPr>
-          <p:nvPr>
-            <p:ph type="title"/>
-          </p:nvPr>
-        </p:nvSpPr>
-        <p:spPr/>
-        <p:txBody>
-          <a:bodyPr/>
-          <a:lstStyle/>
-          <a:p>
-            <a:r>
-              <a:rPr lang="en-US" dirty="0" smtClean="0"/>
-              <a:t>Runs &amp; Results</a:t>
-            </a:r>
-            <a:endParaRPr lang="en-US" dirty="0"/>
-          </a:p>
-        </p:txBody>
-      </p:sp>
-      <p:pic>
-        <p:nvPicPr>
-          <p:cNvPr id="5" name="Picture 4" descr="runs.png"/>
-          <p:cNvPicPr>
-            <a:picLocks noChangeAspect="1"/>
-          </p:cNvPicPr>
-          <p:nvPr/>
-        </p:nvPicPr>
-        <p:blipFill>
-          <a:blip r:embed="rId3">
-            <a:extLst>
-              <a:ext uri="{28A0092B-C50C-407E-A947-70E740481C1C}">
-                <a14:useLocalDpi xmlns:a14="http://schemas.microsoft.com/office/drawing/2010/main" val="0"/>
-              </a:ext>
-            </a:extLst>
-          </a:blip>
-          <a:stretch>
-            <a:fillRect/>
-          </a:stretch>
-        </p:blipFill>
-        <p:spPr>
-          <a:xfrm>
-            <a:off x="715202" y="1231443"/>
-            <a:ext cx="7713597" cy="2147828"/>
-          </a:xfrm>
-          <a:prstGeom prst="rect">
-            <a:avLst/>
-          </a:prstGeom>
-          <a:ln w="57150">
-            <a:solidFill>
-              <a:schemeClr val="tx1"/>
-            </a:solidFill>
-          </a:ln>
-        </p:spPr>
-      </p:pic>
-      <p:pic>
-        <p:nvPicPr>
-          <p:cNvPr id="6" name="Picture 5" descr="results.png"/>
-          <p:cNvPicPr>
-            <a:picLocks noChangeAspect="1"/>
-          </p:cNvPicPr>
-          <p:nvPr/>
-        </p:nvPicPr>
-        <p:blipFill>
-          <a:blip r:embed="rId4">
-            <a:extLst>
-              <a:ext uri="{28A0092B-C50C-407E-A947-70E740481C1C}">
-                <a14:useLocalDpi xmlns:a14="http://schemas.microsoft.com/office/drawing/2010/main" val="0"/>
-              </a:ext>
-            </a:extLst>
-          </a:blip>
-          <a:stretch>
-            <a:fillRect/>
-          </a:stretch>
-        </p:blipFill>
-        <p:spPr>
-          <a:xfrm>
-            <a:off x="54620" y="3414375"/>
-            <a:ext cx="9034760" cy="3235812"/>
-          </a:xfrm>
-          <a:prstGeom prst="rect">
-            <a:avLst/>
-          </a:prstGeom>
-        </p:spPr>
-      </p:pic>
-    </p:spTree>
-    <p:extLst>
-      <p:ext uri="{BB962C8B-B14F-4D97-AF65-F5344CB8AC3E}">
-        <p14:creationId xmlns:p14="http://schemas.microsoft.com/office/powerpoint/2010/main" val="723698124"/>
       </p:ext>
     </p:extLst>
   </p:cSld>
@@ -4131,406 +3729,7 @@
             </a:r>
             <a:r>
               <a:rPr lang="en-US" sz="2400" dirty="0" smtClean="0"/>
-              <a:t>&gt; </a:t>
-            </a:r>
-            <a:r>
-              <a:rPr lang="en-US" sz="2400" dirty="0" smtClean="0"/>
-              <a:t>pairs</a:t>
-            </a:r>
-          </a:p>
-        </p:txBody>
-      </p:sp>
-      <p:pic>
-        <p:nvPicPr>
-          <p:cNvPr id="4" name="Picture 3" descr="approach1.png"/>
-          <p:cNvPicPr>
-            <a:picLocks noChangeAspect="1"/>
-          </p:cNvPicPr>
-          <p:nvPr/>
-        </p:nvPicPr>
-        <p:blipFill>
-          <a:blip r:embed="rId3">
-            <a:extLst>
-              <a:ext uri="{28A0092B-C50C-407E-A947-70E740481C1C}">
-                <a14:useLocalDpi xmlns:a14="http://schemas.microsoft.com/office/drawing/2010/main" val="0"/>
-              </a:ext>
-            </a:extLst>
-          </a:blip>
-          <a:stretch>
-            <a:fillRect/>
-          </a:stretch>
-        </p:blipFill>
-        <p:spPr>
-          <a:xfrm>
-            <a:off x="802781" y="3559200"/>
-            <a:ext cx="2895600" cy="2171700"/>
-          </a:xfrm>
-          <a:prstGeom prst="rect">
-            <a:avLst/>
-          </a:prstGeom>
-        </p:spPr>
-      </p:pic>
-    </p:spTree>
-    <p:extLst>
-      <p:ext uri="{BB962C8B-B14F-4D97-AF65-F5344CB8AC3E}">
-        <p14:creationId xmlns:p14="http://schemas.microsoft.com/office/powerpoint/2010/main" val="702691376"/>
-      </p:ext>
-    </p:extLst>
-  </p:cSld>
-  <p:clrMapOvr>
-    <a:masterClrMapping/>
-  </p:clrMapOvr>
-  <p:timing>
-    <p:tnLst>
-      <p:par>
-        <p:cTn xmlns:p14="http://schemas.microsoft.com/office/powerpoint/2010/main" id="1" dur="indefinite" restart="never" nodeType="tmRoot"/>
-      </p:par>
-    </p:tnLst>
-  </p:timing>
-</p:sld>
-</file>
-
-<file path=ppt/slides/slide3.xml><?xml version="1.0" encoding="utf-8"?>
-<p:sld xmlns:a="http://schemas.openxmlformats.org/drawingml/2006/main" xmlns:r="http://schemas.openxmlformats.org/officeDocument/2006/relationships" xmlns:p="http://schemas.openxmlformats.org/presentationml/2006/main">
-  <p:cSld>
-    <p:spTree>
-      <p:nvGrpSpPr>
-        <p:cNvPr id="1" name=""/>
-        <p:cNvGrpSpPr/>
-        <p:nvPr/>
-      </p:nvGrpSpPr>
-      <p:grpSpPr>
-        <a:xfrm>
-          <a:off x="0" y="0"/>
-          <a:ext cx="0" cy="0"/>
-          <a:chOff x="0" y="0"/>
-          <a:chExt cx="0" cy="0"/>
-        </a:xfrm>
-      </p:grpSpPr>
-      <p:sp>
-        <p:nvSpPr>
-          <p:cNvPr id="2" name="Title 1"/>
-          <p:cNvSpPr>
-            <a:spLocks noGrp="1"/>
-          </p:cNvSpPr>
-          <p:nvPr>
-            <p:ph type="title"/>
-          </p:nvPr>
-        </p:nvSpPr>
-        <p:spPr/>
-        <p:txBody>
-          <a:bodyPr/>
-          <a:lstStyle/>
-          <a:p>
-            <a:r>
-              <a:rPr lang="en-US" dirty="0" smtClean="0"/>
-              <a:t>Approach</a:t>
-            </a:r>
-            <a:endParaRPr lang="en-US" dirty="0"/>
-          </a:p>
-        </p:txBody>
-      </p:sp>
-      <p:sp>
-        <p:nvSpPr>
-          <p:cNvPr id="3" name="Content Placeholder 2"/>
-          <p:cNvSpPr>
-            <a:spLocks noGrp="1"/>
-          </p:cNvSpPr>
-          <p:nvPr>
-            <p:ph idx="1"/>
-          </p:nvPr>
-        </p:nvSpPr>
-        <p:spPr>
-          <a:xfrm>
-            <a:off x="457200" y="1420255"/>
-            <a:ext cx="8229600" cy="4525963"/>
-          </a:xfrm>
-        </p:spPr>
-        <p:txBody>
-          <a:bodyPr/>
-          <a:lstStyle/>
-          <a:p>
-            <a:r>
-              <a:rPr lang="en-US" sz="2400" dirty="0" smtClean="0"/>
-              <a:t>Each feature provides a fixed-size set of &lt;</a:t>
-            </a:r>
-            <a:r>
-              <a:rPr lang="en-US" sz="2400" dirty="0" err="1" smtClean="0"/>
-              <a:t>lat,lng</a:t>
-            </a:r>
-            <a:r>
-              <a:rPr lang="en-US" sz="2400" dirty="0" smtClean="0"/>
-              <a:t>&gt; </a:t>
-            </a:r>
-            <a:r>
-              <a:rPr lang="en-US" sz="2400" dirty="0" smtClean="0"/>
-              <a:t>pairs</a:t>
-            </a:r>
-            <a:endParaRPr lang="en-US" sz="2400" dirty="0" smtClean="0"/>
-          </a:p>
-          <a:p>
-            <a:endParaRPr lang="en-US" dirty="0" smtClean="0"/>
-          </a:p>
-        </p:txBody>
-      </p:sp>
-      <p:pic>
-        <p:nvPicPr>
-          <p:cNvPr id="6" name="Picture 5" descr="approach2.png"/>
-          <p:cNvPicPr>
-            <a:picLocks noChangeAspect="1"/>
-          </p:cNvPicPr>
-          <p:nvPr/>
-        </p:nvPicPr>
-        <p:blipFill>
-          <a:blip r:embed="rId3">
-            <a:extLst>
-              <a:ext uri="{28A0092B-C50C-407E-A947-70E740481C1C}">
-                <a14:useLocalDpi xmlns:a14="http://schemas.microsoft.com/office/drawing/2010/main" val="0"/>
-              </a:ext>
-            </a:extLst>
-          </a:blip>
-          <a:stretch>
-            <a:fillRect/>
-          </a:stretch>
-        </p:blipFill>
-        <p:spPr>
-          <a:xfrm>
-            <a:off x="802781" y="3306243"/>
-            <a:ext cx="2946400" cy="2844800"/>
-          </a:xfrm>
-          <a:prstGeom prst="rect">
-            <a:avLst/>
-          </a:prstGeom>
-        </p:spPr>
-      </p:pic>
-    </p:spTree>
-    <p:extLst>
-      <p:ext uri="{BB962C8B-B14F-4D97-AF65-F5344CB8AC3E}">
-        <p14:creationId xmlns:p14="http://schemas.microsoft.com/office/powerpoint/2010/main" val="1051560484"/>
-      </p:ext>
-    </p:extLst>
-  </p:cSld>
-  <p:clrMapOvr>
-    <a:masterClrMapping/>
-  </p:clrMapOvr>
-  <p:timing>
-    <p:tnLst>
-      <p:par>
-        <p:cTn xmlns:p14="http://schemas.microsoft.com/office/powerpoint/2010/main" id="1" dur="indefinite" restart="never" nodeType="tmRoot"/>
-      </p:par>
-    </p:tnLst>
-  </p:timing>
-</p:sld>
-</file>
-
-<file path=ppt/slides/slide4.xml><?xml version="1.0" encoding="utf-8"?>
-<p:sld xmlns:a="http://schemas.openxmlformats.org/drawingml/2006/main" xmlns:r="http://schemas.openxmlformats.org/officeDocument/2006/relationships" xmlns:p="http://schemas.openxmlformats.org/presentationml/2006/main">
-  <p:cSld>
-    <p:spTree>
-      <p:nvGrpSpPr>
-        <p:cNvPr id="1" name=""/>
-        <p:cNvGrpSpPr/>
-        <p:nvPr/>
-      </p:nvGrpSpPr>
-      <p:grpSpPr>
-        <a:xfrm>
-          <a:off x="0" y="0"/>
-          <a:ext cx="0" cy="0"/>
-          <a:chOff x="0" y="0"/>
-          <a:chExt cx="0" cy="0"/>
-        </a:xfrm>
-      </p:grpSpPr>
-      <p:sp>
-        <p:nvSpPr>
-          <p:cNvPr id="2" name="Title 1"/>
-          <p:cNvSpPr>
-            <a:spLocks noGrp="1"/>
-          </p:cNvSpPr>
-          <p:nvPr>
-            <p:ph type="title"/>
-          </p:nvPr>
-        </p:nvSpPr>
-        <p:spPr/>
-        <p:txBody>
-          <a:bodyPr/>
-          <a:lstStyle/>
-          <a:p>
-            <a:r>
-              <a:rPr lang="en-US" dirty="0" smtClean="0"/>
-              <a:t>Approach</a:t>
-            </a:r>
-            <a:endParaRPr lang="en-US" dirty="0"/>
-          </a:p>
-        </p:txBody>
-      </p:sp>
-      <p:sp>
-        <p:nvSpPr>
-          <p:cNvPr id="3" name="Content Placeholder 2"/>
-          <p:cNvSpPr>
-            <a:spLocks noGrp="1"/>
-          </p:cNvSpPr>
-          <p:nvPr>
-            <p:ph idx="1"/>
-          </p:nvPr>
-        </p:nvSpPr>
-        <p:spPr>
-          <a:xfrm>
-            <a:off x="457200" y="1420255"/>
-            <a:ext cx="8229600" cy="4525963"/>
-          </a:xfrm>
-        </p:spPr>
-        <p:txBody>
-          <a:bodyPr/>
-          <a:lstStyle/>
-          <a:p>
-            <a:r>
-              <a:rPr lang="en-US" sz="2400" dirty="0" smtClean="0"/>
-              <a:t>Each feature provides a fixed-size set of &lt;</a:t>
-            </a:r>
-            <a:r>
-              <a:rPr lang="en-US" sz="2400" dirty="0" err="1" smtClean="0"/>
-              <a:t>lat,lng</a:t>
-            </a:r>
-            <a:r>
-              <a:rPr lang="en-US" sz="2400" dirty="0" smtClean="0"/>
-              <a:t>&gt; </a:t>
-            </a:r>
-            <a:r>
-              <a:rPr lang="en-US" sz="2400" dirty="0" smtClean="0"/>
-              <a:t>pairs</a:t>
-            </a:r>
-            <a:endParaRPr lang="en-US" sz="2400" dirty="0" smtClean="0"/>
-          </a:p>
-          <a:p>
-            <a:endParaRPr lang="en-US" dirty="0" smtClean="0"/>
-          </a:p>
-        </p:txBody>
-      </p:sp>
-      <p:pic>
-        <p:nvPicPr>
-          <p:cNvPr id="7" name="Picture 6" descr="approach3.png"/>
-          <p:cNvPicPr>
-            <a:picLocks noChangeAspect="1"/>
-          </p:cNvPicPr>
-          <p:nvPr/>
-        </p:nvPicPr>
-        <p:blipFill>
-          <a:blip r:embed="rId3">
-            <a:extLst>
-              <a:ext uri="{28A0092B-C50C-407E-A947-70E740481C1C}">
-                <a14:useLocalDpi xmlns:a14="http://schemas.microsoft.com/office/drawing/2010/main" val="0"/>
-              </a:ext>
-            </a:extLst>
-          </a:blip>
-          <a:stretch>
-            <a:fillRect/>
-          </a:stretch>
-        </p:blipFill>
-        <p:spPr>
-          <a:xfrm>
-            <a:off x="802781" y="3053893"/>
-            <a:ext cx="3390900" cy="3098800"/>
-          </a:xfrm>
-          <a:prstGeom prst="rect">
-            <a:avLst/>
-          </a:prstGeom>
-        </p:spPr>
-      </p:pic>
-    </p:spTree>
-    <p:extLst>
-      <p:ext uri="{BB962C8B-B14F-4D97-AF65-F5344CB8AC3E}">
-        <p14:creationId xmlns:p14="http://schemas.microsoft.com/office/powerpoint/2010/main" val="2076727453"/>
-      </p:ext>
-    </p:extLst>
-  </p:cSld>
-  <p:clrMapOvr>
-    <a:masterClrMapping/>
-  </p:clrMapOvr>
-  <p:timing>
-    <p:tnLst>
-      <p:par>
-        <p:cTn xmlns:p14="http://schemas.microsoft.com/office/powerpoint/2010/main" id="1" dur="indefinite" restart="never" nodeType="tmRoot"/>
-      </p:par>
-    </p:tnLst>
-  </p:timing>
-</p:sld>
-</file>
-
-<file path=ppt/slides/slide5.xml><?xml version="1.0" encoding="utf-8"?>
-<p:sld xmlns:a="http://schemas.openxmlformats.org/drawingml/2006/main" xmlns:r="http://schemas.openxmlformats.org/officeDocument/2006/relationships" xmlns:p="http://schemas.openxmlformats.org/presentationml/2006/main">
-  <p:cSld>
-    <p:spTree>
-      <p:nvGrpSpPr>
-        <p:cNvPr id="1" name=""/>
-        <p:cNvGrpSpPr/>
-        <p:nvPr/>
-      </p:nvGrpSpPr>
-      <p:grpSpPr>
-        <a:xfrm>
-          <a:off x="0" y="0"/>
-          <a:ext cx="0" cy="0"/>
-          <a:chOff x="0" y="0"/>
-          <a:chExt cx="0" cy="0"/>
-        </a:xfrm>
-      </p:grpSpPr>
-      <p:sp>
-        <p:nvSpPr>
-          <p:cNvPr id="2" name="Title 1"/>
-          <p:cNvSpPr>
-            <a:spLocks noGrp="1"/>
-          </p:cNvSpPr>
-          <p:nvPr>
-            <p:ph type="title"/>
-          </p:nvPr>
-        </p:nvSpPr>
-        <p:spPr/>
-        <p:txBody>
-          <a:bodyPr/>
-          <a:lstStyle/>
-          <a:p>
-            <a:r>
-              <a:rPr lang="en-US" dirty="0" smtClean="0"/>
-              <a:t>Approach</a:t>
-            </a:r>
-            <a:endParaRPr lang="en-US" dirty="0"/>
-          </a:p>
-        </p:txBody>
-      </p:sp>
-      <p:sp>
-        <p:nvSpPr>
-          <p:cNvPr id="3" name="Content Placeholder 2"/>
-          <p:cNvSpPr>
-            <a:spLocks noGrp="1"/>
-          </p:cNvSpPr>
-          <p:nvPr>
-            <p:ph idx="1"/>
-          </p:nvPr>
-        </p:nvSpPr>
-        <p:spPr>
-          <a:xfrm>
-            <a:off x="457200" y="1420255"/>
-            <a:ext cx="8229600" cy="4525963"/>
-          </a:xfrm>
-        </p:spPr>
-        <p:txBody>
-          <a:bodyPr/>
-          <a:lstStyle/>
-          <a:p>
-            <a:r>
-              <a:rPr lang="en-US" sz="2400" dirty="0" smtClean="0"/>
-              <a:t>Each feature provides a fixed-size set of &lt;</a:t>
-            </a:r>
-            <a:r>
-              <a:rPr lang="en-US" sz="2400" dirty="0" err="1" smtClean="0"/>
-              <a:t>lat,lng</a:t>
-            </a:r>
-            <a:r>
-              <a:rPr lang="en-US" sz="2400" dirty="0" smtClean="0"/>
-              <a:t>&gt; </a:t>
-            </a:r>
-            <a:r>
-              <a:rPr lang="en-US" sz="2400" dirty="0" smtClean="0"/>
-              <a:t>pairs</a:t>
+              <a:t>&gt; pairs</a:t>
             </a:r>
           </a:p>
           <a:p>
@@ -4542,7 +3741,6 @@
               <a:rPr lang="en-US" sz="2400" dirty="0" smtClean="0"/>
               <a:t>LOCATION</a:t>
             </a:r>
-            <a:endParaRPr lang="en-US" sz="2400" dirty="0" smtClean="0"/>
           </a:p>
           <a:p>
             <a:endParaRPr lang="en-US" dirty="0" smtClean="0"/>
@@ -4629,7 +3827,7 @@
 </p:sld>
 </file>
 
-<file path=ppt/slides/slide6.xml><?xml version="1.0" encoding="utf-8"?>
+<file path=ppt/slides/slide3.xml><?xml version="1.0" encoding="utf-8"?>
 <p:sld xmlns:a="http://schemas.openxmlformats.org/drawingml/2006/main" xmlns:r="http://schemas.openxmlformats.org/officeDocument/2006/relationships" xmlns:p="http://schemas.openxmlformats.org/presentationml/2006/main">
   <p:cSld>
     <p:spTree>
@@ -5334,7 +4532,7 @@
 </p:sld>
 </file>
 
-<file path=ppt/slides/slide7.xml><?xml version="1.0" encoding="utf-8"?>
+<file path=ppt/slides/slide4.xml><?xml version="1.0" encoding="utf-8"?>
 <p:sld xmlns:a="http://schemas.openxmlformats.org/drawingml/2006/main" xmlns:r="http://schemas.openxmlformats.org/officeDocument/2006/relationships" xmlns:p="http://schemas.openxmlformats.org/presentationml/2006/main">
   <p:cSld>
     <p:spTree>
@@ -5767,7 +4965,7 @@
 </p:sld>
 </file>
 
-<file path=ppt/slides/slide8.xml><?xml version="1.0" encoding="utf-8"?>
+<file path=ppt/slides/slide5.xml><?xml version="1.0" encoding="utf-8"?>
 <p:sld xmlns:a="http://schemas.openxmlformats.org/drawingml/2006/main" xmlns:r="http://schemas.openxmlformats.org/officeDocument/2006/relationships" xmlns:p="http://schemas.openxmlformats.org/presentationml/2006/main">
   <p:cSld>
     <p:spTree>
@@ -6200,7 +5398,7 @@
 </p:sld>
 </file>
 
-<file path=ppt/slides/slide9.xml><?xml version="1.0" encoding="utf-8"?>
+<file path=ppt/slides/slide6.xml><?xml version="1.0" encoding="utf-8"?>
 <p:sld xmlns:a="http://schemas.openxmlformats.org/drawingml/2006/main" xmlns:r="http://schemas.openxmlformats.org/officeDocument/2006/relationships" xmlns:p="http://schemas.openxmlformats.org/presentationml/2006/main">
   <p:cSld>
     <p:spTree>
@@ -6578,6 +5776,295 @@
     <p:bldLst>
       <p:bldP spid="5" grpId="0" animBg="1"/>
     </p:bldLst>
+  </p:timing>
+</p:sld>
+</file>
+
+<file path=ppt/slides/slide7.xml><?xml version="1.0" encoding="utf-8"?>
+<p:sld xmlns:a="http://schemas.openxmlformats.org/drawingml/2006/main" xmlns:r="http://schemas.openxmlformats.org/officeDocument/2006/relationships" xmlns:p="http://schemas.openxmlformats.org/presentationml/2006/main">
+  <p:cSld>
+    <p:spTree>
+      <p:nvGrpSpPr>
+        <p:cNvPr id="1" name=""/>
+        <p:cNvGrpSpPr/>
+        <p:nvPr/>
+      </p:nvGrpSpPr>
+      <p:grpSpPr>
+        <a:xfrm>
+          <a:off x="0" y="0"/>
+          <a:ext cx="0" cy="0"/>
+          <a:chOff x="0" y="0"/>
+          <a:chExt cx="0" cy="0"/>
+        </a:xfrm>
+      </p:grpSpPr>
+      <p:sp>
+        <p:nvSpPr>
+          <p:cNvPr id="2" name="Title 1"/>
+          <p:cNvSpPr>
+            <a:spLocks noGrp="1"/>
+          </p:cNvSpPr>
+          <p:nvPr>
+            <p:ph type="title"/>
+          </p:nvPr>
+        </p:nvSpPr>
+        <p:spPr/>
+        <p:txBody>
+          <a:bodyPr/>
+          <a:lstStyle/>
+          <a:p>
+            <a:r>
+              <a:rPr lang="en-US" dirty="0" smtClean="0"/>
+              <a:t>Runs &amp; Results</a:t>
+            </a:r>
+            <a:endParaRPr lang="en-US" dirty="0"/>
+          </a:p>
+        </p:txBody>
+      </p:sp>
+      <p:pic>
+        <p:nvPicPr>
+          <p:cNvPr id="5" name="Picture 4" descr="runs.png"/>
+          <p:cNvPicPr>
+            <a:picLocks noChangeAspect="1"/>
+          </p:cNvPicPr>
+          <p:nvPr/>
+        </p:nvPicPr>
+        <p:blipFill>
+          <a:blip r:embed="rId3">
+            <a:extLst>
+              <a:ext uri="{28A0092B-C50C-407E-A947-70E740481C1C}">
+                <a14:useLocalDpi xmlns:a14="http://schemas.microsoft.com/office/drawing/2010/main" val="0"/>
+              </a:ext>
+            </a:extLst>
+          </a:blip>
+          <a:stretch>
+            <a:fillRect/>
+          </a:stretch>
+        </p:blipFill>
+        <p:spPr>
+          <a:xfrm>
+            <a:off x="715202" y="1231443"/>
+            <a:ext cx="7713597" cy="2147828"/>
+          </a:xfrm>
+          <a:prstGeom prst="rect">
+            <a:avLst/>
+          </a:prstGeom>
+          <a:ln w="57150">
+            <a:solidFill>
+              <a:schemeClr val="tx1"/>
+            </a:solidFill>
+          </a:ln>
+        </p:spPr>
+      </p:pic>
+      <p:pic>
+        <p:nvPicPr>
+          <p:cNvPr id="6" name="Picture 5" descr="results.png"/>
+          <p:cNvPicPr>
+            <a:picLocks noChangeAspect="1"/>
+          </p:cNvPicPr>
+          <p:nvPr/>
+        </p:nvPicPr>
+        <p:blipFill>
+          <a:blip r:embed="rId4">
+            <a:extLst>
+              <a:ext uri="{28A0092B-C50C-407E-A947-70E740481C1C}">
+                <a14:useLocalDpi xmlns:a14="http://schemas.microsoft.com/office/drawing/2010/main" val="0"/>
+              </a:ext>
+            </a:extLst>
+          </a:blip>
+          <a:stretch>
+            <a:fillRect/>
+          </a:stretch>
+        </p:blipFill>
+        <p:spPr>
+          <a:xfrm>
+            <a:off x="54620" y="3414375"/>
+            <a:ext cx="9034760" cy="3235812"/>
+          </a:xfrm>
+          <a:prstGeom prst="rect">
+            <a:avLst/>
+          </a:prstGeom>
+        </p:spPr>
+      </p:pic>
+    </p:spTree>
+    <p:extLst>
+      <p:ext uri="{BB962C8B-B14F-4D97-AF65-F5344CB8AC3E}">
+        <p14:creationId xmlns:p14="http://schemas.microsoft.com/office/powerpoint/2010/main" val="723698124"/>
+      </p:ext>
+    </p:extLst>
+  </p:cSld>
+  <p:clrMapOvr>
+    <a:masterClrMapping/>
+  </p:clrMapOvr>
+  <p:timing>
+    <p:tnLst>
+      <p:par>
+        <p:cTn xmlns:p14="http://schemas.microsoft.com/office/powerpoint/2010/main" id="1" dur="indefinite" restart="never" nodeType="tmRoot"/>
+      </p:par>
+    </p:tnLst>
+  </p:timing>
+</p:sld>
+</file>
+
+<file path=ppt/slides/slide8.xml><?xml version="1.0" encoding="utf-8"?>
+<p:sld xmlns:a="http://schemas.openxmlformats.org/drawingml/2006/main" xmlns:r="http://schemas.openxmlformats.org/officeDocument/2006/relationships" xmlns:p="http://schemas.openxmlformats.org/presentationml/2006/main">
+  <p:cSld>
+    <p:spTree>
+      <p:nvGrpSpPr>
+        <p:cNvPr id="1" name=""/>
+        <p:cNvGrpSpPr/>
+        <p:nvPr/>
+      </p:nvGrpSpPr>
+      <p:grpSpPr>
+        <a:xfrm>
+          <a:off x="0" y="0"/>
+          <a:ext cx="0" cy="0"/>
+          <a:chOff x="0" y="0"/>
+          <a:chExt cx="0" cy="0"/>
+        </a:xfrm>
+      </p:grpSpPr>
+      <p:sp>
+        <p:nvSpPr>
+          <p:cNvPr id="2" name="Title 1"/>
+          <p:cNvSpPr>
+            <a:spLocks noGrp="1"/>
+          </p:cNvSpPr>
+          <p:nvPr>
+            <p:ph type="title"/>
+          </p:nvPr>
+        </p:nvSpPr>
+        <p:spPr/>
+        <p:txBody>
+          <a:bodyPr/>
+          <a:lstStyle/>
+          <a:p>
+            <a:r>
+              <a:rPr lang="en-US" dirty="0" smtClean="0"/>
+              <a:t>FUTURE WORK</a:t>
+            </a:r>
+            <a:endParaRPr lang="en-US" dirty="0"/>
+          </a:p>
+        </p:txBody>
+      </p:sp>
+      <p:sp>
+        <p:nvSpPr>
+          <p:cNvPr id="3" name="Content Placeholder 2"/>
+          <p:cNvSpPr>
+            <a:spLocks noGrp="1"/>
+          </p:cNvSpPr>
+          <p:nvPr>
+            <p:ph idx="1"/>
+          </p:nvPr>
+        </p:nvSpPr>
+        <p:spPr/>
+        <p:txBody>
+          <a:bodyPr/>
+          <a:lstStyle/>
+          <a:p>
+            <a:r>
+              <a:rPr lang="en-US" dirty="0" smtClean="0"/>
+              <a:t>Why were visual features so bad?</a:t>
+            </a:r>
+          </a:p>
+          <a:p>
+            <a:r>
+              <a:rPr lang="en-US" dirty="0" smtClean="0"/>
+              <a:t>Further experiments using just SIFT features</a:t>
+            </a:r>
+          </a:p>
+          <a:p>
+            <a:r>
+              <a:rPr lang="en-US" dirty="0" smtClean="0"/>
+              <a:t>Experiment with different uses of external data, such as </a:t>
+            </a:r>
+            <a:r>
+              <a:rPr lang="en-US" dirty="0" err="1" smtClean="0"/>
+              <a:t>geonames</a:t>
+            </a:r>
+            <a:endParaRPr lang="en-US" dirty="0" smtClean="0"/>
+          </a:p>
+        </p:txBody>
+      </p:sp>
+    </p:spTree>
+    <p:extLst>
+      <p:ext uri="{BB962C8B-B14F-4D97-AF65-F5344CB8AC3E}">
+        <p14:creationId xmlns:p14="http://schemas.microsoft.com/office/powerpoint/2010/main" val="2083802015"/>
+      </p:ext>
+    </p:extLst>
+  </p:cSld>
+  <p:clrMapOvr>
+    <a:masterClrMapping/>
+  </p:clrMapOvr>
+  <p:timing>
+    <p:tnLst>
+      <p:par>
+        <p:cTn xmlns:p14="http://schemas.microsoft.com/office/powerpoint/2010/main" id="1" dur="indefinite" restart="never" nodeType="tmRoot"/>
+      </p:par>
+    </p:tnLst>
+  </p:timing>
+</p:sld>
+</file>
+
+<file path=ppt/slides/slide9.xml><?xml version="1.0" encoding="utf-8"?>
+<p:sld xmlns:a="http://schemas.openxmlformats.org/drawingml/2006/main" xmlns:r="http://schemas.openxmlformats.org/officeDocument/2006/relationships" xmlns:p="http://schemas.openxmlformats.org/presentationml/2006/main">
+  <p:cSld>
+    <p:spTree>
+      <p:nvGrpSpPr>
+        <p:cNvPr id="1" name=""/>
+        <p:cNvGrpSpPr/>
+        <p:nvPr/>
+      </p:nvGrpSpPr>
+      <p:grpSpPr>
+        <a:xfrm>
+          <a:off x="0" y="0"/>
+          <a:ext cx="0" cy="0"/>
+          <a:chOff x="0" y="0"/>
+          <a:chExt cx="0" cy="0"/>
+        </a:xfrm>
+      </p:grpSpPr>
+      <p:sp>
+        <p:nvSpPr>
+          <p:cNvPr id="2" name="Title 1"/>
+          <p:cNvSpPr>
+            <a:spLocks noGrp="1"/>
+          </p:cNvSpPr>
+          <p:nvPr>
+            <p:ph type="title"/>
+          </p:nvPr>
+        </p:nvSpPr>
+        <p:spPr>
+          <a:xfrm>
+            <a:off x="457200" y="2458758"/>
+            <a:ext cx="8229600" cy="1143000"/>
+          </a:xfrm>
+        </p:spPr>
+        <p:txBody>
+          <a:bodyPr/>
+          <a:lstStyle/>
+          <a:p>
+            <a:r>
+              <a:rPr lang="en-US" dirty="0" smtClean="0"/>
+              <a:t>Questions?</a:t>
+            </a:r>
+            <a:endParaRPr lang="en-US" dirty="0"/>
+          </a:p>
+        </p:txBody>
+      </p:sp>
+    </p:spTree>
+    <p:extLst>
+      <p:ext uri="{BB962C8B-B14F-4D97-AF65-F5344CB8AC3E}">
+        <p14:creationId xmlns:p14="http://schemas.microsoft.com/office/powerpoint/2010/main" val="3811083936"/>
+      </p:ext>
+    </p:extLst>
+  </p:cSld>
+  <p:clrMapOvr>
+    <a:masterClrMapping/>
+  </p:clrMapOvr>
+  <p:timing>
+    <p:tnLst>
+      <p:par>
+        <p:cTn xmlns:p14="http://schemas.microsoft.com/office/powerpoint/2010/main" id="1" dur="indefinite" restart="never" nodeType="tmRoot"/>
+      </p:par>
+    </p:tnLst>
   </p:timing>
 </p:sld>
 </file>

</xml_diff>

<commit_message>
Added prior map to placing slides.
</commit_message>
<xml_diff>
--- a/presentations/placing.pptx
+++ b/presentations/placing.pptx
@@ -5,18 +5,23 @@
     <p:sldMasterId id="2147483648" r:id="rId1"/>
   </p:sldMasterIdLst>
   <p:notesMasterIdLst>
-    <p:notesMasterId r:id="rId11"/>
+    <p:notesMasterId r:id="rId16"/>
   </p:notesMasterIdLst>
   <p:sldIdLst>
     <p:sldId id="256" r:id="rId2"/>
     <p:sldId id="267" r:id="rId3"/>
     <p:sldId id="258" r:id="rId4"/>
-    <p:sldId id="259" r:id="rId5"/>
-    <p:sldId id="268" r:id="rId6"/>
-    <p:sldId id="260" r:id="rId7"/>
-    <p:sldId id="261" r:id="rId8"/>
-    <p:sldId id="269" r:id="rId9"/>
-    <p:sldId id="270" r:id="rId10"/>
+    <p:sldId id="271" r:id="rId5"/>
+    <p:sldId id="259" r:id="rId6"/>
+    <p:sldId id="268" r:id="rId7"/>
+    <p:sldId id="260" r:id="rId8"/>
+    <p:sldId id="261" r:id="rId9"/>
+    <p:sldId id="272" r:id="rId10"/>
+    <p:sldId id="273" r:id="rId11"/>
+    <p:sldId id="274" r:id="rId12"/>
+    <p:sldId id="275" r:id="rId13"/>
+    <p:sldId id="269" r:id="rId14"/>
+    <p:sldId id="270" r:id="rId15"/>
   </p:sldIdLst>
   <p:sldSz cx="9144000" cy="6858000" type="screen4x3"/>
   <p:notesSz cx="6858000" cy="9144000"/>
@@ -200,7 +205,7 @@
           <a:p>
             <a:fld id="{E1D0BDDC-64E4-7044-8051-D0FCB9FAE0F1}" type="datetimeFigureOut">
               <a:rPr lang="en-US" smtClean="0"/>
-              <a:t>16/10/2013</a:t>
+              <a:t>18/10/2013</a:t>
             </a:fld>
             <a:endParaRPr lang="en-US"/>
           </a:p>
@@ -577,6 +582,747 @@
 </p:notes>
 </file>
 
+<file path=ppt/notesSlides/notesSlide10.xml><?xml version="1.0" encoding="utf-8"?>
+<p:notes xmlns:a="http://schemas.openxmlformats.org/drawingml/2006/main" xmlns:r="http://schemas.openxmlformats.org/officeDocument/2006/relationships" xmlns:p="http://schemas.openxmlformats.org/presentationml/2006/main">
+  <p:cSld>
+    <p:spTree>
+      <p:nvGrpSpPr>
+        <p:cNvPr id="1" name=""/>
+        <p:cNvGrpSpPr/>
+        <p:nvPr/>
+      </p:nvGrpSpPr>
+      <p:grpSpPr>
+        <a:xfrm>
+          <a:off x="0" y="0"/>
+          <a:ext cx="0" cy="0"/>
+          <a:chOff x="0" y="0"/>
+          <a:chExt cx="0" cy="0"/>
+        </a:xfrm>
+      </p:grpSpPr>
+      <p:sp>
+        <p:nvSpPr>
+          <p:cNvPr id="2" name="Slide Image Placeholder 1"/>
+          <p:cNvSpPr>
+            <a:spLocks noGrp="1" noRot="1" noChangeAspect="1"/>
+          </p:cNvSpPr>
+          <p:nvPr>
+            <p:ph type="sldImg"/>
+          </p:nvPr>
+        </p:nvSpPr>
+        <p:spPr/>
+      </p:sp>
+      <p:sp>
+        <p:nvSpPr>
+          <p:cNvPr id="3" name="Notes Placeholder 2"/>
+          <p:cNvSpPr>
+            <a:spLocks noGrp="1"/>
+          </p:cNvSpPr>
+          <p:nvPr>
+            <p:ph type="body" idx="1"/>
+          </p:nvPr>
+        </p:nvSpPr>
+        <p:spPr/>
+        <p:txBody>
+          <a:bodyPr/>
+          <a:lstStyle/>
+          <a:p>
+            <a:pPr marL="0" marR="0" indent="0" algn="l" defTabSz="457200" rtl="0" eaLnBrk="1" fontAlgn="auto" latinLnBrk="0" hangingPunct="1">
+              <a:lnSpc>
+                <a:spcPct val="100000"/>
+              </a:lnSpc>
+              <a:spcBef>
+                <a:spcPts val="0"/>
+              </a:spcBef>
+              <a:spcAft>
+                <a:spcPts val="0"/>
+              </a:spcAft>
+              <a:buClrTx/>
+              <a:buSzTx/>
+              <a:buFontTx/>
+              <a:buNone/>
+              <a:tabLst/>
+              <a:defRPr/>
+            </a:pPr>
+            <a:r>
+              <a:rPr lang="en-US" dirty="0" smtClean="0"/>
+              <a:t>Run 4 uses</a:t>
+            </a:r>
+            <a:r>
+              <a:rPr lang="en-US" baseline="0" dirty="0" smtClean="0"/>
+              <a:t> </a:t>
+            </a:r>
+            <a:r>
+              <a:rPr lang="en-US" sz="1200" kern="1200" dirty="0" smtClean="0">
+                <a:solidFill>
+                  <a:schemeClr val="tx1"/>
+                </a:solidFill>
+                <a:effectLst/>
+                <a:latin typeface="+mn-lt"/>
+                <a:ea typeface="+mn-ea"/>
+                <a:cs typeface="+mn-cs"/>
+              </a:rPr>
+              <a:t>larger dataset of GEOTAGGED </a:t>
+            </a:r>
+            <a:r>
+              <a:rPr lang="en-US" sz="1200" kern="1200" dirty="0" err="1" smtClean="0">
+                <a:solidFill>
+                  <a:schemeClr val="tx1"/>
+                </a:solidFill>
+                <a:effectLst/>
+                <a:latin typeface="+mn-lt"/>
+                <a:ea typeface="+mn-ea"/>
+                <a:cs typeface="+mn-cs"/>
+              </a:rPr>
+              <a:t>flickr</a:t>
+            </a:r>
+            <a:r>
+              <a:rPr lang="en-US" sz="1200" kern="1200" dirty="0" smtClean="0">
+                <a:solidFill>
+                  <a:schemeClr val="tx1"/>
+                </a:solidFill>
+                <a:effectLst/>
+                <a:latin typeface="+mn-lt"/>
+                <a:ea typeface="+mn-ea"/>
+                <a:cs typeface="+mn-cs"/>
+              </a:rPr>
+              <a:t> images crawled independently. All images from the set of users from the query images were removed from this dataset to keep to the spirit of the task.</a:t>
+            </a:r>
+          </a:p>
+          <a:p>
+            <a:pPr marL="0" marR="0" indent="0" algn="l" defTabSz="457200" rtl="0" eaLnBrk="1" fontAlgn="auto" latinLnBrk="0" hangingPunct="1">
+              <a:lnSpc>
+                <a:spcPct val="100000"/>
+              </a:lnSpc>
+              <a:spcBef>
+                <a:spcPts val="0"/>
+              </a:spcBef>
+              <a:spcAft>
+                <a:spcPts val="0"/>
+              </a:spcAft>
+              <a:buClrTx/>
+              <a:buSzTx/>
+              <a:buFontTx/>
+              <a:buNone/>
+              <a:tabLst/>
+              <a:defRPr/>
+            </a:pPr>
+            <a:r>
+              <a:rPr lang="en-US" sz="1200" kern="1200" dirty="0" err="1" smtClean="0">
+                <a:solidFill>
+                  <a:schemeClr val="tx1"/>
+                </a:solidFill>
+                <a:effectLst/>
+                <a:latin typeface="+mn-lt"/>
+                <a:ea typeface="+mn-ea"/>
+                <a:cs typeface="+mn-cs"/>
+              </a:rPr>
+              <a:t>Geonames</a:t>
+            </a:r>
+            <a:r>
+              <a:rPr lang="en-US" sz="1200" kern="1200" baseline="0" dirty="0" smtClean="0">
+                <a:solidFill>
+                  <a:schemeClr val="tx1"/>
+                </a:solidFill>
+                <a:effectLst/>
+                <a:latin typeface="+mn-lt"/>
+                <a:ea typeface="+mn-ea"/>
+                <a:cs typeface="+mn-cs"/>
+              </a:rPr>
+              <a:t> provides helpful boost</a:t>
+            </a:r>
+            <a:endParaRPr lang="en-US" sz="1200" kern="1200" dirty="0" smtClean="0">
+              <a:solidFill>
+                <a:schemeClr val="tx1"/>
+              </a:solidFill>
+              <a:effectLst/>
+              <a:latin typeface="+mn-lt"/>
+              <a:ea typeface="+mn-ea"/>
+              <a:cs typeface="+mn-cs"/>
+            </a:endParaRPr>
+          </a:p>
+          <a:p>
+            <a:pPr marL="0" marR="0" indent="0" algn="l" defTabSz="457200" rtl="0" eaLnBrk="1" fontAlgn="auto" latinLnBrk="0" hangingPunct="1">
+              <a:lnSpc>
+                <a:spcPct val="100000"/>
+              </a:lnSpc>
+              <a:spcBef>
+                <a:spcPts val="0"/>
+              </a:spcBef>
+              <a:spcAft>
+                <a:spcPts val="0"/>
+              </a:spcAft>
+              <a:buClrTx/>
+              <a:buSzTx/>
+              <a:buFontTx/>
+              <a:buNone/>
+              <a:tabLst/>
+              <a:defRPr/>
+            </a:pPr>
+            <a:r>
+              <a:rPr lang="en-US" dirty="0" smtClean="0"/>
+              <a:t>Using just tags seems most effective</a:t>
+            </a:r>
+            <a:r>
+              <a:rPr lang="en-US" baseline="0" dirty="0" smtClean="0"/>
+              <a:t> (run 3)</a:t>
+            </a:r>
+          </a:p>
+          <a:p>
+            <a:pPr marL="0" marR="0" indent="0" algn="l" defTabSz="457200" rtl="0" eaLnBrk="1" fontAlgn="auto" latinLnBrk="0" hangingPunct="1">
+              <a:lnSpc>
+                <a:spcPct val="100000"/>
+              </a:lnSpc>
+              <a:spcBef>
+                <a:spcPts val="0"/>
+              </a:spcBef>
+              <a:spcAft>
+                <a:spcPts val="0"/>
+              </a:spcAft>
+              <a:buClrTx/>
+              <a:buSzTx/>
+              <a:buFontTx/>
+              <a:buNone/>
+              <a:tabLst/>
+              <a:defRPr/>
+            </a:pPr>
+            <a:r>
+              <a:rPr lang="en-US" baseline="0" dirty="0" smtClean="0"/>
+              <a:t>Big dataset helps (run 4)</a:t>
+            </a:r>
+            <a:endParaRPr lang="en-US" dirty="0" smtClean="0"/>
+          </a:p>
+        </p:txBody>
+      </p:sp>
+      <p:sp>
+        <p:nvSpPr>
+          <p:cNvPr id="4" name="Slide Number Placeholder 3"/>
+          <p:cNvSpPr>
+            <a:spLocks noGrp="1"/>
+          </p:cNvSpPr>
+          <p:nvPr>
+            <p:ph type="sldNum" sz="quarter" idx="10"/>
+          </p:nvPr>
+        </p:nvSpPr>
+        <p:spPr/>
+        <p:txBody>
+          <a:bodyPr/>
+          <a:lstStyle/>
+          <a:p>
+            <a:fld id="{909E9D34-1247-5948-955C-61F54B534A73}" type="slidenum">
+              <a:rPr lang="en-US" smtClean="0"/>
+              <a:t>10</a:t>
+            </a:fld>
+            <a:endParaRPr lang="en-US"/>
+          </a:p>
+        </p:txBody>
+      </p:sp>
+    </p:spTree>
+    <p:extLst>
+      <p:ext uri="{BB962C8B-B14F-4D97-AF65-F5344CB8AC3E}">
+        <p14:creationId xmlns:p14="http://schemas.microsoft.com/office/powerpoint/2010/main" val="685985644"/>
+      </p:ext>
+    </p:extLst>
+  </p:cSld>
+  <p:clrMapOvr>
+    <a:masterClrMapping/>
+  </p:clrMapOvr>
+</p:notes>
+</file>
+
+<file path=ppt/notesSlides/notesSlide11.xml><?xml version="1.0" encoding="utf-8"?>
+<p:notes xmlns:a="http://schemas.openxmlformats.org/drawingml/2006/main" xmlns:r="http://schemas.openxmlformats.org/officeDocument/2006/relationships" xmlns:p="http://schemas.openxmlformats.org/presentationml/2006/main">
+  <p:cSld>
+    <p:spTree>
+      <p:nvGrpSpPr>
+        <p:cNvPr id="1" name=""/>
+        <p:cNvGrpSpPr/>
+        <p:nvPr/>
+      </p:nvGrpSpPr>
+      <p:grpSpPr>
+        <a:xfrm>
+          <a:off x="0" y="0"/>
+          <a:ext cx="0" cy="0"/>
+          <a:chOff x="0" y="0"/>
+          <a:chExt cx="0" cy="0"/>
+        </a:xfrm>
+      </p:grpSpPr>
+      <p:sp>
+        <p:nvSpPr>
+          <p:cNvPr id="2" name="Slide Image Placeholder 1"/>
+          <p:cNvSpPr>
+            <a:spLocks noGrp="1" noRot="1" noChangeAspect="1"/>
+          </p:cNvSpPr>
+          <p:nvPr>
+            <p:ph type="sldImg"/>
+          </p:nvPr>
+        </p:nvSpPr>
+        <p:spPr/>
+      </p:sp>
+      <p:sp>
+        <p:nvSpPr>
+          <p:cNvPr id="3" name="Notes Placeholder 2"/>
+          <p:cNvSpPr>
+            <a:spLocks noGrp="1"/>
+          </p:cNvSpPr>
+          <p:nvPr>
+            <p:ph type="body" idx="1"/>
+          </p:nvPr>
+        </p:nvSpPr>
+        <p:spPr/>
+        <p:txBody>
+          <a:bodyPr/>
+          <a:lstStyle/>
+          <a:p>
+            <a:pPr marL="0" marR="0" indent="0" algn="l" defTabSz="457200" rtl="0" eaLnBrk="1" fontAlgn="auto" latinLnBrk="0" hangingPunct="1">
+              <a:lnSpc>
+                <a:spcPct val="100000"/>
+              </a:lnSpc>
+              <a:spcBef>
+                <a:spcPts val="0"/>
+              </a:spcBef>
+              <a:spcAft>
+                <a:spcPts val="0"/>
+              </a:spcAft>
+              <a:buClrTx/>
+              <a:buSzTx/>
+              <a:buFontTx/>
+              <a:buNone/>
+              <a:tabLst/>
+              <a:defRPr/>
+            </a:pPr>
+            <a:r>
+              <a:rPr lang="en-US" dirty="0" smtClean="0"/>
+              <a:t>Run 4 uses</a:t>
+            </a:r>
+            <a:r>
+              <a:rPr lang="en-US" baseline="0" dirty="0" smtClean="0"/>
+              <a:t> </a:t>
+            </a:r>
+            <a:r>
+              <a:rPr lang="en-US" sz="1200" kern="1200" dirty="0" smtClean="0">
+                <a:solidFill>
+                  <a:schemeClr val="tx1"/>
+                </a:solidFill>
+                <a:effectLst/>
+                <a:latin typeface="+mn-lt"/>
+                <a:ea typeface="+mn-ea"/>
+                <a:cs typeface="+mn-cs"/>
+              </a:rPr>
+              <a:t>larger dataset of GEOTAGGED </a:t>
+            </a:r>
+            <a:r>
+              <a:rPr lang="en-US" sz="1200" kern="1200" dirty="0" err="1" smtClean="0">
+                <a:solidFill>
+                  <a:schemeClr val="tx1"/>
+                </a:solidFill>
+                <a:effectLst/>
+                <a:latin typeface="+mn-lt"/>
+                <a:ea typeface="+mn-ea"/>
+                <a:cs typeface="+mn-cs"/>
+              </a:rPr>
+              <a:t>flickr</a:t>
+            </a:r>
+            <a:r>
+              <a:rPr lang="en-US" sz="1200" kern="1200" dirty="0" smtClean="0">
+                <a:solidFill>
+                  <a:schemeClr val="tx1"/>
+                </a:solidFill>
+                <a:effectLst/>
+                <a:latin typeface="+mn-lt"/>
+                <a:ea typeface="+mn-ea"/>
+                <a:cs typeface="+mn-cs"/>
+              </a:rPr>
+              <a:t> images crawled independently. All images from the set of users from the query images were removed from this dataset to keep to the spirit of the task.</a:t>
+            </a:r>
+          </a:p>
+          <a:p>
+            <a:pPr marL="0" marR="0" indent="0" algn="l" defTabSz="457200" rtl="0" eaLnBrk="1" fontAlgn="auto" latinLnBrk="0" hangingPunct="1">
+              <a:lnSpc>
+                <a:spcPct val="100000"/>
+              </a:lnSpc>
+              <a:spcBef>
+                <a:spcPts val="0"/>
+              </a:spcBef>
+              <a:spcAft>
+                <a:spcPts val="0"/>
+              </a:spcAft>
+              <a:buClrTx/>
+              <a:buSzTx/>
+              <a:buFontTx/>
+              <a:buNone/>
+              <a:tabLst/>
+              <a:defRPr/>
+            </a:pPr>
+            <a:r>
+              <a:rPr lang="en-US" sz="1200" kern="1200" dirty="0" err="1" smtClean="0">
+                <a:solidFill>
+                  <a:schemeClr val="tx1"/>
+                </a:solidFill>
+                <a:effectLst/>
+                <a:latin typeface="+mn-lt"/>
+                <a:ea typeface="+mn-ea"/>
+                <a:cs typeface="+mn-cs"/>
+              </a:rPr>
+              <a:t>Geonames</a:t>
+            </a:r>
+            <a:r>
+              <a:rPr lang="en-US" sz="1200" kern="1200" baseline="0" dirty="0" smtClean="0">
+                <a:solidFill>
+                  <a:schemeClr val="tx1"/>
+                </a:solidFill>
+                <a:effectLst/>
+                <a:latin typeface="+mn-lt"/>
+                <a:ea typeface="+mn-ea"/>
+                <a:cs typeface="+mn-cs"/>
+              </a:rPr>
+              <a:t> provides helpful boost</a:t>
+            </a:r>
+            <a:endParaRPr lang="en-US" sz="1200" kern="1200" dirty="0" smtClean="0">
+              <a:solidFill>
+                <a:schemeClr val="tx1"/>
+              </a:solidFill>
+              <a:effectLst/>
+              <a:latin typeface="+mn-lt"/>
+              <a:ea typeface="+mn-ea"/>
+              <a:cs typeface="+mn-cs"/>
+            </a:endParaRPr>
+          </a:p>
+          <a:p>
+            <a:pPr marL="0" marR="0" indent="0" algn="l" defTabSz="457200" rtl="0" eaLnBrk="1" fontAlgn="auto" latinLnBrk="0" hangingPunct="1">
+              <a:lnSpc>
+                <a:spcPct val="100000"/>
+              </a:lnSpc>
+              <a:spcBef>
+                <a:spcPts val="0"/>
+              </a:spcBef>
+              <a:spcAft>
+                <a:spcPts val="0"/>
+              </a:spcAft>
+              <a:buClrTx/>
+              <a:buSzTx/>
+              <a:buFontTx/>
+              <a:buNone/>
+              <a:tabLst/>
+              <a:defRPr/>
+            </a:pPr>
+            <a:r>
+              <a:rPr lang="en-US" dirty="0" smtClean="0"/>
+              <a:t>Using just tags seems most effective</a:t>
+            </a:r>
+            <a:r>
+              <a:rPr lang="en-US" baseline="0" dirty="0" smtClean="0"/>
+              <a:t> (run 3)</a:t>
+            </a:r>
+          </a:p>
+          <a:p>
+            <a:pPr marL="0" marR="0" indent="0" algn="l" defTabSz="457200" rtl="0" eaLnBrk="1" fontAlgn="auto" latinLnBrk="0" hangingPunct="1">
+              <a:lnSpc>
+                <a:spcPct val="100000"/>
+              </a:lnSpc>
+              <a:spcBef>
+                <a:spcPts val="0"/>
+              </a:spcBef>
+              <a:spcAft>
+                <a:spcPts val="0"/>
+              </a:spcAft>
+              <a:buClrTx/>
+              <a:buSzTx/>
+              <a:buFontTx/>
+              <a:buNone/>
+              <a:tabLst/>
+              <a:defRPr/>
+            </a:pPr>
+            <a:r>
+              <a:rPr lang="en-US" baseline="0" dirty="0" smtClean="0"/>
+              <a:t>Big dataset helps (run 4)</a:t>
+            </a:r>
+            <a:endParaRPr lang="en-US" dirty="0" smtClean="0"/>
+          </a:p>
+        </p:txBody>
+      </p:sp>
+      <p:sp>
+        <p:nvSpPr>
+          <p:cNvPr id="4" name="Slide Number Placeholder 3"/>
+          <p:cNvSpPr>
+            <a:spLocks noGrp="1"/>
+          </p:cNvSpPr>
+          <p:nvPr>
+            <p:ph type="sldNum" sz="quarter" idx="10"/>
+          </p:nvPr>
+        </p:nvSpPr>
+        <p:spPr/>
+        <p:txBody>
+          <a:bodyPr/>
+          <a:lstStyle/>
+          <a:p>
+            <a:fld id="{909E9D34-1247-5948-955C-61F54B534A73}" type="slidenum">
+              <a:rPr lang="en-US" smtClean="0"/>
+              <a:t>11</a:t>
+            </a:fld>
+            <a:endParaRPr lang="en-US"/>
+          </a:p>
+        </p:txBody>
+      </p:sp>
+    </p:spTree>
+    <p:extLst>
+      <p:ext uri="{BB962C8B-B14F-4D97-AF65-F5344CB8AC3E}">
+        <p14:creationId xmlns:p14="http://schemas.microsoft.com/office/powerpoint/2010/main" val="685985644"/>
+      </p:ext>
+    </p:extLst>
+  </p:cSld>
+  <p:clrMapOvr>
+    <a:masterClrMapping/>
+  </p:clrMapOvr>
+</p:notes>
+</file>
+
+<file path=ppt/notesSlides/notesSlide12.xml><?xml version="1.0" encoding="utf-8"?>
+<p:notes xmlns:a="http://schemas.openxmlformats.org/drawingml/2006/main" xmlns:r="http://schemas.openxmlformats.org/officeDocument/2006/relationships" xmlns:p="http://schemas.openxmlformats.org/presentationml/2006/main">
+  <p:cSld>
+    <p:spTree>
+      <p:nvGrpSpPr>
+        <p:cNvPr id="1" name=""/>
+        <p:cNvGrpSpPr/>
+        <p:nvPr/>
+      </p:nvGrpSpPr>
+      <p:grpSpPr>
+        <a:xfrm>
+          <a:off x="0" y="0"/>
+          <a:ext cx="0" cy="0"/>
+          <a:chOff x="0" y="0"/>
+          <a:chExt cx="0" cy="0"/>
+        </a:xfrm>
+      </p:grpSpPr>
+      <p:sp>
+        <p:nvSpPr>
+          <p:cNvPr id="2" name="Slide Image Placeholder 1"/>
+          <p:cNvSpPr>
+            <a:spLocks noGrp="1" noRot="1" noChangeAspect="1"/>
+          </p:cNvSpPr>
+          <p:nvPr>
+            <p:ph type="sldImg"/>
+          </p:nvPr>
+        </p:nvSpPr>
+        <p:spPr/>
+      </p:sp>
+      <p:sp>
+        <p:nvSpPr>
+          <p:cNvPr id="3" name="Notes Placeholder 2"/>
+          <p:cNvSpPr>
+            <a:spLocks noGrp="1"/>
+          </p:cNvSpPr>
+          <p:nvPr>
+            <p:ph type="body" idx="1"/>
+          </p:nvPr>
+        </p:nvSpPr>
+        <p:spPr/>
+        <p:txBody>
+          <a:bodyPr/>
+          <a:lstStyle/>
+          <a:p>
+            <a:pPr marL="0" marR="0" indent="0" algn="l" defTabSz="457200" rtl="0" eaLnBrk="1" fontAlgn="auto" latinLnBrk="0" hangingPunct="1">
+              <a:lnSpc>
+                <a:spcPct val="100000"/>
+              </a:lnSpc>
+              <a:spcBef>
+                <a:spcPts val="0"/>
+              </a:spcBef>
+              <a:spcAft>
+                <a:spcPts val="0"/>
+              </a:spcAft>
+              <a:buClrTx/>
+              <a:buSzTx/>
+              <a:buFontTx/>
+              <a:buNone/>
+              <a:tabLst/>
+              <a:defRPr/>
+            </a:pPr>
+            <a:r>
+              <a:rPr lang="en-US" dirty="0" smtClean="0"/>
+              <a:t>Run 4 uses</a:t>
+            </a:r>
+            <a:r>
+              <a:rPr lang="en-US" baseline="0" dirty="0" smtClean="0"/>
+              <a:t> </a:t>
+            </a:r>
+            <a:r>
+              <a:rPr lang="en-US" sz="1200" kern="1200" dirty="0" smtClean="0">
+                <a:solidFill>
+                  <a:schemeClr val="tx1"/>
+                </a:solidFill>
+                <a:effectLst/>
+                <a:latin typeface="+mn-lt"/>
+                <a:ea typeface="+mn-ea"/>
+                <a:cs typeface="+mn-cs"/>
+              </a:rPr>
+              <a:t>larger dataset of GEOTAGGED </a:t>
+            </a:r>
+            <a:r>
+              <a:rPr lang="en-US" sz="1200" kern="1200" dirty="0" err="1" smtClean="0">
+                <a:solidFill>
+                  <a:schemeClr val="tx1"/>
+                </a:solidFill>
+                <a:effectLst/>
+                <a:latin typeface="+mn-lt"/>
+                <a:ea typeface="+mn-ea"/>
+                <a:cs typeface="+mn-cs"/>
+              </a:rPr>
+              <a:t>flickr</a:t>
+            </a:r>
+            <a:r>
+              <a:rPr lang="en-US" sz="1200" kern="1200" dirty="0" smtClean="0">
+                <a:solidFill>
+                  <a:schemeClr val="tx1"/>
+                </a:solidFill>
+                <a:effectLst/>
+                <a:latin typeface="+mn-lt"/>
+                <a:ea typeface="+mn-ea"/>
+                <a:cs typeface="+mn-cs"/>
+              </a:rPr>
+              <a:t> images crawled independently. All images from the set of users from the query images were removed from this dataset to keep to the spirit of the task.</a:t>
+            </a:r>
+          </a:p>
+          <a:p>
+            <a:pPr marL="0" marR="0" indent="0" algn="l" defTabSz="457200" rtl="0" eaLnBrk="1" fontAlgn="auto" latinLnBrk="0" hangingPunct="1">
+              <a:lnSpc>
+                <a:spcPct val="100000"/>
+              </a:lnSpc>
+              <a:spcBef>
+                <a:spcPts val="0"/>
+              </a:spcBef>
+              <a:spcAft>
+                <a:spcPts val="0"/>
+              </a:spcAft>
+              <a:buClrTx/>
+              <a:buSzTx/>
+              <a:buFontTx/>
+              <a:buNone/>
+              <a:tabLst/>
+              <a:defRPr/>
+            </a:pPr>
+            <a:r>
+              <a:rPr lang="en-US" sz="1200" kern="1200" dirty="0" err="1" smtClean="0">
+                <a:solidFill>
+                  <a:schemeClr val="tx1"/>
+                </a:solidFill>
+                <a:effectLst/>
+                <a:latin typeface="+mn-lt"/>
+                <a:ea typeface="+mn-ea"/>
+                <a:cs typeface="+mn-cs"/>
+              </a:rPr>
+              <a:t>Geonames</a:t>
+            </a:r>
+            <a:r>
+              <a:rPr lang="en-US" sz="1200" kern="1200" baseline="0" dirty="0" smtClean="0">
+                <a:solidFill>
+                  <a:schemeClr val="tx1"/>
+                </a:solidFill>
+                <a:effectLst/>
+                <a:latin typeface="+mn-lt"/>
+                <a:ea typeface="+mn-ea"/>
+                <a:cs typeface="+mn-cs"/>
+              </a:rPr>
+              <a:t> provides helpful boost</a:t>
+            </a:r>
+            <a:endParaRPr lang="en-US" sz="1200" kern="1200" dirty="0" smtClean="0">
+              <a:solidFill>
+                <a:schemeClr val="tx1"/>
+              </a:solidFill>
+              <a:effectLst/>
+              <a:latin typeface="+mn-lt"/>
+              <a:ea typeface="+mn-ea"/>
+              <a:cs typeface="+mn-cs"/>
+            </a:endParaRPr>
+          </a:p>
+          <a:p>
+            <a:pPr marL="0" marR="0" indent="0" algn="l" defTabSz="457200" rtl="0" eaLnBrk="1" fontAlgn="auto" latinLnBrk="0" hangingPunct="1">
+              <a:lnSpc>
+                <a:spcPct val="100000"/>
+              </a:lnSpc>
+              <a:spcBef>
+                <a:spcPts val="0"/>
+              </a:spcBef>
+              <a:spcAft>
+                <a:spcPts val="0"/>
+              </a:spcAft>
+              <a:buClrTx/>
+              <a:buSzTx/>
+              <a:buFontTx/>
+              <a:buNone/>
+              <a:tabLst/>
+              <a:defRPr/>
+            </a:pPr>
+            <a:r>
+              <a:rPr lang="en-US" dirty="0" smtClean="0"/>
+              <a:t>Using just tags seems most effective</a:t>
+            </a:r>
+            <a:r>
+              <a:rPr lang="en-US" baseline="0" dirty="0" smtClean="0"/>
+              <a:t> (run 3)</a:t>
+            </a:r>
+          </a:p>
+          <a:p>
+            <a:pPr marL="0" marR="0" indent="0" algn="l" defTabSz="457200" rtl="0" eaLnBrk="1" fontAlgn="auto" latinLnBrk="0" hangingPunct="1">
+              <a:lnSpc>
+                <a:spcPct val="100000"/>
+              </a:lnSpc>
+              <a:spcBef>
+                <a:spcPts val="0"/>
+              </a:spcBef>
+              <a:spcAft>
+                <a:spcPts val="0"/>
+              </a:spcAft>
+              <a:buClrTx/>
+              <a:buSzTx/>
+              <a:buFontTx/>
+              <a:buNone/>
+              <a:tabLst/>
+              <a:defRPr/>
+            </a:pPr>
+            <a:r>
+              <a:rPr lang="en-US" baseline="0" dirty="0" smtClean="0"/>
+              <a:t>Big dataset helps (run 4)</a:t>
+            </a:r>
+            <a:endParaRPr lang="en-US" dirty="0" smtClean="0"/>
+          </a:p>
+        </p:txBody>
+      </p:sp>
+      <p:sp>
+        <p:nvSpPr>
+          <p:cNvPr id="4" name="Slide Number Placeholder 3"/>
+          <p:cNvSpPr>
+            <a:spLocks noGrp="1"/>
+          </p:cNvSpPr>
+          <p:nvPr>
+            <p:ph type="sldNum" sz="quarter" idx="10"/>
+          </p:nvPr>
+        </p:nvSpPr>
+        <p:spPr/>
+        <p:txBody>
+          <a:bodyPr/>
+          <a:lstStyle/>
+          <a:p>
+            <a:fld id="{909E9D34-1247-5948-955C-61F54B534A73}" type="slidenum">
+              <a:rPr lang="en-US" smtClean="0"/>
+              <a:t>12</a:t>
+            </a:fld>
+            <a:endParaRPr lang="en-US"/>
+          </a:p>
+        </p:txBody>
+      </p:sp>
+    </p:spTree>
+    <p:extLst>
+      <p:ext uri="{BB962C8B-B14F-4D97-AF65-F5344CB8AC3E}">
+        <p14:creationId xmlns:p14="http://schemas.microsoft.com/office/powerpoint/2010/main" val="685985644"/>
+      </p:ext>
+    </p:extLst>
+  </p:cSld>
+  <p:clrMapOvr>
+    <a:masterClrMapping/>
+  </p:clrMapOvr>
+</p:notes>
+</file>
+
 <file path=ppt/notesSlides/notesSlide2.xml><?xml version="1.0" encoding="utf-8"?>
 <p:notes xmlns:a="http://schemas.openxmlformats.org/drawingml/2006/main" xmlns:r="http://schemas.openxmlformats.org/officeDocument/2006/relationships" xmlns:p="http://schemas.openxmlformats.org/presentationml/2006/main">
   <p:cSld>
@@ -713,27 +1459,47 @@
           <a:bodyPr/>
           <a:lstStyle/>
           <a:p>
+            <a:pPr marL="0" marR="0" indent="0" algn="l" defTabSz="457200" rtl="0" eaLnBrk="1" fontAlgn="auto" latinLnBrk="0" hangingPunct="1">
+              <a:lnSpc>
+                <a:spcPct val="100000"/>
+              </a:lnSpc>
+              <a:spcBef>
+                <a:spcPts val="0"/>
+              </a:spcBef>
+              <a:spcAft>
+                <a:spcPts val="0"/>
+              </a:spcAft>
+              <a:buClrTx/>
+              <a:buSzTx/>
+              <a:buFontTx/>
+              <a:buNone/>
+              <a:tabLst/>
+              <a:defRPr/>
+            </a:pPr>
+            <a:r>
+              <a:rPr lang="en-US" sz="1200" dirty="0" smtClean="0"/>
+              <a:t>A prior feature was constructed based on where photos are most likely to be taken</a:t>
+            </a:r>
+            <a:endParaRPr lang="en-US" dirty="0" smtClean="0"/>
+          </a:p>
+          <a:p>
             <a:r>
               <a:rPr lang="en-US" dirty="0" smtClean="0"/>
-              <a:t>Hotspots around US,</a:t>
+              <a:t>Hotspots </a:t>
+            </a:r>
+            <a:r>
+              <a:rPr lang="en-US" dirty="0" smtClean="0"/>
+              <a:t>around US,</a:t>
             </a:r>
             <a:r>
               <a:rPr lang="en-US" baseline="0" dirty="0" smtClean="0"/>
-              <a:t> Europe, major cities</a:t>
-            </a:r>
-          </a:p>
-          <a:p>
+              <a:t> Europe, major </a:t>
+            </a:r>
             <a:r>
               <a:rPr lang="en-US" baseline="0" dirty="0" smtClean="0"/>
-              <a:t>Approach means all tags are considered equal</a:t>
-            </a:r>
-          </a:p>
-          <a:p>
-            <a:r>
-              <a:rPr lang="en-US" baseline="0" dirty="0" smtClean="0"/>
-              <a:t>All tags provide a little information, worst case = prior</a:t>
-            </a:r>
-            <a:endParaRPr lang="en-US" dirty="0"/>
+              <a:t>cities</a:t>
+            </a:r>
+            <a:endParaRPr lang="en-US" baseline="0" dirty="0" smtClean="0"/>
           </a:p>
         </p:txBody>
       </p:sp>
@@ -817,53 +1583,17 @@
           <a:bodyPr/>
           <a:lstStyle/>
           <a:p>
-            <a:pPr marL="228600" indent="-228600">
-              <a:buAutoNum type="arabicParenR"/>
-            </a:pPr>
-            <a:r>
-              <a:rPr lang="en-US" dirty="0" smtClean="0"/>
-              <a:t>Image</a:t>
-            </a:r>
-          </a:p>
-          <a:p>
-            <a:pPr marL="228600" indent="-228600">
-              <a:buAutoNum type="arabicParenR"/>
-            </a:pPr>
-            <a:r>
-              <a:rPr lang="en-US" dirty="0" smtClean="0"/>
-              <a:t>Difference</a:t>
-            </a:r>
             <a:r>
               <a:rPr lang="en-US" baseline="0" dirty="0" smtClean="0"/>
-              <a:t> of Gaussian SIFT Features</a:t>
-            </a:r>
-          </a:p>
-          <a:p>
-            <a:pPr marL="228600" indent="-228600">
-              <a:buAutoNum type="arabicParenR"/>
-            </a:pPr>
+              <a:t>Approach means all tags are considered equal</a:t>
+            </a:r>
+          </a:p>
+          <a:p>
             <a:r>
               <a:rPr lang="en-US" baseline="0" dirty="0" smtClean="0"/>
-              <a:t>Random Gaussian P-Stable hash functions, 4 x 32 bit partitions</a:t>
-            </a:r>
-          </a:p>
-          <a:p>
-            <a:pPr marL="228600" indent="-228600">
-              <a:buAutoNum type="arabicParenR"/>
-            </a:pPr>
-            <a:r>
-              <a:rPr lang="en-US" baseline="0" dirty="0" smtClean="0"/>
-              <a:t>Collision in hash table = graph edge</a:t>
-            </a:r>
-          </a:p>
-          <a:p>
-            <a:pPr marL="0" indent="0">
-              <a:buNone/>
-            </a:pPr>
-            <a:r>
-              <a:rPr lang="en-US" baseline="0" dirty="0" smtClean="0"/>
-              <a:t>Search: looks up image vertex, returns connected vertices, ordered by weight</a:t>
-            </a:r>
+              <a:t>All tags provide a little information, worst case = prior</a:t>
+            </a:r>
+            <a:endParaRPr lang="en-US" dirty="0"/>
           </a:p>
         </p:txBody>
       </p:sp>
@@ -893,7 +1623,7 @@
     </p:spTree>
     <p:extLst>
       <p:ext uri="{BB962C8B-B14F-4D97-AF65-F5344CB8AC3E}">
-        <p14:creationId xmlns:p14="http://schemas.microsoft.com/office/powerpoint/2010/main" val="4180740899"/>
+        <p14:creationId xmlns:p14="http://schemas.microsoft.com/office/powerpoint/2010/main" val="1956542975"/>
       </p:ext>
     </p:extLst>
   </p:cSld>
@@ -952,19 +1682,7 @@
             </a:pPr>
             <a:r>
               <a:rPr lang="en-US" dirty="0" smtClean="0"/>
-              <a:t>CEDD describes</a:t>
-            </a:r>
-            <a:r>
-              <a:rPr lang="en-US" baseline="0" dirty="0" smtClean="0"/>
-              <a:t> </a:t>
-            </a:r>
-            <a:r>
-              <a:rPr lang="en-US" baseline="0" dirty="0" err="1" smtClean="0"/>
-              <a:t>colour</a:t>
-            </a:r>
-            <a:r>
-              <a:rPr lang="en-US" baseline="0" dirty="0" smtClean="0"/>
-              <a:t> + texture, 144 dimensions</a:t>
+              <a:t>Image</a:t>
             </a:r>
           </a:p>
           <a:p>
@@ -973,7 +1691,11 @@
             </a:pPr>
             <a:r>
               <a:rPr lang="en-US" dirty="0" smtClean="0"/>
-              <a:t>18 products with 256 clusters each</a:t>
+              <a:t>Difference</a:t>
+            </a:r>
+            <a:r>
+              <a:rPr lang="en-US" baseline="0" dirty="0" smtClean="0"/>
+              <a:t> of Gaussian SIFT Features</a:t>
             </a:r>
           </a:p>
           <a:p>
@@ -981,12 +1703,17 @@
               <a:buAutoNum type="arabicParenR"/>
             </a:pPr>
             <a:r>
-              <a:rPr lang="en-US" dirty="0" smtClean="0"/>
-              <a:t>26</a:t>
-            </a:r>
-            <a:r>
               <a:rPr lang="en-US" baseline="0" dirty="0" smtClean="0"/>
-              <a:t> bytes / image (18 for feature)</a:t>
+              <a:t>Random Gaussian P-Stable hash functions, 4 x 32 bit partitions</a:t>
+            </a:r>
+          </a:p>
+          <a:p>
+            <a:pPr marL="228600" indent="-228600">
+              <a:buAutoNum type="arabicParenR"/>
+            </a:pPr>
+            <a:r>
+              <a:rPr lang="en-US" baseline="0" dirty="0" smtClean="0"/>
+              <a:t>Collision in hash table = graph edge</a:t>
             </a:r>
           </a:p>
           <a:p>
@@ -994,14 +1721,9 @@
               <a:buNone/>
             </a:pPr>
             <a:r>
-              <a:rPr lang="en-US" dirty="0" smtClean="0"/>
-              <a:t>Search: query</a:t>
-            </a:r>
-            <a:r>
               <a:rPr lang="en-US" baseline="0" dirty="0" smtClean="0"/>
-              <a:t> = raw features, asymmetric distance, closest 100 images used</a:t>
-            </a:r>
-            <a:endParaRPr lang="en-US" dirty="0"/>
+              <a:t>Search: looks up image vertex, returns connected vertices, ordered by weight</a:t>
+            </a:r>
           </a:p>
         </p:txBody>
       </p:sp>
@@ -1031,7 +1753,7 @@
     </p:spTree>
     <p:extLst>
       <p:ext uri="{BB962C8B-B14F-4D97-AF65-F5344CB8AC3E}">
-        <p14:creationId xmlns:p14="http://schemas.microsoft.com/office/powerpoint/2010/main" val="1422346787"/>
+        <p14:creationId xmlns:p14="http://schemas.microsoft.com/office/powerpoint/2010/main" val="4180740899"/>
       </p:ext>
     </p:extLst>
   </p:cSld>
@@ -1085,33 +1807,59 @@
           <a:bodyPr/>
           <a:lstStyle/>
           <a:p>
+            <a:pPr marL="228600" indent="-228600">
+              <a:buAutoNum type="arabicParenR"/>
+            </a:pPr>
             <a:r>
               <a:rPr lang="en-US" dirty="0" smtClean="0"/>
-              <a:t>Super/sub sampling</a:t>
-            </a:r>
-          </a:p>
-          <a:p>
+              <a:t>CEDD describes</a:t>
+            </a:r>
+            <a:r>
+              <a:rPr lang="en-US" baseline="0" dirty="0" smtClean="0"/>
+              <a:t> </a:t>
+            </a:r>
+            <a:r>
+              <a:rPr lang="en-US" baseline="0" dirty="0" err="1" smtClean="0"/>
+              <a:t>colour</a:t>
+            </a:r>
+            <a:r>
+              <a:rPr lang="en-US" baseline="0" dirty="0" smtClean="0"/>
+              <a:t> + texture, 144 dimensions</a:t>
+            </a:r>
+          </a:p>
+          <a:p>
+            <a:pPr marL="228600" indent="-228600">
+              <a:buAutoNum type="arabicParenR"/>
+            </a:pPr>
             <a:r>
               <a:rPr lang="en-US" dirty="0" smtClean="0"/>
-              <a:t>Each feature is given equal weight</a:t>
-            </a:r>
-          </a:p>
-          <a:p>
+              <a:t>18 products with 256 clusters each</a:t>
+            </a:r>
+          </a:p>
+          <a:p>
+            <a:pPr marL="228600" indent="-228600">
+              <a:buAutoNum type="arabicParenR"/>
+            </a:pPr>
             <a:r>
               <a:rPr lang="en-US" dirty="0" smtClean="0"/>
-              <a:t>Matches with </a:t>
-            </a:r>
-            <a:r>
-              <a:rPr lang="en-US" dirty="0" err="1" smtClean="0"/>
-              <a:t>geonames</a:t>
-            </a:r>
+              <a:t>26</a:t>
+            </a:r>
+            <a:r>
+              <a:rPr lang="en-US" baseline="0" dirty="0" smtClean="0"/>
+              <a:t> bytes / image (18 for feature)</a:t>
+            </a:r>
+          </a:p>
+          <a:p>
+            <a:pPr marL="0" indent="0">
+              <a:buNone/>
+            </a:pPr>
             <a:r>
               <a:rPr lang="en-US" dirty="0" smtClean="0"/>
-              <a:t> place</a:t>
+              <a:t>Search: query</a:t>
             </a:r>
             <a:r>
               <a:rPr lang="en-US" baseline="0" dirty="0" smtClean="0"/>
-              <a:t> or alternate place name</a:t>
+              <a:t> = raw features, asymmetric distance, closest 100 images used</a:t>
             </a:r>
             <a:endParaRPr lang="en-US" dirty="0"/>
           </a:p>
@@ -1143,7 +1891,7 @@
     </p:spTree>
     <p:extLst>
       <p:ext uri="{BB962C8B-B14F-4D97-AF65-F5344CB8AC3E}">
-        <p14:creationId xmlns:p14="http://schemas.microsoft.com/office/powerpoint/2010/main" val="2656925330"/>
+        <p14:creationId xmlns:p14="http://schemas.microsoft.com/office/powerpoint/2010/main" val="1422346787"/>
       </p:ext>
     </p:extLst>
   </p:cSld>
@@ -1197,6 +1945,118 @@
           <a:bodyPr/>
           <a:lstStyle/>
           <a:p>
+            <a:r>
+              <a:rPr lang="en-US" dirty="0" smtClean="0"/>
+              <a:t>Super/sub sampling</a:t>
+            </a:r>
+          </a:p>
+          <a:p>
+            <a:r>
+              <a:rPr lang="en-US" dirty="0" smtClean="0"/>
+              <a:t>Each feature is given equal weight</a:t>
+            </a:r>
+          </a:p>
+          <a:p>
+            <a:r>
+              <a:rPr lang="en-US" dirty="0" smtClean="0"/>
+              <a:t>Matches with </a:t>
+            </a:r>
+            <a:r>
+              <a:rPr lang="en-US" dirty="0" err="1" smtClean="0"/>
+              <a:t>geonames</a:t>
+            </a:r>
+            <a:r>
+              <a:rPr lang="en-US" dirty="0" smtClean="0"/>
+              <a:t> place</a:t>
+            </a:r>
+            <a:r>
+              <a:rPr lang="en-US" baseline="0" dirty="0" smtClean="0"/>
+              <a:t> or alternate place name</a:t>
+            </a:r>
+            <a:endParaRPr lang="en-US" dirty="0"/>
+          </a:p>
+        </p:txBody>
+      </p:sp>
+      <p:sp>
+        <p:nvSpPr>
+          <p:cNvPr id="4" name="Slide Number Placeholder 3"/>
+          <p:cNvSpPr>
+            <a:spLocks noGrp="1"/>
+          </p:cNvSpPr>
+          <p:nvPr>
+            <p:ph type="sldNum" sz="quarter" idx="10"/>
+          </p:nvPr>
+        </p:nvSpPr>
+        <p:spPr/>
+        <p:txBody>
+          <a:bodyPr/>
+          <a:lstStyle/>
+          <a:p>
+            <a:fld id="{909E9D34-1247-5948-955C-61F54B534A73}" type="slidenum">
+              <a:rPr lang="en-US" smtClean="0"/>
+              <a:t>7</a:t>
+            </a:fld>
+            <a:endParaRPr lang="en-US"/>
+          </a:p>
+        </p:txBody>
+      </p:sp>
+    </p:spTree>
+    <p:extLst>
+      <p:ext uri="{BB962C8B-B14F-4D97-AF65-F5344CB8AC3E}">
+        <p14:creationId xmlns:p14="http://schemas.microsoft.com/office/powerpoint/2010/main" val="2656925330"/>
+      </p:ext>
+    </p:extLst>
+  </p:cSld>
+  <p:clrMapOvr>
+    <a:masterClrMapping/>
+  </p:clrMapOvr>
+</p:notes>
+</file>
+
+<file path=ppt/notesSlides/notesSlide8.xml><?xml version="1.0" encoding="utf-8"?>
+<p:notes xmlns:a="http://schemas.openxmlformats.org/drawingml/2006/main" xmlns:r="http://schemas.openxmlformats.org/officeDocument/2006/relationships" xmlns:p="http://schemas.openxmlformats.org/presentationml/2006/main">
+  <p:cSld>
+    <p:spTree>
+      <p:nvGrpSpPr>
+        <p:cNvPr id="1" name=""/>
+        <p:cNvGrpSpPr/>
+        <p:nvPr/>
+      </p:nvGrpSpPr>
+      <p:grpSpPr>
+        <a:xfrm>
+          <a:off x="0" y="0"/>
+          <a:ext cx="0" cy="0"/>
+          <a:chOff x="0" y="0"/>
+          <a:chExt cx="0" cy="0"/>
+        </a:xfrm>
+      </p:grpSpPr>
+      <p:sp>
+        <p:nvSpPr>
+          <p:cNvPr id="2" name="Slide Image Placeholder 1"/>
+          <p:cNvSpPr>
+            <a:spLocks noGrp="1" noRot="1" noChangeAspect="1"/>
+          </p:cNvSpPr>
+          <p:nvPr>
+            <p:ph type="sldImg"/>
+          </p:nvPr>
+        </p:nvSpPr>
+        <p:spPr/>
+      </p:sp>
+      <p:sp>
+        <p:nvSpPr>
+          <p:cNvPr id="3" name="Notes Placeholder 2"/>
+          <p:cNvSpPr>
+            <a:spLocks noGrp="1"/>
+          </p:cNvSpPr>
+          <p:nvPr>
+            <p:ph type="body" idx="1"/>
+          </p:nvPr>
+        </p:nvSpPr>
+        <p:spPr/>
+        <p:txBody>
+          <a:bodyPr/>
+          <a:lstStyle/>
+          <a:p>
             <a:pPr marL="0" marR="0" indent="0" algn="l" defTabSz="457200" rtl="0" eaLnBrk="1" fontAlgn="auto" latinLnBrk="0" hangingPunct="1">
               <a:lnSpc>
                 <a:spcPct val="100000"/>
@@ -1381,7 +2241,254 @@
           <a:p>
             <a:fld id="{909E9D34-1247-5948-955C-61F54B534A73}" type="slidenum">
               <a:rPr lang="en-US" smtClean="0"/>
-              <a:t>7</a:t>
+              <a:t>8</a:t>
+            </a:fld>
+            <a:endParaRPr lang="en-US"/>
+          </a:p>
+        </p:txBody>
+      </p:sp>
+    </p:spTree>
+    <p:extLst>
+      <p:ext uri="{BB962C8B-B14F-4D97-AF65-F5344CB8AC3E}">
+        <p14:creationId xmlns:p14="http://schemas.microsoft.com/office/powerpoint/2010/main" val="685985644"/>
+      </p:ext>
+    </p:extLst>
+  </p:cSld>
+  <p:clrMapOvr>
+    <a:masterClrMapping/>
+  </p:clrMapOvr>
+</p:notes>
+</file>
+
+<file path=ppt/notesSlides/notesSlide9.xml><?xml version="1.0" encoding="utf-8"?>
+<p:notes xmlns:a="http://schemas.openxmlformats.org/drawingml/2006/main" xmlns:r="http://schemas.openxmlformats.org/officeDocument/2006/relationships" xmlns:p="http://schemas.openxmlformats.org/presentationml/2006/main">
+  <p:cSld>
+    <p:spTree>
+      <p:nvGrpSpPr>
+        <p:cNvPr id="1" name=""/>
+        <p:cNvGrpSpPr/>
+        <p:nvPr/>
+      </p:nvGrpSpPr>
+      <p:grpSpPr>
+        <a:xfrm>
+          <a:off x="0" y="0"/>
+          <a:ext cx="0" cy="0"/>
+          <a:chOff x="0" y="0"/>
+          <a:chExt cx="0" cy="0"/>
+        </a:xfrm>
+      </p:grpSpPr>
+      <p:sp>
+        <p:nvSpPr>
+          <p:cNvPr id="2" name="Slide Image Placeholder 1"/>
+          <p:cNvSpPr>
+            <a:spLocks noGrp="1" noRot="1" noChangeAspect="1"/>
+          </p:cNvSpPr>
+          <p:nvPr>
+            <p:ph type="sldImg"/>
+          </p:nvPr>
+        </p:nvSpPr>
+        <p:spPr/>
+      </p:sp>
+      <p:sp>
+        <p:nvSpPr>
+          <p:cNvPr id="3" name="Notes Placeholder 2"/>
+          <p:cNvSpPr>
+            <a:spLocks noGrp="1"/>
+          </p:cNvSpPr>
+          <p:nvPr>
+            <p:ph type="body" idx="1"/>
+          </p:nvPr>
+        </p:nvSpPr>
+        <p:spPr/>
+        <p:txBody>
+          <a:bodyPr/>
+          <a:lstStyle/>
+          <a:p>
+            <a:pPr marL="0" marR="0" indent="0" algn="l" defTabSz="457200" rtl="0" eaLnBrk="1" fontAlgn="auto" latinLnBrk="0" hangingPunct="1">
+              <a:lnSpc>
+                <a:spcPct val="100000"/>
+              </a:lnSpc>
+              <a:spcBef>
+                <a:spcPts val="0"/>
+              </a:spcBef>
+              <a:spcAft>
+                <a:spcPts val="0"/>
+              </a:spcAft>
+              <a:buClrTx/>
+              <a:buSzTx/>
+              <a:buFontTx/>
+              <a:buNone/>
+              <a:tabLst/>
+              <a:defRPr/>
+            </a:pPr>
+            <a:r>
+              <a:rPr lang="en-US" dirty="0" smtClean="0"/>
+              <a:t>Run 4 uses</a:t>
+            </a:r>
+            <a:r>
+              <a:rPr lang="en-US" baseline="0" dirty="0" smtClean="0"/>
+              <a:t> </a:t>
+            </a:r>
+            <a:r>
+              <a:rPr lang="en-US" sz="1200" kern="1200" dirty="0" smtClean="0">
+                <a:solidFill>
+                  <a:schemeClr val="tx1"/>
+                </a:solidFill>
+                <a:effectLst/>
+                <a:latin typeface="+mn-lt"/>
+                <a:ea typeface="+mn-ea"/>
+                <a:cs typeface="+mn-cs"/>
+              </a:rPr>
+              <a:t>larger dataset of GEOTAGGED </a:t>
+            </a:r>
+            <a:r>
+              <a:rPr lang="en-US" sz="1200" kern="1200" dirty="0" err="1" smtClean="0">
+                <a:solidFill>
+                  <a:schemeClr val="tx1"/>
+                </a:solidFill>
+                <a:effectLst/>
+                <a:latin typeface="+mn-lt"/>
+                <a:ea typeface="+mn-ea"/>
+                <a:cs typeface="+mn-cs"/>
+              </a:rPr>
+              <a:t>flickr</a:t>
+            </a:r>
+            <a:r>
+              <a:rPr lang="en-US" sz="1200" kern="1200" dirty="0" smtClean="0">
+                <a:solidFill>
+                  <a:schemeClr val="tx1"/>
+                </a:solidFill>
+                <a:effectLst/>
+                <a:latin typeface="+mn-lt"/>
+                <a:ea typeface="+mn-ea"/>
+                <a:cs typeface="+mn-cs"/>
+              </a:rPr>
+              <a:t> images crawled independently. All images from the set of users from the query images were removed from this dataset to keep to the spirit of the task.</a:t>
+            </a:r>
+          </a:p>
+          <a:p>
+            <a:pPr marL="0" marR="0" indent="0" algn="l" defTabSz="457200" rtl="0" eaLnBrk="1" fontAlgn="auto" latinLnBrk="0" hangingPunct="1">
+              <a:lnSpc>
+                <a:spcPct val="100000"/>
+              </a:lnSpc>
+              <a:spcBef>
+                <a:spcPts val="0"/>
+              </a:spcBef>
+              <a:spcAft>
+                <a:spcPts val="0"/>
+              </a:spcAft>
+              <a:buClrTx/>
+              <a:buSzTx/>
+              <a:buFontTx/>
+              <a:buNone/>
+              <a:tabLst/>
+              <a:defRPr/>
+            </a:pPr>
+            <a:r>
+              <a:rPr lang="en-US" sz="1200" kern="1200" dirty="0" err="1" smtClean="0">
+                <a:solidFill>
+                  <a:schemeClr val="tx1"/>
+                </a:solidFill>
+                <a:effectLst/>
+                <a:latin typeface="+mn-lt"/>
+                <a:ea typeface="+mn-ea"/>
+                <a:cs typeface="+mn-cs"/>
+              </a:rPr>
+              <a:t>Geonames</a:t>
+            </a:r>
+            <a:r>
+              <a:rPr lang="en-US" sz="1200" kern="1200" baseline="0" dirty="0" smtClean="0">
+                <a:solidFill>
+                  <a:schemeClr val="tx1"/>
+                </a:solidFill>
+                <a:effectLst/>
+                <a:latin typeface="+mn-lt"/>
+                <a:ea typeface="+mn-ea"/>
+                <a:cs typeface="+mn-cs"/>
+              </a:rPr>
+              <a:t> provides helpful boost</a:t>
+            </a:r>
+            <a:endParaRPr lang="en-US" sz="1200" kern="1200" dirty="0" smtClean="0">
+              <a:solidFill>
+                <a:schemeClr val="tx1"/>
+              </a:solidFill>
+              <a:effectLst/>
+              <a:latin typeface="+mn-lt"/>
+              <a:ea typeface="+mn-ea"/>
+              <a:cs typeface="+mn-cs"/>
+            </a:endParaRPr>
+          </a:p>
+          <a:p>
+            <a:pPr marL="0" marR="0" indent="0" algn="l" defTabSz="457200" rtl="0" eaLnBrk="1" fontAlgn="auto" latinLnBrk="0" hangingPunct="1">
+              <a:lnSpc>
+                <a:spcPct val="100000"/>
+              </a:lnSpc>
+              <a:spcBef>
+                <a:spcPts val="0"/>
+              </a:spcBef>
+              <a:spcAft>
+                <a:spcPts val="0"/>
+              </a:spcAft>
+              <a:buClrTx/>
+              <a:buSzTx/>
+              <a:buFontTx/>
+              <a:buNone/>
+              <a:tabLst/>
+              <a:defRPr/>
+            </a:pPr>
+            <a:r>
+              <a:rPr lang="en-US" dirty="0" smtClean="0"/>
+              <a:t>Using just tags seems most effective</a:t>
+            </a:r>
+            <a:r>
+              <a:rPr lang="en-US" baseline="0" dirty="0" smtClean="0"/>
+              <a:t> (run 3)</a:t>
+            </a:r>
+          </a:p>
+          <a:p>
+            <a:pPr marL="0" marR="0" indent="0" algn="l" defTabSz="457200" rtl="0" eaLnBrk="1" fontAlgn="auto" latinLnBrk="0" hangingPunct="1">
+              <a:lnSpc>
+                <a:spcPct val="100000"/>
+              </a:lnSpc>
+              <a:spcBef>
+                <a:spcPts val="0"/>
+              </a:spcBef>
+              <a:spcAft>
+                <a:spcPts val="0"/>
+              </a:spcAft>
+              <a:buClrTx/>
+              <a:buSzTx/>
+              <a:buFontTx/>
+              <a:buNone/>
+              <a:tabLst/>
+              <a:defRPr/>
+            </a:pPr>
+            <a:r>
+              <a:rPr lang="en-US" baseline="0" dirty="0" smtClean="0"/>
+              <a:t>Big dataset helps (run 4)</a:t>
+            </a:r>
+            <a:endParaRPr lang="en-US" dirty="0" smtClean="0"/>
+          </a:p>
+        </p:txBody>
+      </p:sp>
+      <p:sp>
+        <p:nvSpPr>
+          <p:cNvPr id="4" name="Slide Number Placeholder 3"/>
+          <p:cNvSpPr>
+            <a:spLocks noGrp="1"/>
+          </p:cNvSpPr>
+          <p:nvPr>
+            <p:ph type="sldNum" sz="quarter" idx="10"/>
+          </p:nvPr>
+        </p:nvSpPr>
+        <p:spPr/>
+        <p:txBody>
+          <a:bodyPr/>
+          <a:lstStyle/>
+          <a:p>
+            <a:fld id="{909E9D34-1247-5948-955C-61F54B534A73}" type="slidenum">
+              <a:rPr lang="en-US" smtClean="0"/>
+              <a:t>9</a:t>
             </a:fld>
             <a:endParaRPr lang="en-US"/>
           </a:p>
@@ -3659,6 +4766,680 @@
 </p:sld>
 </file>
 
+<file path=ppt/slides/slide10.xml><?xml version="1.0" encoding="utf-8"?>
+<p:sld xmlns:a="http://schemas.openxmlformats.org/drawingml/2006/main" xmlns:r="http://schemas.openxmlformats.org/officeDocument/2006/relationships" xmlns:p="http://schemas.openxmlformats.org/presentationml/2006/main">
+  <p:cSld>
+    <p:spTree>
+      <p:nvGrpSpPr>
+        <p:cNvPr id="1" name=""/>
+        <p:cNvGrpSpPr/>
+        <p:nvPr/>
+      </p:nvGrpSpPr>
+      <p:grpSpPr>
+        <a:xfrm>
+          <a:off x="0" y="0"/>
+          <a:ext cx="0" cy="0"/>
+          <a:chOff x="0" y="0"/>
+          <a:chExt cx="0" cy="0"/>
+        </a:xfrm>
+      </p:grpSpPr>
+      <p:sp>
+        <p:nvSpPr>
+          <p:cNvPr id="2" name="Title 1"/>
+          <p:cNvSpPr>
+            <a:spLocks noGrp="1"/>
+          </p:cNvSpPr>
+          <p:nvPr>
+            <p:ph type="title"/>
+          </p:nvPr>
+        </p:nvSpPr>
+        <p:spPr/>
+        <p:txBody>
+          <a:bodyPr/>
+          <a:lstStyle/>
+          <a:p>
+            <a:r>
+              <a:rPr lang="en-US" dirty="0" smtClean="0"/>
+              <a:t>Runs &amp; Results</a:t>
+            </a:r>
+            <a:endParaRPr lang="en-US" dirty="0"/>
+          </a:p>
+        </p:txBody>
+      </p:sp>
+      <p:pic>
+        <p:nvPicPr>
+          <p:cNvPr id="5" name="Picture 4" descr="runs.png"/>
+          <p:cNvPicPr>
+            <a:picLocks noChangeAspect="1"/>
+          </p:cNvPicPr>
+          <p:nvPr/>
+        </p:nvPicPr>
+        <p:blipFill>
+          <a:blip r:embed="rId3">
+            <a:extLst>
+              <a:ext uri="{28A0092B-C50C-407E-A947-70E740481C1C}">
+                <a14:useLocalDpi xmlns:a14="http://schemas.microsoft.com/office/drawing/2010/main" val="0"/>
+              </a:ext>
+            </a:extLst>
+          </a:blip>
+          <a:stretch>
+            <a:fillRect/>
+          </a:stretch>
+        </p:blipFill>
+        <p:spPr>
+          <a:xfrm>
+            <a:off x="715202" y="1231443"/>
+            <a:ext cx="7713597" cy="2147828"/>
+          </a:xfrm>
+          <a:prstGeom prst="rect">
+            <a:avLst/>
+          </a:prstGeom>
+          <a:ln w="57150">
+            <a:solidFill>
+              <a:schemeClr val="tx1"/>
+            </a:solidFill>
+          </a:ln>
+        </p:spPr>
+      </p:pic>
+      <p:pic>
+        <p:nvPicPr>
+          <p:cNvPr id="6" name="Picture 5" descr="results.png"/>
+          <p:cNvPicPr>
+            <a:picLocks noChangeAspect="1"/>
+          </p:cNvPicPr>
+          <p:nvPr/>
+        </p:nvPicPr>
+        <p:blipFill>
+          <a:blip r:embed="rId4">
+            <a:extLst>
+              <a:ext uri="{28A0092B-C50C-407E-A947-70E740481C1C}">
+                <a14:useLocalDpi xmlns:a14="http://schemas.microsoft.com/office/drawing/2010/main" val="0"/>
+              </a:ext>
+            </a:extLst>
+          </a:blip>
+          <a:stretch>
+            <a:fillRect/>
+          </a:stretch>
+        </p:blipFill>
+        <p:spPr>
+          <a:xfrm>
+            <a:off x="54620" y="3414375"/>
+            <a:ext cx="9034760" cy="3235812"/>
+          </a:xfrm>
+          <a:prstGeom prst="rect">
+            <a:avLst/>
+          </a:prstGeom>
+        </p:spPr>
+      </p:pic>
+      <p:sp>
+        <p:nvSpPr>
+          <p:cNvPr id="7" name="Oval 6"/>
+          <p:cNvSpPr/>
+          <p:nvPr/>
+        </p:nvSpPr>
+        <p:spPr>
+          <a:xfrm>
+            <a:off x="3573434" y="3721596"/>
+            <a:ext cx="1240366" cy="2732124"/>
+          </a:xfrm>
+          <a:prstGeom prst="ellipse">
+            <a:avLst/>
+          </a:prstGeom>
+          <a:noFill/>
+          <a:ln w="63500">
+            <a:solidFill>
+              <a:schemeClr val="accent2"/>
+            </a:solidFill>
+          </a:ln>
+          <a:effectLst/>
+        </p:spPr>
+        <p:style>
+          <a:lnRef idx="1">
+            <a:schemeClr val="accent1"/>
+          </a:lnRef>
+          <a:fillRef idx="3">
+            <a:schemeClr val="accent1"/>
+          </a:fillRef>
+          <a:effectRef idx="2">
+            <a:schemeClr val="accent1"/>
+          </a:effectRef>
+          <a:fontRef idx="minor">
+            <a:schemeClr val="lt1"/>
+          </a:fontRef>
+        </p:style>
+        <p:txBody>
+          <a:bodyPr rtlCol="0" anchor="ctr"/>
+          <a:lstStyle/>
+          <a:p>
+            <a:pPr algn="ctr"/>
+            <a:endParaRPr lang="en-US"/>
+          </a:p>
+        </p:txBody>
+      </p:sp>
+    </p:spTree>
+    <p:extLst>
+      <p:ext uri="{BB962C8B-B14F-4D97-AF65-F5344CB8AC3E}">
+        <p14:creationId xmlns:p14="http://schemas.microsoft.com/office/powerpoint/2010/main" val="1477824820"/>
+      </p:ext>
+    </p:extLst>
+  </p:cSld>
+  <p:clrMapOvr>
+    <a:masterClrMapping/>
+  </p:clrMapOvr>
+  <p:timing>
+    <p:tnLst>
+      <p:par>
+        <p:cTn xmlns:p14="http://schemas.microsoft.com/office/powerpoint/2010/main" id="1" dur="indefinite" restart="never" nodeType="tmRoot"/>
+      </p:par>
+    </p:tnLst>
+  </p:timing>
+</p:sld>
+</file>
+
+<file path=ppt/slides/slide11.xml><?xml version="1.0" encoding="utf-8"?>
+<p:sld xmlns:a="http://schemas.openxmlformats.org/drawingml/2006/main" xmlns:r="http://schemas.openxmlformats.org/officeDocument/2006/relationships" xmlns:p="http://schemas.openxmlformats.org/presentationml/2006/main">
+  <p:cSld>
+    <p:spTree>
+      <p:nvGrpSpPr>
+        <p:cNvPr id="1" name=""/>
+        <p:cNvGrpSpPr/>
+        <p:nvPr/>
+      </p:nvGrpSpPr>
+      <p:grpSpPr>
+        <a:xfrm>
+          <a:off x="0" y="0"/>
+          <a:ext cx="0" cy="0"/>
+          <a:chOff x="0" y="0"/>
+          <a:chExt cx="0" cy="0"/>
+        </a:xfrm>
+      </p:grpSpPr>
+      <p:sp>
+        <p:nvSpPr>
+          <p:cNvPr id="2" name="Title 1"/>
+          <p:cNvSpPr>
+            <a:spLocks noGrp="1"/>
+          </p:cNvSpPr>
+          <p:nvPr>
+            <p:ph type="title"/>
+          </p:nvPr>
+        </p:nvSpPr>
+        <p:spPr/>
+        <p:txBody>
+          <a:bodyPr/>
+          <a:lstStyle/>
+          <a:p>
+            <a:r>
+              <a:rPr lang="en-US" dirty="0" smtClean="0"/>
+              <a:t>Runs &amp; Results</a:t>
+            </a:r>
+            <a:endParaRPr lang="en-US" dirty="0"/>
+          </a:p>
+        </p:txBody>
+      </p:sp>
+      <p:pic>
+        <p:nvPicPr>
+          <p:cNvPr id="5" name="Picture 4" descr="runs.png"/>
+          <p:cNvPicPr>
+            <a:picLocks noChangeAspect="1"/>
+          </p:cNvPicPr>
+          <p:nvPr/>
+        </p:nvPicPr>
+        <p:blipFill>
+          <a:blip r:embed="rId3">
+            <a:extLst>
+              <a:ext uri="{28A0092B-C50C-407E-A947-70E740481C1C}">
+                <a14:useLocalDpi xmlns:a14="http://schemas.microsoft.com/office/drawing/2010/main" val="0"/>
+              </a:ext>
+            </a:extLst>
+          </a:blip>
+          <a:stretch>
+            <a:fillRect/>
+          </a:stretch>
+        </p:blipFill>
+        <p:spPr>
+          <a:xfrm>
+            <a:off x="715202" y="1231443"/>
+            <a:ext cx="7713597" cy="2147828"/>
+          </a:xfrm>
+          <a:prstGeom prst="rect">
+            <a:avLst/>
+          </a:prstGeom>
+          <a:ln w="57150">
+            <a:solidFill>
+              <a:schemeClr val="tx1"/>
+            </a:solidFill>
+          </a:ln>
+        </p:spPr>
+      </p:pic>
+      <p:pic>
+        <p:nvPicPr>
+          <p:cNvPr id="6" name="Picture 5" descr="results.png"/>
+          <p:cNvPicPr>
+            <a:picLocks noChangeAspect="1"/>
+          </p:cNvPicPr>
+          <p:nvPr/>
+        </p:nvPicPr>
+        <p:blipFill>
+          <a:blip r:embed="rId4">
+            <a:extLst>
+              <a:ext uri="{28A0092B-C50C-407E-A947-70E740481C1C}">
+                <a14:useLocalDpi xmlns:a14="http://schemas.microsoft.com/office/drawing/2010/main" val="0"/>
+              </a:ext>
+            </a:extLst>
+          </a:blip>
+          <a:stretch>
+            <a:fillRect/>
+          </a:stretch>
+        </p:blipFill>
+        <p:spPr>
+          <a:xfrm>
+            <a:off x="54620" y="3414375"/>
+            <a:ext cx="9034760" cy="3235812"/>
+          </a:xfrm>
+          <a:prstGeom prst="rect">
+            <a:avLst/>
+          </a:prstGeom>
+        </p:spPr>
+      </p:pic>
+      <p:sp>
+        <p:nvSpPr>
+          <p:cNvPr id="7" name="Oval 6"/>
+          <p:cNvSpPr/>
+          <p:nvPr/>
+        </p:nvSpPr>
+        <p:spPr>
+          <a:xfrm>
+            <a:off x="7619387" y="3721596"/>
+            <a:ext cx="1240366" cy="2732124"/>
+          </a:xfrm>
+          <a:prstGeom prst="ellipse">
+            <a:avLst/>
+          </a:prstGeom>
+          <a:noFill/>
+          <a:ln w="63500">
+            <a:solidFill>
+              <a:schemeClr val="accent2"/>
+            </a:solidFill>
+          </a:ln>
+          <a:effectLst/>
+        </p:spPr>
+        <p:style>
+          <a:lnRef idx="1">
+            <a:schemeClr val="accent1"/>
+          </a:lnRef>
+          <a:fillRef idx="3">
+            <a:schemeClr val="accent1"/>
+          </a:fillRef>
+          <a:effectRef idx="2">
+            <a:schemeClr val="accent1"/>
+          </a:effectRef>
+          <a:fontRef idx="minor">
+            <a:schemeClr val="lt1"/>
+          </a:fontRef>
+        </p:style>
+        <p:txBody>
+          <a:bodyPr rtlCol="0" anchor="ctr"/>
+          <a:lstStyle/>
+          <a:p>
+            <a:pPr algn="ctr"/>
+            <a:endParaRPr lang="en-US"/>
+          </a:p>
+        </p:txBody>
+      </p:sp>
+    </p:spTree>
+    <p:extLst>
+      <p:ext uri="{BB962C8B-B14F-4D97-AF65-F5344CB8AC3E}">
+        <p14:creationId xmlns:p14="http://schemas.microsoft.com/office/powerpoint/2010/main" val="2098776331"/>
+      </p:ext>
+    </p:extLst>
+  </p:cSld>
+  <p:clrMapOvr>
+    <a:masterClrMapping/>
+  </p:clrMapOvr>
+  <p:timing>
+    <p:tnLst>
+      <p:par>
+        <p:cTn xmlns:p14="http://schemas.microsoft.com/office/powerpoint/2010/main" id="1" dur="indefinite" restart="never" nodeType="tmRoot"/>
+      </p:par>
+    </p:tnLst>
+  </p:timing>
+</p:sld>
+</file>
+
+<file path=ppt/slides/slide12.xml><?xml version="1.0" encoding="utf-8"?>
+<p:sld xmlns:a="http://schemas.openxmlformats.org/drawingml/2006/main" xmlns:r="http://schemas.openxmlformats.org/officeDocument/2006/relationships" xmlns:p="http://schemas.openxmlformats.org/presentationml/2006/main">
+  <p:cSld>
+    <p:spTree>
+      <p:nvGrpSpPr>
+        <p:cNvPr id="1" name=""/>
+        <p:cNvGrpSpPr/>
+        <p:nvPr/>
+      </p:nvGrpSpPr>
+      <p:grpSpPr>
+        <a:xfrm>
+          <a:off x="0" y="0"/>
+          <a:ext cx="0" cy="0"/>
+          <a:chOff x="0" y="0"/>
+          <a:chExt cx="0" cy="0"/>
+        </a:xfrm>
+      </p:grpSpPr>
+      <p:sp>
+        <p:nvSpPr>
+          <p:cNvPr id="2" name="Title 1"/>
+          <p:cNvSpPr>
+            <a:spLocks noGrp="1"/>
+          </p:cNvSpPr>
+          <p:nvPr>
+            <p:ph type="title"/>
+          </p:nvPr>
+        </p:nvSpPr>
+        <p:spPr/>
+        <p:txBody>
+          <a:bodyPr/>
+          <a:lstStyle/>
+          <a:p>
+            <a:r>
+              <a:rPr lang="en-US" dirty="0" smtClean="0"/>
+              <a:t>Runs &amp; Results</a:t>
+            </a:r>
+            <a:endParaRPr lang="en-US" dirty="0"/>
+          </a:p>
+        </p:txBody>
+      </p:sp>
+      <p:pic>
+        <p:nvPicPr>
+          <p:cNvPr id="5" name="Picture 4" descr="runs.png"/>
+          <p:cNvPicPr>
+            <a:picLocks noChangeAspect="1"/>
+          </p:cNvPicPr>
+          <p:nvPr/>
+        </p:nvPicPr>
+        <p:blipFill>
+          <a:blip r:embed="rId3">
+            <a:extLst>
+              <a:ext uri="{28A0092B-C50C-407E-A947-70E740481C1C}">
+                <a14:useLocalDpi xmlns:a14="http://schemas.microsoft.com/office/drawing/2010/main" val="0"/>
+              </a:ext>
+            </a:extLst>
+          </a:blip>
+          <a:stretch>
+            <a:fillRect/>
+          </a:stretch>
+        </p:blipFill>
+        <p:spPr>
+          <a:xfrm>
+            <a:off x="715202" y="1231443"/>
+            <a:ext cx="7713597" cy="2147828"/>
+          </a:xfrm>
+          <a:prstGeom prst="rect">
+            <a:avLst/>
+          </a:prstGeom>
+          <a:ln w="57150">
+            <a:solidFill>
+              <a:schemeClr val="tx1"/>
+            </a:solidFill>
+          </a:ln>
+        </p:spPr>
+      </p:pic>
+      <p:pic>
+        <p:nvPicPr>
+          <p:cNvPr id="6" name="Picture 5" descr="results.png"/>
+          <p:cNvPicPr>
+            <a:picLocks noChangeAspect="1"/>
+          </p:cNvPicPr>
+          <p:nvPr/>
+        </p:nvPicPr>
+        <p:blipFill>
+          <a:blip r:embed="rId4">
+            <a:extLst>
+              <a:ext uri="{28A0092B-C50C-407E-A947-70E740481C1C}">
+                <a14:useLocalDpi xmlns:a14="http://schemas.microsoft.com/office/drawing/2010/main" val="0"/>
+              </a:ext>
+            </a:extLst>
+          </a:blip>
+          <a:stretch>
+            <a:fillRect/>
+          </a:stretch>
+        </p:blipFill>
+        <p:spPr>
+          <a:xfrm>
+            <a:off x="54620" y="3414375"/>
+            <a:ext cx="9034760" cy="3235812"/>
+          </a:xfrm>
+          <a:prstGeom prst="rect">
+            <a:avLst/>
+          </a:prstGeom>
+        </p:spPr>
+      </p:pic>
+      <p:sp>
+        <p:nvSpPr>
+          <p:cNvPr id="7" name="Oval 6"/>
+          <p:cNvSpPr/>
+          <p:nvPr/>
+        </p:nvSpPr>
+        <p:spPr>
+          <a:xfrm>
+            <a:off x="6585750" y="3721596"/>
+            <a:ext cx="1240366" cy="2732124"/>
+          </a:xfrm>
+          <a:prstGeom prst="ellipse">
+            <a:avLst/>
+          </a:prstGeom>
+          <a:noFill/>
+          <a:ln w="63500">
+            <a:solidFill>
+              <a:schemeClr val="accent2"/>
+            </a:solidFill>
+          </a:ln>
+          <a:effectLst/>
+        </p:spPr>
+        <p:style>
+          <a:lnRef idx="1">
+            <a:schemeClr val="accent1"/>
+          </a:lnRef>
+          <a:fillRef idx="3">
+            <a:schemeClr val="accent1"/>
+          </a:fillRef>
+          <a:effectRef idx="2">
+            <a:schemeClr val="accent1"/>
+          </a:effectRef>
+          <a:fontRef idx="minor">
+            <a:schemeClr val="lt1"/>
+          </a:fontRef>
+        </p:style>
+        <p:txBody>
+          <a:bodyPr rtlCol="0" anchor="ctr"/>
+          <a:lstStyle/>
+          <a:p>
+            <a:pPr algn="ctr"/>
+            <a:endParaRPr lang="en-US"/>
+          </a:p>
+        </p:txBody>
+      </p:sp>
+    </p:spTree>
+    <p:extLst>
+      <p:ext uri="{BB962C8B-B14F-4D97-AF65-F5344CB8AC3E}">
+        <p14:creationId xmlns:p14="http://schemas.microsoft.com/office/powerpoint/2010/main" val="1875055952"/>
+      </p:ext>
+    </p:extLst>
+  </p:cSld>
+  <p:clrMapOvr>
+    <a:masterClrMapping/>
+  </p:clrMapOvr>
+  <p:timing>
+    <p:tnLst>
+      <p:par>
+        <p:cTn xmlns:p14="http://schemas.microsoft.com/office/powerpoint/2010/main" id="1" dur="indefinite" restart="never" nodeType="tmRoot"/>
+      </p:par>
+    </p:tnLst>
+  </p:timing>
+</p:sld>
+</file>
+
+<file path=ppt/slides/slide13.xml><?xml version="1.0" encoding="utf-8"?>
+<p:sld xmlns:a="http://schemas.openxmlformats.org/drawingml/2006/main" xmlns:r="http://schemas.openxmlformats.org/officeDocument/2006/relationships" xmlns:p="http://schemas.openxmlformats.org/presentationml/2006/main">
+  <p:cSld>
+    <p:spTree>
+      <p:nvGrpSpPr>
+        <p:cNvPr id="1" name=""/>
+        <p:cNvGrpSpPr/>
+        <p:nvPr/>
+      </p:nvGrpSpPr>
+      <p:grpSpPr>
+        <a:xfrm>
+          <a:off x="0" y="0"/>
+          <a:ext cx="0" cy="0"/>
+          <a:chOff x="0" y="0"/>
+          <a:chExt cx="0" cy="0"/>
+        </a:xfrm>
+      </p:grpSpPr>
+      <p:sp>
+        <p:nvSpPr>
+          <p:cNvPr id="2" name="Title 1"/>
+          <p:cNvSpPr>
+            <a:spLocks noGrp="1"/>
+          </p:cNvSpPr>
+          <p:nvPr>
+            <p:ph type="title"/>
+          </p:nvPr>
+        </p:nvSpPr>
+        <p:spPr/>
+        <p:txBody>
+          <a:bodyPr/>
+          <a:lstStyle/>
+          <a:p>
+            <a:r>
+              <a:rPr lang="en-US" dirty="0" smtClean="0"/>
+              <a:t>FUTURE WORK</a:t>
+            </a:r>
+            <a:endParaRPr lang="en-US" dirty="0"/>
+          </a:p>
+        </p:txBody>
+      </p:sp>
+      <p:sp>
+        <p:nvSpPr>
+          <p:cNvPr id="3" name="Content Placeholder 2"/>
+          <p:cNvSpPr>
+            <a:spLocks noGrp="1"/>
+          </p:cNvSpPr>
+          <p:nvPr>
+            <p:ph idx="1"/>
+          </p:nvPr>
+        </p:nvSpPr>
+        <p:spPr/>
+        <p:txBody>
+          <a:bodyPr/>
+          <a:lstStyle/>
+          <a:p>
+            <a:r>
+              <a:rPr lang="en-US" dirty="0" smtClean="0"/>
+              <a:t>Why were visual features so bad?</a:t>
+            </a:r>
+          </a:p>
+          <a:p>
+            <a:r>
+              <a:rPr lang="en-US" dirty="0" smtClean="0"/>
+              <a:t>Further experiments using just SIFT features</a:t>
+            </a:r>
+          </a:p>
+          <a:p>
+            <a:r>
+              <a:rPr lang="en-US" dirty="0" smtClean="0"/>
+              <a:t>Experiment with different uses of external data, such as </a:t>
+            </a:r>
+            <a:r>
+              <a:rPr lang="en-US" dirty="0" err="1" smtClean="0"/>
+              <a:t>geonames</a:t>
+            </a:r>
+            <a:endParaRPr lang="en-US" dirty="0" smtClean="0"/>
+          </a:p>
+        </p:txBody>
+      </p:sp>
+    </p:spTree>
+    <p:extLst>
+      <p:ext uri="{BB962C8B-B14F-4D97-AF65-F5344CB8AC3E}">
+        <p14:creationId xmlns:p14="http://schemas.microsoft.com/office/powerpoint/2010/main" val="2083802015"/>
+      </p:ext>
+    </p:extLst>
+  </p:cSld>
+  <p:clrMapOvr>
+    <a:masterClrMapping/>
+  </p:clrMapOvr>
+  <p:timing>
+    <p:tnLst>
+      <p:par>
+        <p:cTn xmlns:p14="http://schemas.microsoft.com/office/powerpoint/2010/main" id="1" dur="indefinite" restart="never" nodeType="tmRoot"/>
+      </p:par>
+    </p:tnLst>
+  </p:timing>
+</p:sld>
+</file>
+
+<file path=ppt/slides/slide14.xml><?xml version="1.0" encoding="utf-8"?>
+<p:sld xmlns:a="http://schemas.openxmlformats.org/drawingml/2006/main" xmlns:r="http://schemas.openxmlformats.org/officeDocument/2006/relationships" xmlns:p="http://schemas.openxmlformats.org/presentationml/2006/main">
+  <p:cSld>
+    <p:spTree>
+      <p:nvGrpSpPr>
+        <p:cNvPr id="1" name=""/>
+        <p:cNvGrpSpPr/>
+        <p:nvPr/>
+      </p:nvGrpSpPr>
+      <p:grpSpPr>
+        <a:xfrm>
+          <a:off x="0" y="0"/>
+          <a:ext cx="0" cy="0"/>
+          <a:chOff x="0" y="0"/>
+          <a:chExt cx="0" cy="0"/>
+        </a:xfrm>
+      </p:grpSpPr>
+      <p:sp>
+        <p:nvSpPr>
+          <p:cNvPr id="2" name="Title 1"/>
+          <p:cNvSpPr>
+            <a:spLocks noGrp="1"/>
+          </p:cNvSpPr>
+          <p:nvPr>
+            <p:ph type="title"/>
+          </p:nvPr>
+        </p:nvSpPr>
+        <p:spPr>
+          <a:xfrm>
+            <a:off x="457200" y="2458758"/>
+            <a:ext cx="8229600" cy="1143000"/>
+          </a:xfrm>
+        </p:spPr>
+        <p:txBody>
+          <a:bodyPr/>
+          <a:lstStyle/>
+          <a:p>
+            <a:r>
+              <a:rPr lang="en-US" dirty="0" smtClean="0"/>
+              <a:t>Questions?</a:t>
+            </a:r>
+            <a:endParaRPr lang="en-US" dirty="0"/>
+          </a:p>
+        </p:txBody>
+      </p:sp>
+    </p:spTree>
+    <p:extLst>
+      <p:ext uri="{BB962C8B-B14F-4D97-AF65-F5344CB8AC3E}">
+        <p14:creationId xmlns:p14="http://schemas.microsoft.com/office/powerpoint/2010/main" val="3811083936"/>
+      </p:ext>
+    </p:extLst>
+  </p:cSld>
+  <p:clrMapOvr>
+    <a:masterClrMapping/>
+  </p:clrMapOvr>
+  <p:timing>
+    <p:tnLst>
+      <p:par>
+        <p:cTn xmlns:p14="http://schemas.microsoft.com/office/powerpoint/2010/main" id="1" dur="indefinite" restart="never" nodeType="tmRoot"/>
+      </p:par>
+    </p:tnLst>
+  </p:timing>
+</p:sld>
+</file>
+
 <file path=ppt/slides/slide2.xml><?xml version="1.0" encoding="utf-8"?>
 <p:sld xmlns:a="http://schemas.openxmlformats.org/drawingml/2006/main" xmlns:r="http://schemas.openxmlformats.org/officeDocument/2006/relationships" xmlns:p="http://schemas.openxmlformats.org/presentationml/2006/main">
   <p:cSld>
@@ -3861,576 +5642,21 @@
           <a:p>
             <a:r>
               <a:rPr lang="en-US" dirty="0" smtClean="0"/>
-              <a:t>Metadata Features</a:t>
+              <a:t>LOCATION PRIOR</a:t>
             </a:r>
             <a:endParaRPr lang="en-US" dirty="0"/>
-          </a:p>
-        </p:txBody>
-      </p:sp>
-      <p:sp>
-        <p:nvSpPr>
-          <p:cNvPr id="3" name="Content Placeholder 2"/>
-          <p:cNvSpPr>
-            <a:spLocks noGrp="1"/>
-          </p:cNvSpPr>
-          <p:nvPr>
-            <p:ph idx="1"/>
-          </p:nvPr>
-        </p:nvSpPr>
-        <p:spPr>
-          <a:xfrm>
-            <a:off x="457200" y="1415443"/>
-            <a:ext cx="4171982" cy="4525963"/>
-          </a:xfrm>
-        </p:spPr>
-        <p:txBody>
-          <a:bodyPr/>
-          <a:lstStyle/>
-          <a:p>
-            <a:pPr marL="0" indent="0" algn="ctr">
-              <a:buNone/>
-            </a:pPr>
-            <a:r>
-              <a:rPr lang="en-US" dirty="0" smtClean="0"/>
-              <a:t>Location Prior</a:t>
-            </a:r>
-            <a:endParaRPr lang="en-US" dirty="0"/>
-          </a:p>
-        </p:txBody>
-      </p:sp>
-      <p:sp>
-        <p:nvSpPr>
-          <p:cNvPr id="4" name="Content Placeholder 2"/>
-          <p:cNvSpPr txBox="1">
-            <a:spLocks/>
-          </p:cNvSpPr>
-          <p:nvPr/>
-        </p:nvSpPr>
-        <p:spPr>
-          <a:xfrm>
-            <a:off x="4629182" y="1417638"/>
-            <a:ext cx="4171982" cy="4525963"/>
-          </a:xfrm>
-          <a:prstGeom prst="rect">
-            <a:avLst/>
-          </a:prstGeom>
-        </p:spPr>
-        <p:txBody>
-          <a:bodyPr vert="horz" lIns="91440" tIns="45720" rIns="91440" bIns="45720" rtlCol="0">
-            <a:normAutofit/>
-          </a:bodyPr>
-          <a:lstStyle>
-            <a:lvl1pPr marL="342900" indent="-342900" algn="l" defTabSz="457200" rtl="0" eaLnBrk="1" latinLnBrk="0" hangingPunct="1">
-              <a:spcBef>
-                <a:spcPct val="20000"/>
-              </a:spcBef>
-              <a:buFont typeface="Arial"/>
-              <a:buChar char="•"/>
-              <a:defRPr sz="3200" kern="1200">
-                <a:solidFill>
-                  <a:schemeClr val="tx1"/>
-                </a:solidFill>
-                <a:latin typeface="DigitalStrip"/>
-                <a:ea typeface="+mn-ea"/>
-                <a:cs typeface="+mn-cs"/>
-              </a:defRPr>
-            </a:lvl1pPr>
-            <a:lvl2pPr marL="742950" indent="-285750" algn="l" defTabSz="457200" rtl="0" eaLnBrk="1" latinLnBrk="0" hangingPunct="1">
-              <a:spcBef>
-                <a:spcPct val="20000"/>
-              </a:spcBef>
-              <a:buFont typeface="Arial"/>
-              <a:buChar char="–"/>
-              <a:defRPr sz="2800" kern="1200">
-                <a:solidFill>
-                  <a:schemeClr val="tx1"/>
-                </a:solidFill>
-                <a:latin typeface="DigitalStrip"/>
-                <a:ea typeface="+mn-ea"/>
-                <a:cs typeface="+mn-cs"/>
-              </a:defRPr>
-            </a:lvl2pPr>
-            <a:lvl3pPr marL="1143000" indent="-228600" algn="l" defTabSz="457200" rtl="0" eaLnBrk="1" latinLnBrk="0" hangingPunct="1">
-              <a:spcBef>
-                <a:spcPct val="20000"/>
-              </a:spcBef>
-              <a:buFont typeface="Arial"/>
-              <a:buChar char="•"/>
-              <a:defRPr sz="2400" kern="1200">
-                <a:solidFill>
-                  <a:schemeClr val="tx1"/>
-                </a:solidFill>
-                <a:latin typeface="DigitalStrip"/>
-                <a:ea typeface="+mn-ea"/>
-                <a:cs typeface="+mn-cs"/>
-              </a:defRPr>
-            </a:lvl3pPr>
-            <a:lvl4pPr marL="1600200" indent="-228600" algn="l" defTabSz="457200" rtl="0" eaLnBrk="1" latinLnBrk="0" hangingPunct="1">
-              <a:spcBef>
-                <a:spcPct val="20000"/>
-              </a:spcBef>
-              <a:buFont typeface="Arial"/>
-              <a:buChar char="–"/>
-              <a:defRPr sz="2000" kern="1200">
-                <a:solidFill>
-                  <a:schemeClr val="tx1"/>
-                </a:solidFill>
-                <a:latin typeface="DigitalStrip"/>
-                <a:ea typeface="+mn-ea"/>
-                <a:cs typeface="+mn-cs"/>
-              </a:defRPr>
-            </a:lvl4pPr>
-            <a:lvl5pPr marL="2057400" indent="-228600" algn="l" defTabSz="457200" rtl="0" eaLnBrk="1" latinLnBrk="0" hangingPunct="1">
-              <a:spcBef>
-                <a:spcPct val="20000"/>
-              </a:spcBef>
-              <a:buFont typeface="Arial"/>
-              <a:buChar char="»"/>
-              <a:defRPr sz="2000" kern="1200">
-                <a:solidFill>
-                  <a:schemeClr val="tx1"/>
-                </a:solidFill>
-                <a:latin typeface="DigitalStrip"/>
-                <a:ea typeface="+mn-ea"/>
-                <a:cs typeface="+mn-cs"/>
-              </a:defRPr>
-            </a:lvl5pPr>
-            <a:lvl6pPr marL="2514600" indent="-228600" algn="l" defTabSz="457200" rtl="0" eaLnBrk="1" latinLnBrk="0" hangingPunct="1">
-              <a:spcBef>
-                <a:spcPct val="20000"/>
-              </a:spcBef>
-              <a:buFont typeface="Arial"/>
-              <a:buChar char="•"/>
-              <a:defRPr sz="2000" kern="1200">
-                <a:solidFill>
-                  <a:schemeClr val="tx1"/>
-                </a:solidFill>
-                <a:latin typeface="+mn-lt"/>
-                <a:ea typeface="+mn-ea"/>
-                <a:cs typeface="+mn-cs"/>
-              </a:defRPr>
-            </a:lvl6pPr>
-            <a:lvl7pPr marL="2971800" indent="-228600" algn="l" defTabSz="457200" rtl="0" eaLnBrk="1" latinLnBrk="0" hangingPunct="1">
-              <a:spcBef>
-                <a:spcPct val="20000"/>
-              </a:spcBef>
-              <a:buFont typeface="Arial"/>
-              <a:buChar char="•"/>
-              <a:defRPr sz="2000" kern="1200">
-                <a:solidFill>
-                  <a:schemeClr val="tx1"/>
-                </a:solidFill>
-                <a:latin typeface="+mn-lt"/>
-                <a:ea typeface="+mn-ea"/>
-                <a:cs typeface="+mn-cs"/>
-              </a:defRPr>
-            </a:lvl7pPr>
-            <a:lvl8pPr marL="3429000" indent="-228600" algn="l" defTabSz="457200" rtl="0" eaLnBrk="1" latinLnBrk="0" hangingPunct="1">
-              <a:spcBef>
-                <a:spcPct val="20000"/>
-              </a:spcBef>
-              <a:buFont typeface="Arial"/>
-              <a:buChar char="•"/>
-              <a:defRPr sz="2000" kern="1200">
-                <a:solidFill>
-                  <a:schemeClr val="tx1"/>
-                </a:solidFill>
-                <a:latin typeface="+mn-lt"/>
-                <a:ea typeface="+mn-ea"/>
-                <a:cs typeface="+mn-cs"/>
-              </a:defRPr>
-            </a:lvl8pPr>
-            <a:lvl9pPr marL="3886200" indent="-228600" algn="l" defTabSz="457200" rtl="0" eaLnBrk="1" latinLnBrk="0" hangingPunct="1">
-              <a:spcBef>
-                <a:spcPct val="20000"/>
-              </a:spcBef>
-              <a:buFont typeface="Arial"/>
-              <a:buChar char="•"/>
-              <a:defRPr sz="2000" kern="1200">
-                <a:solidFill>
-                  <a:schemeClr val="tx1"/>
-                </a:solidFill>
-                <a:latin typeface="+mn-lt"/>
-                <a:ea typeface="+mn-ea"/>
-                <a:cs typeface="+mn-cs"/>
-              </a:defRPr>
-            </a:lvl9pPr>
-          </a:lstStyle>
-          <a:p>
-            <a:pPr marL="0" indent="0" algn="ctr">
-              <a:buNone/>
-            </a:pPr>
-            <a:r>
-              <a:rPr lang="en-US" dirty="0" smtClean="0"/>
-              <a:t>TAGS</a:t>
-            </a:r>
-            <a:endParaRPr lang="en-US" dirty="0"/>
-          </a:p>
-        </p:txBody>
-      </p:sp>
-      <p:sp>
-        <p:nvSpPr>
-          <p:cNvPr id="6" name="Content Placeholder 2"/>
-          <p:cNvSpPr txBox="1">
-            <a:spLocks/>
-          </p:cNvSpPr>
-          <p:nvPr/>
-        </p:nvSpPr>
-        <p:spPr>
-          <a:xfrm>
-            <a:off x="457200" y="1993746"/>
-            <a:ext cx="4171982" cy="4525963"/>
-          </a:xfrm>
-          <a:prstGeom prst="rect">
-            <a:avLst/>
-          </a:prstGeom>
-        </p:spPr>
-        <p:txBody>
-          <a:bodyPr vert="horz" lIns="91440" tIns="45720" rIns="91440" bIns="45720" rtlCol="0">
-            <a:normAutofit/>
-          </a:bodyPr>
-          <a:lstStyle>
-            <a:lvl1pPr marL="342900" indent="-342900" algn="l" defTabSz="457200" rtl="0" eaLnBrk="1" latinLnBrk="0" hangingPunct="1">
-              <a:spcBef>
-                <a:spcPct val="20000"/>
-              </a:spcBef>
-              <a:buFont typeface="Arial"/>
-              <a:buChar char="•"/>
-              <a:defRPr sz="3200" kern="1200">
-                <a:solidFill>
-                  <a:schemeClr val="tx1"/>
-                </a:solidFill>
-                <a:latin typeface="DigitalStrip"/>
-                <a:ea typeface="+mn-ea"/>
-                <a:cs typeface="+mn-cs"/>
-              </a:defRPr>
-            </a:lvl1pPr>
-            <a:lvl2pPr marL="742950" indent="-285750" algn="l" defTabSz="457200" rtl="0" eaLnBrk="1" latinLnBrk="0" hangingPunct="1">
-              <a:spcBef>
-                <a:spcPct val="20000"/>
-              </a:spcBef>
-              <a:buFont typeface="Arial"/>
-              <a:buChar char="–"/>
-              <a:defRPr sz="2800" kern="1200">
-                <a:solidFill>
-                  <a:schemeClr val="tx1"/>
-                </a:solidFill>
-                <a:latin typeface="DigitalStrip"/>
-                <a:ea typeface="+mn-ea"/>
-                <a:cs typeface="+mn-cs"/>
-              </a:defRPr>
-            </a:lvl2pPr>
-            <a:lvl3pPr marL="1143000" indent="-228600" algn="l" defTabSz="457200" rtl="0" eaLnBrk="1" latinLnBrk="0" hangingPunct="1">
-              <a:spcBef>
-                <a:spcPct val="20000"/>
-              </a:spcBef>
-              <a:buFont typeface="Arial"/>
-              <a:buChar char="•"/>
-              <a:defRPr sz="2400" kern="1200">
-                <a:solidFill>
-                  <a:schemeClr val="tx1"/>
-                </a:solidFill>
-                <a:latin typeface="DigitalStrip"/>
-                <a:ea typeface="+mn-ea"/>
-                <a:cs typeface="+mn-cs"/>
-              </a:defRPr>
-            </a:lvl3pPr>
-            <a:lvl4pPr marL="1600200" indent="-228600" algn="l" defTabSz="457200" rtl="0" eaLnBrk="1" latinLnBrk="0" hangingPunct="1">
-              <a:spcBef>
-                <a:spcPct val="20000"/>
-              </a:spcBef>
-              <a:buFont typeface="Arial"/>
-              <a:buChar char="–"/>
-              <a:defRPr sz="2000" kern="1200">
-                <a:solidFill>
-                  <a:schemeClr val="tx1"/>
-                </a:solidFill>
-                <a:latin typeface="DigitalStrip"/>
-                <a:ea typeface="+mn-ea"/>
-                <a:cs typeface="+mn-cs"/>
-              </a:defRPr>
-            </a:lvl4pPr>
-            <a:lvl5pPr marL="2057400" indent="-228600" algn="l" defTabSz="457200" rtl="0" eaLnBrk="1" latinLnBrk="0" hangingPunct="1">
-              <a:spcBef>
-                <a:spcPct val="20000"/>
-              </a:spcBef>
-              <a:buFont typeface="Arial"/>
-              <a:buChar char="»"/>
-              <a:defRPr sz="2000" kern="1200">
-                <a:solidFill>
-                  <a:schemeClr val="tx1"/>
-                </a:solidFill>
-                <a:latin typeface="DigitalStrip"/>
-                <a:ea typeface="+mn-ea"/>
-                <a:cs typeface="+mn-cs"/>
-              </a:defRPr>
-            </a:lvl5pPr>
-            <a:lvl6pPr marL="2514600" indent="-228600" algn="l" defTabSz="457200" rtl="0" eaLnBrk="1" latinLnBrk="0" hangingPunct="1">
-              <a:spcBef>
-                <a:spcPct val="20000"/>
-              </a:spcBef>
-              <a:buFont typeface="Arial"/>
-              <a:buChar char="•"/>
-              <a:defRPr sz="2000" kern="1200">
-                <a:solidFill>
-                  <a:schemeClr val="tx1"/>
-                </a:solidFill>
-                <a:latin typeface="+mn-lt"/>
-                <a:ea typeface="+mn-ea"/>
-                <a:cs typeface="+mn-cs"/>
-              </a:defRPr>
-            </a:lvl6pPr>
-            <a:lvl7pPr marL="2971800" indent="-228600" algn="l" defTabSz="457200" rtl="0" eaLnBrk="1" latinLnBrk="0" hangingPunct="1">
-              <a:spcBef>
-                <a:spcPct val="20000"/>
-              </a:spcBef>
-              <a:buFont typeface="Arial"/>
-              <a:buChar char="•"/>
-              <a:defRPr sz="2000" kern="1200">
-                <a:solidFill>
-                  <a:schemeClr val="tx1"/>
-                </a:solidFill>
-                <a:latin typeface="+mn-lt"/>
-                <a:ea typeface="+mn-ea"/>
-                <a:cs typeface="+mn-cs"/>
-              </a:defRPr>
-            </a:lvl7pPr>
-            <a:lvl8pPr marL="3429000" indent="-228600" algn="l" defTabSz="457200" rtl="0" eaLnBrk="1" latinLnBrk="0" hangingPunct="1">
-              <a:spcBef>
-                <a:spcPct val="20000"/>
-              </a:spcBef>
-              <a:buFont typeface="Arial"/>
-              <a:buChar char="•"/>
-              <a:defRPr sz="2000" kern="1200">
-                <a:solidFill>
-                  <a:schemeClr val="tx1"/>
-                </a:solidFill>
-                <a:latin typeface="+mn-lt"/>
-                <a:ea typeface="+mn-ea"/>
-                <a:cs typeface="+mn-cs"/>
-              </a:defRPr>
-            </a:lvl8pPr>
-            <a:lvl9pPr marL="3886200" indent="-228600" algn="l" defTabSz="457200" rtl="0" eaLnBrk="1" latinLnBrk="0" hangingPunct="1">
-              <a:spcBef>
-                <a:spcPct val="20000"/>
-              </a:spcBef>
-              <a:buFont typeface="Arial"/>
-              <a:buChar char="•"/>
-              <a:defRPr sz="2000" kern="1200">
-                <a:solidFill>
-                  <a:schemeClr val="tx1"/>
-                </a:solidFill>
-                <a:latin typeface="+mn-lt"/>
-                <a:ea typeface="+mn-ea"/>
-                <a:cs typeface="+mn-cs"/>
-              </a:defRPr>
-            </a:lvl9pPr>
-          </a:lstStyle>
-          <a:p>
-            <a:r>
-              <a:rPr lang="en-US" sz="2400" dirty="0"/>
-              <a:t>A prior feature was </a:t>
-            </a:r>
-            <a:r>
-              <a:rPr lang="en-US" sz="2400" dirty="0" smtClean="0"/>
-              <a:t>constructed based </a:t>
-            </a:r>
-            <a:r>
-              <a:rPr lang="en-US" sz="2400" dirty="0"/>
-              <a:t>on where photos are most likely to be </a:t>
-            </a:r>
-            <a:r>
-              <a:rPr lang="en-US" sz="2400" dirty="0" smtClean="0"/>
-              <a:t>taken</a:t>
-            </a:r>
-            <a:endParaRPr lang="en-US" sz="2400" dirty="0"/>
-          </a:p>
-        </p:txBody>
-      </p:sp>
-      <p:sp>
-        <p:nvSpPr>
-          <p:cNvPr id="7" name="Content Placeholder 2"/>
-          <p:cNvSpPr txBox="1">
-            <a:spLocks/>
-          </p:cNvSpPr>
-          <p:nvPr/>
-        </p:nvSpPr>
-        <p:spPr>
-          <a:xfrm>
-            <a:off x="4629182" y="1993746"/>
-            <a:ext cx="4171982" cy="4525963"/>
-          </a:xfrm>
-          <a:prstGeom prst="rect">
-            <a:avLst/>
-          </a:prstGeom>
-        </p:spPr>
-        <p:txBody>
-          <a:bodyPr vert="horz" lIns="91440" tIns="45720" rIns="91440" bIns="45720" rtlCol="0">
-            <a:normAutofit/>
-          </a:bodyPr>
-          <a:lstStyle>
-            <a:lvl1pPr marL="342900" indent="-342900" algn="l" defTabSz="457200" rtl="0" eaLnBrk="1" latinLnBrk="0" hangingPunct="1">
-              <a:spcBef>
-                <a:spcPct val="20000"/>
-              </a:spcBef>
-              <a:buFont typeface="Arial"/>
-              <a:buChar char="•"/>
-              <a:defRPr sz="3200" kern="1200">
-                <a:solidFill>
-                  <a:schemeClr val="tx1"/>
-                </a:solidFill>
-                <a:latin typeface="DigitalStrip"/>
-                <a:ea typeface="+mn-ea"/>
-                <a:cs typeface="+mn-cs"/>
-              </a:defRPr>
-            </a:lvl1pPr>
-            <a:lvl2pPr marL="742950" indent="-285750" algn="l" defTabSz="457200" rtl="0" eaLnBrk="1" latinLnBrk="0" hangingPunct="1">
-              <a:spcBef>
-                <a:spcPct val="20000"/>
-              </a:spcBef>
-              <a:buFont typeface="Arial"/>
-              <a:buChar char="–"/>
-              <a:defRPr sz="2800" kern="1200">
-                <a:solidFill>
-                  <a:schemeClr val="tx1"/>
-                </a:solidFill>
-                <a:latin typeface="DigitalStrip"/>
-                <a:ea typeface="+mn-ea"/>
-                <a:cs typeface="+mn-cs"/>
-              </a:defRPr>
-            </a:lvl2pPr>
-            <a:lvl3pPr marL="1143000" indent="-228600" algn="l" defTabSz="457200" rtl="0" eaLnBrk="1" latinLnBrk="0" hangingPunct="1">
-              <a:spcBef>
-                <a:spcPct val="20000"/>
-              </a:spcBef>
-              <a:buFont typeface="Arial"/>
-              <a:buChar char="•"/>
-              <a:defRPr sz="2400" kern="1200">
-                <a:solidFill>
-                  <a:schemeClr val="tx1"/>
-                </a:solidFill>
-                <a:latin typeface="DigitalStrip"/>
-                <a:ea typeface="+mn-ea"/>
-                <a:cs typeface="+mn-cs"/>
-              </a:defRPr>
-            </a:lvl3pPr>
-            <a:lvl4pPr marL="1600200" indent="-228600" algn="l" defTabSz="457200" rtl="0" eaLnBrk="1" latinLnBrk="0" hangingPunct="1">
-              <a:spcBef>
-                <a:spcPct val="20000"/>
-              </a:spcBef>
-              <a:buFont typeface="Arial"/>
-              <a:buChar char="–"/>
-              <a:defRPr sz="2000" kern="1200">
-                <a:solidFill>
-                  <a:schemeClr val="tx1"/>
-                </a:solidFill>
-                <a:latin typeface="DigitalStrip"/>
-                <a:ea typeface="+mn-ea"/>
-                <a:cs typeface="+mn-cs"/>
-              </a:defRPr>
-            </a:lvl4pPr>
-            <a:lvl5pPr marL="2057400" indent="-228600" algn="l" defTabSz="457200" rtl="0" eaLnBrk="1" latinLnBrk="0" hangingPunct="1">
-              <a:spcBef>
-                <a:spcPct val="20000"/>
-              </a:spcBef>
-              <a:buFont typeface="Arial"/>
-              <a:buChar char="»"/>
-              <a:defRPr sz="2000" kern="1200">
-                <a:solidFill>
-                  <a:schemeClr val="tx1"/>
-                </a:solidFill>
-                <a:latin typeface="DigitalStrip"/>
-                <a:ea typeface="+mn-ea"/>
-                <a:cs typeface="+mn-cs"/>
-              </a:defRPr>
-            </a:lvl5pPr>
-            <a:lvl6pPr marL="2514600" indent="-228600" algn="l" defTabSz="457200" rtl="0" eaLnBrk="1" latinLnBrk="0" hangingPunct="1">
-              <a:spcBef>
-                <a:spcPct val="20000"/>
-              </a:spcBef>
-              <a:buFont typeface="Arial"/>
-              <a:buChar char="•"/>
-              <a:defRPr sz="2000" kern="1200">
-                <a:solidFill>
-                  <a:schemeClr val="tx1"/>
-                </a:solidFill>
-                <a:latin typeface="+mn-lt"/>
-                <a:ea typeface="+mn-ea"/>
-                <a:cs typeface="+mn-cs"/>
-              </a:defRPr>
-            </a:lvl6pPr>
-            <a:lvl7pPr marL="2971800" indent="-228600" algn="l" defTabSz="457200" rtl="0" eaLnBrk="1" latinLnBrk="0" hangingPunct="1">
-              <a:spcBef>
-                <a:spcPct val="20000"/>
-              </a:spcBef>
-              <a:buFont typeface="Arial"/>
-              <a:buChar char="•"/>
-              <a:defRPr sz="2000" kern="1200">
-                <a:solidFill>
-                  <a:schemeClr val="tx1"/>
-                </a:solidFill>
-                <a:latin typeface="+mn-lt"/>
-                <a:ea typeface="+mn-ea"/>
-                <a:cs typeface="+mn-cs"/>
-              </a:defRPr>
-            </a:lvl7pPr>
-            <a:lvl8pPr marL="3429000" indent="-228600" algn="l" defTabSz="457200" rtl="0" eaLnBrk="1" latinLnBrk="0" hangingPunct="1">
-              <a:spcBef>
-                <a:spcPct val="20000"/>
-              </a:spcBef>
-              <a:buFont typeface="Arial"/>
-              <a:buChar char="•"/>
-              <a:defRPr sz="2000" kern="1200">
-                <a:solidFill>
-                  <a:schemeClr val="tx1"/>
-                </a:solidFill>
-                <a:latin typeface="+mn-lt"/>
-                <a:ea typeface="+mn-ea"/>
-                <a:cs typeface="+mn-cs"/>
-              </a:defRPr>
-            </a:lvl8pPr>
-            <a:lvl9pPr marL="3886200" indent="-228600" algn="l" defTabSz="457200" rtl="0" eaLnBrk="1" latinLnBrk="0" hangingPunct="1">
-              <a:spcBef>
-                <a:spcPct val="20000"/>
-              </a:spcBef>
-              <a:buFont typeface="Arial"/>
-              <a:buChar char="•"/>
-              <a:defRPr sz="2000" kern="1200">
-                <a:solidFill>
-                  <a:schemeClr val="tx1"/>
-                </a:solidFill>
-                <a:latin typeface="+mn-lt"/>
-                <a:ea typeface="+mn-ea"/>
-                <a:cs typeface="+mn-cs"/>
-              </a:defRPr>
-            </a:lvl9pPr>
-          </a:lstStyle>
-          <a:p>
-            <a:r>
-              <a:rPr lang="en-US" sz="2400" dirty="0" smtClean="0"/>
-              <a:t>Tags treated separately</a:t>
-            </a:r>
-          </a:p>
-          <a:p>
-            <a:r>
-              <a:rPr lang="en-US" sz="2400" dirty="0" smtClean="0"/>
-              <a:t>Each tag returns a set of likely locations</a:t>
-            </a:r>
-          </a:p>
-          <a:p>
-            <a:endParaRPr lang="en-US" dirty="0" smtClean="0"/>
           </a:p>
         </p:txBody>
       </p:sp>
       <p:pic>
         <p:nvPicPr>
-          <p:cNvPr id="8" name="Picture 7" descr="textual1.png"/>
+          <p:cNvPr id="10" name="Picture 9" descr="prior.jpg"/>
           <p:cNvPicPr>
             <a:picLocks noChangeAspect="1"/>
           </p:cNvPicPr>
           <p:nvPr/>
         </p:nvPicPr>
-        <p:blipFill>
+        <p:blipFill rotWithShape="1">
           <a:blip r:embed="rId3">
             <a:extLst>
               <a:ext uri="{28A0092B-C50C-407E-A947-70E740481C1C}">
@@ -4438,74 +5664,13 @@
               </a:ext>
             </a:extLst>
           </a:blip>
-          <a:stretch>
-            <a:fillRect/>
-          </a:stretch>
+          <a:srcRect l="6979" b="11283"/>
+          <a:stretch/>
         </p:blipFill>
         <p:spPr>
           <a:xfrm>
-            <a:off x="539130" y="4083369"/>
-            <a:ext cx="3860800" cy="2133600"/>
-          </a:xfrm>
-          <a:prstGeom prst="rect">
-            <a:avLst/>
-          </a:prstGeom>
-        </p:spPr>
-      </p:pic>
-      <p:pic>
-        <p:nvPicPr>
-          <p:cNvPr id="9" name="Picture 8" descr="textual2.png"/>
-          <p:cNvPicPr>
-            <a:picLocks noChangeAspect="1"/>
-          </p:cNvPicPr>
-          <p:nvPr/>
-        </p:nvPicPr>
-        <p:blipFill>
-          <a:blip r:embed="rId4">
-            <a:extLst>
-              <a:ext uri="{28A0092B-C50C-407E-A947-70E740481C1C}">
-                <a14:useLocalDpi xmlns:a14="http://schemas.microsoft.com/office/drawing/2010/main" val="0"/>
-              </a:ext>
-            </a:extLst>
-          </a:blip>
-          <a:stretch>
-            <a:fillRect/>
-          </a:stretch>
-        </p:blipFill>
-        <p:spPr>
-          <a:xfrm rot="21223781">
-            <a:off x="4710692" y="3964530"/>
-            <a:ext cx="2839683" cy="1648130"/>
-          </a:xfrm>
-          <a:prstGeom prst="rect">
-            <a:avLst/>
-          </a:prstGeom>
-        </p:spPr>
-      </p:pic>
-      <p:pic>
-        <p:nvPicPr>
-          <p:cNvPr id="11" name="Picture 10" descr="textual3w.png"/>
-          <p:cNvPicPr>
-            <a:picLocks noChangeAspect="1"/>
-          </p:cNvPicPr>
-          <p:nvPr/>
-        </p:nvPicPr>
-        <p:blipFill>
-          <a:blip r:embed="rId5">
-            <a:extLst>
-              <a:ext uri="{28A0092B-C50C-407E-A947-70E740481C1C}">
-                <a14:useLocalDpi xmlns:a14="http://schemas.microsoft.com/office/drawing/2010/main" val="0"/>
-              </a:ext>
-            </a:extLst>
-          </a:blip>
-          <a:stretch>
-            <a:fillRect/>
-          </a:stretch>
-        </p:blipFill>
-        <p:spPr>
-          <a:xfrm rot="229327">
-            <a:off x="6208504" y="4805181"/>
-            <a:ext cx="2592659" cy="1395202"/>
+            <a:off x="633996" y="1104643"/>
+            <a:ext cx="7876008" cy="5304771"/>
           </a:xfrm>
           <a:prstGeom prst="rect">
             <a:avLst/>
@@ -4533,6 +5698,160 @@
 </file>
 
 <file path=ppt/slides/slide4.xml><?xml version="1.0" encoding="utf-8"?>
+<p:sld xmlns:a="http://schemas.openxmlformats.org/drawingml/2006/main" xmlns:r="http://schemas.openxmlformats.org/officeDocument/2006/relationships" xmlns:p="http://schemas.openxmlformats.org/presentationml/2006/main">
+  <p:cSld>
+    <p:spTree>
+      <p:nvGrpSpPr>
+        <p:cNvPr id="1" name=""/>
+        <p:cNvGrpSpPr/>
+        <p:nvPr/>
+      </p:nvGrpSpPr>
+      <p:grpSpPr>
+        <a:xfrm>
+          <a:off x="0" y="0"/>
+          <a:ext cx="0" cy="0"/>
+          <a:chOff x="0" y="0"/>
+          <a:chExt cx="0" cy="0"/>
+        </a:xfrm>
+      </p:grpSpPr>
+      <p:sp>
+        <p:nvSpPr>
+          <p:cNvPr id="2" name="Title 1"/>
+          <p:cNvSpPr>
+            <a:spLocks noGrp="1"/>
+          </p:cNvSpPr>
+          <p:nvPr>
+            <p:ph type="title"/>
+          </p:nvPr>
+        </p:nvSpPr>
+        <p:spPr/>
+        <p:txBody>
+          <a:bodyPr/>
+          <a:lstStyle/>
+          <a:p>
+            <a:r>
+              <a:rPr lang="en-US" dirty="0" smtClean="0"/>
+              <a:t>TAGS</a:t>
+            </a:r>
+            <a:endParaRPr lang="en-US" dirty="0"/>
+          </a:p>
+        </p:txBody>
+      </p:sp>
+      <p:sp>
+        <p:nvSpPr>
+          <p:cNvPr id="13" name="Content Placeholder 4"/>
+          <p:cNvSpPr>
+            <a:spLocks noGrp="1"/>
+          </p:cNvSpPr>
+          <p:nvPr>
+            <p:ph idx="1"/>
+          </p:nvPr>
+        </p:nvSpPr>
+        <p:spPr>
+          <a:xfrm>
+            <a:off x="457200" y="1600200"/>
+            <a:ext cx="8229600" cy="4525963"/>
+          </a:xfrm>
+        </p:spPr>
+        <p:txBody>
+          <a:bodyPr/>
+          <a:lstStyle/>
+          <a:p>
+            <a:r>
+              <a:rPr lang="en-US" dirty="0" smtClean="0"/>
+              <a:t>Tags treated separately</a:t>
+            </a:r>
+          </a:p>
+          <a:p>
+            <a:r>
+              <a:rPr lang="en-US" dirty="0" smtClean="0"/>
+              <a:t>Each tag returns a set of likely locations</a:t>
+            </a:r>
+            <a:endParaRPr lang="en-US" dirty="0"/>
+          </a:p>
+        </p:txBody>
+      </p:sp>
+      <p:pic>
+        <p:nvPicPr>
+          <p:cNvPr id="14" name="Picture 13" descr="textual2.png"/>
+          <p:cNvPicPr>
+            <a:picLocks noChangeAspect="1"/>
+          </p:cNvPicPr>
+          <p:nvPr/>
+        </p:nvPicPr>
+        <p:blipFill>
+          <a:blip r:embed="rId3">
+            <a:extLst>
+              <a:ext uri="{28A0092B-C50C-407E-A947-70E740481C1C}">
+                <a14:useLocalDpi xmlns:a14="http://schemas.microsoft.com/office/drawing/2010/main" val="0"/>
+              </a:ext>
+            </a:extLst>
+          </a:blip>
+          <a:stretch>
+            <a:fillRect/>
+          </a:stretch>
+        </p:blipFill>
+        <p:spPr>
+          <a:xfrm>
+            <a:off x="751071" y="3552513"/>
+            <a:ext cx="3879108" cy="2251404"/>
+          </a:xfrm>
+          <a:prstGeom prst="rect">
+            <a:avLst/>
+          </a:prstGeom>
+        </p:spPr>
+      </p:pic>
+      <p:pic>
+        <p:nvPicPr>
+          <p:cNvPr id="15" name="Picture 14" descr="textual3.png"/>
+          <p:cNvPicPr>
+            <a:picLocks noChangeAspect="1"/>
+          </p:cNvPicPr>
+          <p:nvPr/>
+        </p:nvPicPr>
+        <p:blipFill>
+          <a:blip r:embed="rId4">
+            <a:extLst>
+              <a:ext uri="{28A0092B-C50C-407E-A947-70E740481C1C}">
+                <a14:useLocalDpi xmlns:a14="http://schemas.microsoft.com/office/drawing/2010/main" val="0"/>
+              </a:ext>
+            </a:extLst>
+          </a:blip>
+          <a:stretch>
+            <a:fillRect/>
+          </a:stretch>
+        </p:blipFill>
+        <p:spPr>
+          <a:xfrm>
+            <a:off x="4630179" y="3582048"/>
+            <a:ext cx="3762751" cy="2148027"/>
+          </a:xfrm>
+          <a:prstGeom prst="rect">
+            <a:avLst/>
+          </a:prstGeom>
+        </p:spPr>
+      </p:pic>
+    </p:spTree>
+    <p:extLst>
+      <p:ext uri="{BB962C8B-B14F-4D97-AF65-F5344CB8AC3E}">
+        <p14:creationId xmlns:p14="http://schemas.microsoft.com/office/powerpoint/2010/main" val="2292733577"/>
+      </p:ext>
+    </p:extLst>
+  </p:cSld>
+  <p:clrMapOvr>
+    <a:masterClrMapping/>
+  </p:clrMapOvr>
+  <p:timing>
+    <p:tnLst>
+      <p:par>
+        <p:cTn xmlns:p14="http://schemas.microsoft.com/office/powerpoint/2010/main" id="1" dur="indefinite" restart="never" nodeType="tmRoot"/>
+      </p:par>
+    </p:tnLst>
+  </p:timing>
+</p:sld>
+</file>
+
+<file path=ppt/slides/slide5.xml><?xml version="1.0" encoding="utf-8"?>
 <p:sld xmlns:a="http://schemas.openxmlformats.org/drawingml/2006/main" xmlns:r="http://schemas.openxmlformats.org/officeDocument/2006/relationships" xmlns:p="http://schemas.openxmlformats.org/presentationml/2006/main">
   <p:cSld>
     <p:spTree>
@@ -4965,7 +6284,7 @@
 </p:sld>
 </file>
 
-<file path=ppt/slides/slide5.xml><?xml version="1.0" encoding="utf-8"?>
+<file path=ppt/slides/slide6.xml><?xml version="1.0" encoding="utf-8"?>
 <p:sld xmlns:a="http://schemas.openxmlformats.org/drawingml/2006/main" xmlns:r="http://schemas.openxmlformats.org/officeDocument/2006/relationships" xmlns:p="http://schemas.openxmlformats.org/presentationml/2006/main">
   <p:cSld>
     <p:spTree>
@@ -5398,7 +6717,7 @@
 </p:sld>
 </file>
 
-<file path=ppt/slides/slide6.xml><?xml version="1.0" encoding="utf-8"?>
+<file path=ppt/slides/slide7.xml><?xml version="1.0" encoding="utf-8"?>
 <p:sld xmlns:a="http://schemas.openxmlformats.org/drawingml/2006/main" xmlns:r="http://schemas.openxmlformats.org/officeDocument/2006/relationships" xmlns:p="http://schemas.openxmlformats.org/presentationml/2006/main">
   <p:cSld>
     <p:spTree>
@@ -5780,7 +7099,7 @@
 </p:sld>
 </file>
 
-<file path=ppt/slides/slide7.xml><?xml version="1.0" encoding="utf-8"?>
+<file path=ppt/slides/slide8.xml><?xml version="1.0" encoding="utf-8"?>
 <p:sld xmlns:a="http://schemas.openxmlformats.org/drawingml/2006/main" xmlns:r="http://schemas.openxmlformats.org/officeDocument/2006/relationships" xmlns:p="http://schemas.openxmlformats.org/presentationml/2006/main">
   <p:cSld>
     <p:spTree>
@@ -5905,105 +7224,6 @@
 </p:sld>
 </file>
 
-<file path=ppt/slides/slide8.xml><?xml version="1.0" encoding="utf-8"?>
-<p:sld xmlns:a="http://schemas.openxmlformats.org/drawingml/2006/main" xmlns:r="http://schemas.openxmlformats.org/officeDocument/2006/relationships" xmlns:p="http://schemas.openxmlformats.org/presentationml/2006/main">
-  <p:cSld>
-    <p:spTree>
-      <p:nvGrpSpPr>
-        <p:cNvPr id="1" name=""/>
-        <p:cNvGrpSpPr/>
-        <p:nvPr/>
-      </p:nvGrpSpPr>
-      <p:grpSpPr>
-        <a:xfrm>
-          <a:off x="0" y="0"/>
-          <a:ext cx="0" cy="0"/>
-          <a:chOff x="0" y="0"/>
-          <a:chExt cx="0" cy="0"/>
-        </a:xfrm>
-      </p:grpSpPr>
-      <p:sp>
-        <p:nvSpPr>
-          <p:cNvPr id="2" name="Title 1"/>
-          <p:cNvSpPr>
-            <a:spLocks noGrp="1"/>
-          </p:cNvSpPr>
-          <p:nvPr>
-            <p:ph type="title"/>
-          </p:nvPr>
-        </p:nvSpPr>
-        <p:spPr/>
-        <p:txBody>
-          <a:bodyPr/>
-          <a:lstStyle/>
-          <a:p>
-            <a:r>
-              <a:rPr lang="en-US" dirty="0" smtClean="0"/>
-              <a:t>FUTURE WORK</a:t>
-            </a:r>
-            <a:endParaRPr lang="en-US" dirty="0"/>
-          </a:p>
-        </p:txBody>
-      </p:sp>
-      <p:sp>
-        <p:nvSpPr>
-          <p:cNvPr id="3" name="Content Placeholder 2"/>
-          <p:cNvSpPr>
-            <a:spLocks noGrp="1"/>
-          </p:cNvSpPr>
-          <p:nvPr>
-            <p:ph idx="1"/>
-          </p:nvPr>
-        </p:nvSpPr>
-        <p:spPr/>
-        <p:txBody>
-          <a:bodyPr/>
-          <a:lstStyle/>
-          <a:p>
-            <a:r>
-              <a:rPr lang="en-US" dirty="0" smtClean="0"/>
-              <a:t>Why were visual features so bad?</a:t>
-            </a:r>
-          </a:p>
-          <a:p>
-            <a:r>
-              <a:rPr lang="en-US" dirty="0" smtClean="0"/>
-              <a:t>Further experiments using just SIFT features</a:t>
-            </a:r>
-          </a:p>
-          <a:p>
-            <a:r>
-              <a:rPr lang="en-US" dirty="0" smtClean="0"/>
-              <a:t>Experiment with different uses of external data, such as </a:t>
-            </a:r>
-            <a:r>
-              <a:rPr lang="en-US" dirty="0" err="1" smtClean="0"/>
-              <a:t>geonames</a:t>
-            </a:r>
-            <a:endParaRPr lang="en-US" dirty="0" smtClean="0"/>
-          </a:p>
-        </p:txBody>
-      </p:sp>
-    </p:spTree>
-    <p:extLst>
-      <p:ext uri="{BB962C8B-B14F-4D97-AF65-F5344CB8AC3E}">
-        <p14:creationId xmlns:p14="http://schemas.microsoft.com/office/powerpoint/2010/main" val="2083802015"/>
-      </p:ext>
-    </p:extLst>
-  </p:cSld>
-  <p:clrMapOvr>
-    <a:masterClrMapping/>
-  </p:clrMapOvr>
-  <p:timing>
-    <p:tnLst>
-      <p:par>
-        <p:cTn xmlns:p14="http://schemas.microsoft.com/office/powerpoint/2010/main" id="1" dur="indefinite" restart="never" nodeType="tmRoot"/>
-      </p:par>
-    </p:tnLst>
-  </p:timing>
-</p:sld>
-</file>
-
 <file path=ppt/slides/slide9.xml><?xml version="1.0" encoding="utf-8"?>
 <p:sld xmlns:a="http://schemas.openxmlformats.org/drawingml/2006/main" xmlns:r="http://schemas.openxmlformats.org/officeDocument/2006/relationships" xmlns:p="http://schemas.openxmlformats.org/presentationml/2006/main">
   <p:cSld>
@@ -6031,28 +7251,133 @@
             <p:ph type="title"/>
           </p:nvPr>
         </p:nvSpPr>
+        <p:spPr/>
+        <p:txBody>
+          <a:bodyPr/>
+          <a:lstStyle/>
+          <a:p>
+            <a:r>
+              <a:rPr lang="en-US" dirty="0" smtClean="0"/>
+              <a:t>Runs &amp; Results</a:t>
+            </a:r>
+            <a:endParaRPr lang="en-US" dirty="0"/>
+          </a:p>
+        </p:txBody>
+      </p:sp>
+      <p:pic>
+        <p:nvPicPr>
+          <p:cNvPr id="5" name="Picture 4" descr="runs.png"/>
+          <p:cNvPicPr>
+            <a:picLocks noChangeAspect="1"/>
+          </p:cNvPicPr>
+          <p:nvPr/>
+        </p:nvPicPr>
+        <p:blipFill>
+          <a:blip r:embed="rId3">
+            <a:extLst>
+              <a:ext uri="{28A0092B-C50C-407E-A947-70E740481C1C}">
+                <a14:useLocalDpi xmlns:a14="http://schemas.microsoft.com/office/drawing/2010/main" val="0"/>
+              </a:ext>
+            </a:extLst>
+          </a:blip>
+          <a:stretch>
+            <a:fillRect/>
+          </a:stretch>
+        </p:blipFill>
         <p:spPr>
           <a:xfrm>
-            <a:off x="457200" y="2458758"/>
-            <a:ext cx="8229600" cy="1143000"/>
+            <a:off x="715202" y="1231443"/>
+            <a:ext cx="7713597" cy="2147828"/>
           </a:xfrm>
+          <a:prstGeom prst="rect">
+            <a:avLst/>
+          </a:prstGeom>
+          <a:ln w="57150">
+            <a:solidFill>
+              <a:schemeClr val="tx1"/>
+            </a:solidFill>
+          </a:ln>
         </p:spPr>
-        <p:txBody>
-          <a:bodyPr/>
+      </p:pic>
+      <p:pic>
+        <p:nvPicPr>
+          <p:cNvPr id="6" name="Picture 5" descr="results.png"/>
+          <p:cNvPicPr>
+            <a:picLocks noChangeAspect="1"/>
+          </p:cNvPicPr>
+          <p:nvPr/>
+        </p:nvPicPr>
+        <p:blipFill>
+          <a:blip r:embed="rId4">
+            <a:extLst>
+              <a:ext uri="{28A0092B-C50C-407E-A947-70E740481C1C}">
+                <a14:useLocalDpi xmlns:a14="http://schemas.microsoft.com/office/drawing/2010/main" val="0"/>
+              </a:ext>
+            </a:extLst>
+          </a:blip>
+          <a:stretch>
+            <a:fillRect/>
+          </a:stretch>
+        </p:blipFill>
+        <p:spPr>
+          <a:xfrm>
+            <a:off x="54620" y="3414375"/>
+            <a:ext cx="9034760" cy="3235812"/>
+          </a:xfrm>
+          <a:prstGeom prst="rect">
+            <a:avLst/>
+          </a:prstGeom>
+        </p:spPr>
+      </p:pic>
+      <p:sp>
+        <p:nvSpPr>
+          <p:cNvPr id="7" name="Oval 6"/>
+          <p:cNvSpPr/>
+          <p:nvPr/>
+        </p:nvSpPr>
+        <p:spPr>
+          <a:xfrm>
+            <a:off x="5596409" y="3721596"/>
+            <a:ext cx="1240364" cy="2732124"/>
+          </a:xfrm>
+          <a:prstGeom prst="ellipse">
+            <a:avLst/>
+          </a:prstGeom>
+          <a:noFill/>
+          <a:ln w="63500">
+            <a:solidFill>
+              <a:schemeClr val="accent2"/>
+            </a:solidFill>
+          </a:ln>
+          <a:effectLst/>
+        </p:spPr>
+        <p:style>
+          <a:lnRef idx="1">
+            <a:schemeClr val="accent1"/>
+          </a:lnRef>
+          <a:fillRef idx="3">
+            <a:schemeClr val="accent1"/>
+          </a:fillRef>
+          <a:effectRef idx="2">
+            <a:schemeClr val="accent1"/>
+          </a:effectRef>
+          <a:fontRef idx="minor">
+            <a:schemeClr val="lt1"/>
+          </a:fontRef>
+        </p:style>
+        <p:txBody>
+          <a:bodyPr rtlCol="0" anchor="ctr"/>
           <a:lstStyle/>
           <a:p>
-            <a:r>
-              <a:rPr lang="en-US" dirty="0" smtClean="0"/>
-              <a:t>Questions?</a:t>
-            </a:r>
-            <a:endParaRPr lang="en-US" dirty="0"/>
+            <a:pPr algn="ctr"/>
+            <a:endParaRPr lang="en-US"/>
           </a:p>
         </p:txBody>
       </p:sp>
     </p:spTree>
     <p:extLst>
       <p:ext uri="{BB962C8B-B14F-4D97-AF65-F5344CB8AC3E}">
-        <p14:creationId xmlns:p14="http://schemas.microsoft.com/office/powerpoint/2010/main" val="3811083936"/>
+        <p14:creationId xmlns:p14="http://schemas.microsoft.com/office/powerpoint/2010/main" val="1601674973"/>
       </p:ext>
     </p:extLst>
   </p:cSld>

</xml_diff>